<commit_message>
Ch3 corrections - Home -18-03-2017
Ch3 corrections - Home -18-03-2017
New figures
</commit_message>
<xml_diff>
--- a/Figs/Correction-Figs/Presentation1.pptx
+++ b/Figs/Correction-Figs/Presentation1.pptx
@@ -8,6 +8,9 @@
     <p:sldId id="256" r:id="rId2"/>
     <p:sldId id="257" r:id="rId3"/>
     <p:sldId id="258" r:id="rId4"/>
+    <p:sldId id="261" r:id="rId5"/>
+    <p:sldId id="259" r:id="rId6"/>
+    <p:sldId id="260" r:id="rId7"/>
   </p:sldIdLst>
   <p:sldSz cx="12192000" cy="6858000"/>
   <p:notesSz cx="6858000" cy="9144000"/>
@@ -106,6 +109,11 @@
       </a:defRPr>
     </a:lvl9pPr>
   </p:defaultTextStyle>
+  <p:extLst>
+    <p:ext uri="{EFAFB233-063F-42B5-8137-9DF3F51BA10A}">
+      <p15:sldGuideLst xmlns:p15="http://schemas.microsoft.com/office/powerpoint/2012/main"/>
+    </p:ext>
+  </p:extLst>
 </p:presentation>
 </file>
 
@@ -240,7 +248,7 @@
           <a:p>
             <a:fld id="{102B808B-2D38-421D-9FDF-2C2569731BC7}" type="datetimeFigureOut">
               <a:rPr lang="en-GB" smtClean="0"/>
-              <a:t>16/03/2017</a:t>
+              <a:t>17/03/2017</a:t>
             </a:fld>
             <a:endParaRPr lang="en-GB"/>
           </a:p>
@@ -410,7 +418,7 @@
           <a:p>
             <a:fld id="{102B808B-2D38-421D-9FDF-2C2569731BC7}" type="datetimeFigureOut">
               <a:rPr lang="en-GB" smtClean="0"/>
-              <a:t>16/03/2017</a:t>
+              <a:t>17/03/2017</a:t>
             </a:fld>
             <a:endParaRPr lang="en-GB"/>
           </a:p>
@@ -590,7 +598,7 @@
           <a:p>
             <a:fld id="{102B808B-2D38-421D-9FDF-2C2569731BC7}" type="datetimeFigureOut">
               <a:rPr lang="en-GB" smtClean="0"/>
-              <a:t>16/03/2017</a:t>
+              <a:t>17/03/2017</a:t>
             </a:fld>
             <a:endParaRPr lang="en-GB"/>
           </a:p>
@@ -760,7 +768,7 @@
           <a:p>
             <a:fld id="{102B808B-2D38-421D-9FDF-2C2569731BC7}" type="datetimeFigureOut">
               <a:rPr lang="en-GB" smtClean="0"/>
-              <a:t>16/03/2017</a:t>
+              <a:t>17/03/2017</a:t>
             </a:fld>
             <a:endParaRPr lang="en-GB"/>
           </a:p>
@@ -1006,7 +1014,7 @@
           <a:p>
             <a:fld id="{102B808B-2D38-421D-9FDF-2C2569731BC7}" type="datetimeFigureOut">
               <a:rPr lang="en-GB" smtClean="0"/>
-              <a:t>16/03/2017</a:t>
+              <a:t>17/03/2017</a:t>
             </a:fld>
             <a:endParaRPr lang="en-GB"/>
           </a:p>
@@ -1238,7 +1246,7 @@
           <a:p>
             <a:fld id="{102B808B-2D38-421D-9FDF-2C2569731BC7}" type="datetimeFigureOut">
               <a:rPr lang="en-GB" smtClean="0"/>
-              <a:t>16/03/2017</a:t>
+              <a:t>17/03/2017</a:t>
             </a:fld>
             <a:endParaRPr lang="en-GB"/>
           </a:p>
@@ -1605,7 +1613,7 @@
           <a:p>
             <a:fld id="{102B808B-2D38-421D-9FDF-2C2569731BC7}" type="datetimeFigureOut">
               <a:rPr lang="en-GB" smtClean="0"/>
-              <a:t>16/03/2017</a:t>
+              <a:t>17/03/2017</a:t>
             </a:fld>
             <a:endParaRPr lang="en-GB"/>
           </a:p>
@@ -1723,7 +1731,7 @@
           <a:p>
             <a:fld id="{102B808B-2D38-421D-9FDF-2C2569731BC7}" type="datetimeFigureOut">
               <a:rPr lang="en-GB" smtClean="0"/>
-              <a:t>16/03/2017</a:t>
+              <a:t>17/03/2017</a:t>
             </a:fld>
             <a:endParaRPr lang="en-GB"/>
           </a:p>
@@ -1818,7 +1826,7 @@
           <a:p>
             <a:fld id="{102B808B-2D38-421D-9FDF-2C2569731BC7}" type="datetimeFigureOut">
               <a:rPr lang="en-GB" smtClean="0"/>
-              <a:t>16/03/2017</a:t>
+              <a:t>17/03/2017</a:t>
             </a:fld>
             <a:endParaRPr lang="en-GB"/>
           </a:p>
@@ -2095,7 +2103,7 @@
           <a:p>
             <a:fld id="{102B808B-2D38-421D-9FDF-2C2569731BC7}" type="datetimeFigureOut">
               <a:rPr lang="en-GB" smtClean="0"/>
-              <a:t>16/03/2017</a:t>
+              <a:t>17/03/2017</a:t>
             </a:fld>
             <a:endParaRPr lang="en-GB"/>
           </a:p>
@@ -2348,7 +2356,7 @@
           <a:p>
             <a:fld id="{102B808B-2D38-421D-9FDF-2C2569731BC7}" type="datetimeFigureOut">
               <a:rPr lang="en-GB" smtClean="0"/>
-              <a:t>16/03/2017</a:t>
+              <a:t>17/03/2017</a:t>
             </a:fld>
             <a:endParaRPr lang="en-GB"/>
           </a:p>
@@ -2561,7 +2569,7 @@
           <a:p>
             <a:fld id="{102B808B-2D38-421D-9FDF-2C2569731BC7}" type="datetimeFigureOut">
               <a:rPr lang="en-GB" smtClean="0"/>
-              <a:t>16/03/2017</a:t>
+              <a:t>17/03/2017</a:t>
             </a:fld>
             <a:endParaRPr lang="en-GB"/>
           </a:p>
@@ -3004,6 +3012,35 @@
           </a:p>
         </p:txBody>
       </p:sp>
+      <p:pic>
+        <p:nvPicPr>
+          <p:cNvPr id="4" name="Picture 3"/>
+          <p:cNvPicPr>
+            <a:picLocks noChangeAspect="1"/>
+          </p:cNvPicPr>
+          <p:nvPr/>
+        </p:nvPicPr>
+        <p:blipFill rotWithShape="1">
+          <a:blip r:embed="rId2">
+            <a:extLst>
+              <a:ext uri="{28A0092B-C50C-407E-A947-70E740481C1C}">
+                <a14:useLocalDpi xmlns:a14="http://schemas.microsoft.com/office/drawing/2010/main" val="0"/>
+              </a:ext>
+            </a:extLst>
+          </a:blip>
+          <a:srcRect l="79613" t="8249" r="1062" b="16976"/>
+          <a:stretch/>
+        </p:blipFill>
+        <p:spPr>
+          <a:xfrm>
+            <a:off x="10094976" y="1655064"/>
+            <a:ext cx="1188720" cy="3127248"/>
+          </a:xfrm>
+          <a:prstGeom prst="rect">
+            <a:avLst/>
+          </a:prstGeom>
+        </p:spPr>
+      </p:pic>
     </p:spTree>
     <p:extLst>
       <p:ext uri="{BB962C8B-B14F-4D97-AF65-F5344CB8AC3E}">
@@ -3486,11 +3523,7 @@
           <a:p>
             <a:r>
               <a:rPr lang="en-GB" sz="2400" dirty="0" smtClean="0"/>
-              <a:t>Y </a:t>
-            </a:r>
-            <a:r>
-              <a:rPr lang="en-GB" sz="2400" dirty="0" smtClean="0"/>
-              <a:t> (µm)</a:t>
+              <a:t>Y  (µm)</a:t>
             </a:r>
           </a:p>
           <a:p>
@@ -3510,8 +3543,8 @@
         </p:nvCxnSpPr>
         <p:spPr>
           <a:xfrm>
-            <a:off x="5464638" y="806884"/>
-            <a:ext cx="0" cy="4890438"/>
+            <a:off x="5453957" y="821501"/>
+            <a:ext cx="4547" cy="1738819"/>
           </a:xfrm>
           <a:prstGeom prst="line">
             <a:avLst/>
@@ -3582,8 +3615,8 @@
         </p:nvSpPr>
         <p:spPr>
           <a:xfrm>
-            <a:off x="3360458" y="1180545"/>
-            <a:ext cx="1803861" cy="830997"/>
+            <a:off x="2824918" y="1154172"/>
+            <a:ext cx="2346873" cy="830997"/>
           </a:xfrm>
           <a:prstGeom prst="rect">
             <a:avLst/>
@@ -3596,6 +3629,14 @@
           </a:bodyPr>
           <a:lstStyle/>
           <a:p>
+            <a:r>
+              <a:rPr lang="en-GB" sz="2400" dirty="0" smtClean="0">
+                <a:solidFill>
+                  <a:schemeClr val="bg1"/>
+                </a:solidFill>
+              </a:rPr>
+              <a:t>Shallow </a:t>
+            </a:r>
             <a:r>
               <a:rPr lang="en-GB" sz="2400" dirty="0" err="1" smtClean="0">
                 <a:solidFill>
@@ -3610,7 +3651,15 @@
                   <a:schemeClr val="bg1"/>
                 </a:solidFill>
               </a:rPr>
-              <a:t> inclusion</a:t>
+              <a:t> </a:t>
+            </a:r>
+            <a:r>
+              <a:rPr lang="en-GB" sz="2400" dirty="0" smtClean="0">
+                <a:solidFill>
+                  <a:schemeClr val="bg1"/>
+                </a:solidFill>
+              </a:rPr>
+              <a:t>inclusion</a:t>
             </a:r>
             <a:endParaRPr lang="en-GB" sz="2400" dirty="0">
               <a:solidFill>
@@ -3768,10 +3817,1474 @@
           </a:fontRef>
         </p:style>
       </p:cxnSp>
+      <p:sp>
+        <p:nvSpPr>
+          <p:cNvPr id="27" name="TextBox 26"/>
+          <p:cNvSpPr txBox="1"/>
+          <p:nvPr/>
+        </p:nvSpPr>
+        <p:spPr>
+          <a:xfrm>
+            <a:off x="2502726" y="2906373"/>
+            <a:ext cx="1083243" cy="584775"/>
+          </a:xfrm>
+          <a:prstGeom prst="rect">
+            <a:avLst/>
+          </a:prstGeom>
+          <a:noFill/>
+        </p:spPr>
+        <p:txBody>
+          <a:bodyPr wrap="square" rtlCol="0">
+            <a:spAutoFit/>
+          </a:bodyPr>
+          <a:lstStyle/>
+          <a:p>
+            <a:r>
+              <a:rPr lang="en-GB" sz="3200" dirty="0" smtClean="0">
+                <a:solidFill>
+                  <a:schemeClr val="bg1"/>
+                </a:solidFill>
+              </a:rPr>
+              <a:t>QW2</a:t>
+            </a:r>
+            <a:endParaRPr lang="en-GB" sz="3200" dirty="0">
+              <a:solidFill>
+                <a:schemeClr val="bg1"/>
+              </a:solidFill>
+            </a:endParaRPr>
+          </a:p>
+        </p:txBody>
+      </p:sp>
+      <p:sp>
+        <p:nvSpPr>
+          <p:cNvPr id="30" name="TextBox 29"/>
+          <p:cNvSpPr txBox="1"/>
+          <p:nvPr/>
+        </p:nvSpPr>
+        <p:spPr>
+          <a:xfrm>
+            <a:off x="2502725" y="3662778"/>
+            <a:ext cx="1083243" cy="584775"/>
+          </a:xfrm>
+          <a:prstGeom prst="rect">
+            <a:avLst/>
+          </a:prstGeom>
+          <a:noFill/>
+        </p:spPr>
+        <p:txBody>
+          <a:bodyPr wrap="square" rtlCol="0">
+            <a:spAutoFit/>
+          </a:bodyPr>
+          <a:lstStyle/>
+          <a:p>
+            <a:r>
+              <a:rPr lang="en-GB" sz="3200" dirty="0" smtClean="0">
+                <a:solidFill>
+                  <a:schemeClr val="bg1"/>
+                </a:solidFill>
+              </a:rPr>
+              <a:t>QW3</a:t>
+            </a:r>
+            <a:endParaRPr lang="en-GB" sz="3200" dirty="0">
+              <a:solidFill>
+                <a:schemeClr val="bg1"/>
+              </a:solidFill>
+            </a:endParaRPr>
+          </a:p>
+        </p:txBody>
+      </p:sp>
+      <p:sp>
+        <p:nvSpPr>
+          <p:cNvPr id="33" name="TextBox 32"/>
+          <p:cNvSpPr txBox="1"/>
+          <p:nvPr/>
+        </p:nvSpPr>
+        <p:spPr>
+          <a:xfrm>
+            <a:off x="2502724" y="4437232"/>
+            <a:ext cx="1083243" cy="584775"/>
+          </a:xfrm>
+          <a:prstGeom prst="rect">
+            <a:avLst/>
+          </a:prstGeom>
+          <a:noFill/>
+        </p:spPr>
+        <p:txBody>
+          <a:bodyPr wrap="square" rtlCol="0">
+            <a:spAutoFit/>
+          </a:bodyPr>
+          <a:lstStyle/>
+          <a:p>
+            <a:r>
+              <a:rPr lang="en-GB" sz="3200" dirty="0" smtClean="0">
+                <a:solidFill>
+                  <a:schemeClr val="bg1"/>
+                </a:solidFill>
+              </a:rPr>
+              <a:t>QW4</a:t>
+            </a:r>
+            <a:endParaRPr lang="en-GB" sz="3200" dirty="0">
+              <a:solidFill>
+                <a:schemeClr val="bg1"/>
+              </a:solidFill>
+            </a:endParaRPr>
+          </a:p>
+        </p:txBody>
+      </p:sp>
+      <p:sp>
+        <p:nvSpPr>
+          <p:cNvPr id="34" name="TextBox 33"/>
+          <p:cNvSpPr txBox="1"/>
+          <p:nvPr/>
+        </p:nvSpPr>
+        <p:spPr>
+          <a:xfrm>
+            <a:off x="2502724" y="5122171"/>
+            <a:ext cx="1083243" cy="584775"/>
+          </a:xfrm>
+          <a:prstGeom prst="rect">
+            <a:avLst/>
+          </a:prstGeom>
+          <a:noFill/>
+        </p:spPr>
+        <p:txBody>
+          <a:bodyPr wrap="square" rtlCol="0">
+            <a:spAutoFit/>
+          </a:bodyPr>
+          <a:lstStyle/>
+          <a:p>
+            <a:r>
+              <a:rPr lang="en-GB" sz="3200" dirty="0" smtClean="0">
+                <a:solidFill>
+                  <a:schemeClr val="bg1"/>
+                </a:solidFill>
+              </a:rPr>
+              <a:t>QW5</a:t>
+            </a:r>
+            <a:endParaRPr lang="en-GB" sz="3200" dirty="0">
+              <a:solidFill>
+                <a:schemeClr val="bg1"/>
+              </a:solidFill>
+            </a:endParaRPr>
+          </a:p>
+        </p:txBody>
+      </p:sp>
+      <p:sp>
+        <p:nvSpPr>
+          <p:cNvPr id="35" name="TextBox 34"/>
+          <p:cNvSpPr txBox="1"/>
+          <p:nvPr/>
+        </p:nvSpPr>
+        <p:spPr>
+          <a:xfrm>
+            <a:off x="2502723" y="2209043"/>
+            <a:ext cx="1083243" cy="584775"/>
+          </a:xfrm>
+          <a:prstGeom prst="rect">
+            <a:avLst/>
+          </a:prstGeom>
+          <a:noFill/>
+        </p:spPr>
+        <p:txBody>
+          <a:bodyPr wrap="square" rtlCol="0">
+            <a:spAutoFit/>
+          </a:bodyPr>
+          <a:lstStyle/>
+          <a:p>
+            <a:r>
+              <a:rPr lang="en-GB" sz="3200" dirty="0" smtClean="0">
+                <a:solidFill>
+                  <a:schemeClr val="bg1"/>
+                </a:solidFill>
+              </a:rPr>
+              <a:t>QW1</a:t>
+            </a:r>
+            <a:endParaRPr lang="en-GB" sz="3200" dirty="0">
+              <a:solidFill>
+                <a:schemeClr val="bg1"/>
+              </a:solidFill>
+            </a:endParaRPr>
+          </a:p>
+        </p:txBody>
+      </p:sp>
     </p:spTree>
     <p:extLst>
       <p:ext uri="{BB962C8B-B14F-4D97-AF65-F5344CB8AC3E}">
         <p14:creationId xmlns:p14="http://schemas.microsoft.com/office/powerpoint/2010/main" val="3034694581"/>
+      </p:ext>
+    </p:extLst>
+  </p:cSld>
+  <p:clrMapOvr>
+    <a:masterClrMapping/>
+  </p:clrMapOvr>
+  <p:timing>
+    <p:tnLst>
+      <p:par>
+        <p:cTn id="1" dur="indefinite" restart="never" nodeType="tmRoot"/>
+      </p:par>
+    </p:tnLst>
+  </p:timing>
+</p:sld>
+</file>
+
+<file path=ppt/slides/slide4.xml><?xml version="1.0" encoding="utf-8"?>
+<p:sld xmlns:a="http://schemas.openxmlformats.org/drawingml/2006/main" xmlns:r="http://schemas.openxmlformats.org/officeDocument/2006/relationships" xmlns:p="http://schemas.openxmlformats.org/presentationml/2006/main">
+  <p:cSld>
+    <p:spTree>
+      <p:nvGrpSpPr>
+        <p:cNvPr id="1" name=""/>
+        <p:cNvGrpSpPr/>
+        <p:nvPr/>
+      </p:nvGrpSpPr>
+      <p:grpSpPr>
+        <a:xfrm>
+          <a:off x="0" y="0"/>
+          <a:ext cx="0" cy="0"/>
+          <a:chOff x="0" y="0"/>
+          <a:chExt cx="0" cy="0"/>
+        </a:xfrm>
+      </p:grpSpPr>
+      <p:pic>
+        <p:nvPicPr>
+          <p:cNvPr id="4" name="Content Placeholder 3"/>
+          <p:cNvPicPr>
+            <a:picLocks noGrp="1" noChangeAspect="1"/>
+          </p:cNvPicPr>
+          <p:nvPr>
+            <p:ph idx="1"/>
+          </p:nvPr>
+        </p:nvPicPr>
+        <p:blipFill>
+          <a:blip r:embed="rId2" cstate="print">
+            <a:extLst>
+              <a:ext uri="{28A0092B-C50C-407E-A947-70E740481C1C}">
+                <a14:useLocalDpi xmlns:a14="http://schemas.microsoft.com/office/drawing/2010/main" val="0"/>
+              </a:ext>
+            </a:extLst>
+          </a:blip>
+          <a:stretch>
+            <a:fillRect/>
+          </a:stretch>
+        </p:blipFill>
+        <p:spPr>
+          <a:xfrm>
+            <a:off x="1899764" y="216281"/>
+            <a:ext cx="9144000" cy="6400800"/>
+          </a:xfrm>
+        </p:spPr>
+      </p:pic>
+      <p:sp>
+        <p:nvSpPr>
+          <p:cNvPr id="5" name="TextBox 4"/>
+          <p:cNvSpPr txBox="1"/>
+          <p:nvPr/>
+        </p:nvSpPr>
+        <p:spPr>
+          <a:xfrm>
+            <a:off x="3452673" y="3073250"/>
+            <a:ext cx="1083243" cy="584775"/>
+          </a:xfrm>
+          <a:prstGeom prst="rect">
+            <a:avLst/>
+          </a:prstGeom>
+          <a:noFill/>
+        </p:spPr>
+        <p:txBody>
+          <a:bodyPr wrap="square" rtlCol="0">
+            <a:spAutoFit/>
+          </a:bodyPr>
+          <a:lstStyle/>
+          <a:p>
+            <a:r>
+              <a:rPr lang="en-GB" sz="3200" dirty="0" smtClean="0"/>
+              <a:t>QW1</a:t>
+            </a:r>
+            <a:endParaRPr lang="en-GB" sz="3200" dirty="0"/>
+          </a:p>
+        </p:txBody>
+      </p:sp>
+      <p:sp>
+        <p:nvSpPr>
+          <p:cNvPr id="6" name="TextBox 5"/>
+          <p:cNvSpPr txBox="1"/>
+          <p:nvPr/>
+        </p:nvSpPr>
+        <p:spPr>
+          <a:xfrm>
+            <a:off x="4903521" y="759817"/>
+            <a:ext cx="1083243" cy="584775"/>
+          </a:xfrm>
+          <a:prstGeom prst="rect">
+            <a:avLst/>
+          </a:prstGeom>
+          <a:noFill/>
+        </p:spPr>
+        <p:txBody>
+          <a:bodyPr wrap="square" rtlCol="0">
+            <a:spAutoFit/>
+          </a:bodyPr>
+          <a:lstStyle/>
+          <a:p>
+            <a:r>
+              <a:rPr lang="en-GB" sz="3200" dirty="0" smtClean="0"/>
+              <a:t>QW2</a:t>
+            </a:r>
+            <a:endParaRPr lang="en-GB" sz="3200" dirty="0"/>
+          </a:p>
+        </p:txBody>
+      </p:sp>
+      <p:sp>
+        <p:nvSpPr>
+          <p:cNvPr id="7" name="TextBox 6"/>
+          <p:cNvSpPr txBox="1"/>
+          <p:nvPr/>
+        </p:nvSpPr>
+        <p:spPr>
+          <a:xfrm>
+            <a:off x="6203601" y="3938881"/>
+            <a:ext cx="1083243" cy="584775"/>
+          </a:xfrm>
+          <a:prstGeom prst="rect">
+            <a:avLst/>
+          </a:prstGeom>
+          <a:noFill/>
+        </p:spPr>
+        <p:txBody>
+          <a:bodyPr wrap="square" rtlCol="0">
+            <a:spAutoFit/>
+          </a:bodyPr>
+          <a:lstStyle/>
+          <a:p>
+            <a:r>
+              <a:rPr lang="en-GB" sz="3200" dirty="0" smtClean="0"/>
+              <a:t>QW3</a:t>
+            </a:r>
+            <a:endParaRPr lang="en-GB" sz="3200" dirty="0"/>
+          </a:p>
+        </p:txBody>
+      </p:sp>
+      <p:sp>
+        <p:nvSpPr>
+          <p:cNvPr id="8" name="TextBox 7"/>
+          <p:cNvSpPr txBox="1"/>
+          <p:nvPr/>
+        </p:nvSpPr>
+        <p:spPr>
+          <a:xfrm>
+            <a:off x="7643673" y="4798417"/>
+            <a:ext cx="1083243" cy="584775"/>
+          </a:xfrm>
+          <a:prstGeom prst="rect">
+            <a:avLst/>
+          </a:prstGeom>
+          <a:noFill/>
+        </p:spPr>
+        <p:txBody>
+          <a:bodyPr wrap="square" rtlCol="0">
+            <a:spAutoFit/>
+          </a:bodyPr>
+          <a:lstStyle/>
+          <a:p>
+            <a:r>
+              <a:rPr lang="en-GB" sz="3200" dirty="0" smtClean="0"/>
+              <a:t>QW4</a:t>
+            </a:r>
+            <a:endParaRPr lang="en-GB" sz="3200" dirty="0"/>
+          </a:p>
+        </p:txBody>
+      </p:sp>
+      <p:sp>
+        <p:nvSpPr>
+          <p:cNvPr id="9" name="TextBox 8"/>
+          <p:cNvSpPr txBox="1"/>
+          <p:nvPr/>
+        </p:nvSpPr>
+        <p:spPr>
+          <a:xfrm>
+            <a:off x="9021369" y="4914241"/>
+            <a:ext cx="1083243" cy="584775"/>
+          </a:xfrm>
+          <a:prstGeom prst="rect">
+            <a:avLst/>
+          </a:prstGeom>
+          <a:noFill/>
+        </p:spPr>
+        <p:txBody>
+          <a:bodyPr wrap="square" rtlCol="0">
+            <a:spAutoFit/>
+          </a:bodyPr>
+          <a:lstStyle/>
+          <a:p>
+            <a:r>
+              <a:rPr lang="en-GB" sz="3200" dirty="0" smtClean="0"/>
+              <a:t>QW5</a:t>
+            </a:r>
+            <a:endParaRPr lang="en-GB" sz="3200" dirty="0"/>
+          </a:p>
+        </p:txBody>
+      </p:sp>
+    </p:spTree>
+    <p:extLst>
+      <p:ext uri="{BB962C8B-B14F-4D97-AF65-F5344CB8AC3E}">
+        <p14:creationId xmlns:p14="http://schemas.microsoft.com/office/powerpoint/2010/main" val="3401577654"/>
+      </p:ext>
+    </p:extLst>
+  </p:cSld>
+  <p:clrMapOvr>
+    <a:masterClrMapping/>
+  </p:clrMapOvr>
+  <p:timing>
+    <p:tnLst>
+      <p:par>
+        <p:cTn id="1" dur="indefinite" restart="never" nodeType="tmRoot"/>
+      </p:par>
+    </p:tnLst>
+  </p:timing>
+</p:sld>
+</file>
+
+<file path=ppt/slides/slide5.xml><?xml version="1.0" encoding="utf-8"?>
+<p:sld xmlns:a="http://schemas.openxmlformats.org/drawingml/2006/main" xmlns:r="http://schemas.openxmlformats.org/officeDocument/2006/relationships" xmlns:p="http://schemas.openxmlformats.org/presentationml/2006/main">
+  <p:cSld>
+    <p:spTree>
+      <p:nvGrpSpPr>
+        <p:cNvPr id="1" name=""/>
+        <p:cNvGrpSpPr/>
+        <p:nvPr/>
+      </p:nvGrpSpPr>
+      <p:grpSpPr>
+        <a:xfrm>
+          <a:off x="0" y="0"/>
+          <a:ext cx="0" cy="0"/>
+          <a:chOff x="0" y="0"/>
+          <a:chExt cx="0" cy="0"/>
+        </a:xfrm>
+      </p:grpSpPr>
+      <p:grpSp>
+        <p:nvGrpSpPr>
+          <p:cNvPr id="4" name="Group 3"/>
+          <p:cNvGrpSpPr/>
+          <p:nvPr/>
+        </p:nvGrpSpPr>
+        <p:grpSpPr>
+          <a:xfrm>
+            <a:off x="1113005" y="122376"/>
+            <a:ext cx="10381764" cy="6261473"/>
+            <a:chOff x="86383" y="311075"/>
+            <a:chExt cx="10381764" cy="6261473"/>
+          </a:xfrm>
+        </p:grpSpPr>
+        <p:grpSp>
+          <p:nvGrpSpPr>
+            <p:cNvPr id="5" name="Group 4"/>
+            <p:cNvGrpSpPr/>
+            <p:nvPr/>
+          </p:nvGrpSpPr>
+          <p:grpSpPr>
+            <a:xfrm>
+              <a:off x="86383" y="624330"/>
+              <a:ext cx="7838902" cy="5948218"/>
+              <a:chOff x="1479666" y="457731"/>
+              <a:chExt cx="7342984" cy="5972743"/>
+            </a:xfrm>
+          </p:grpSpPr>
+          <p:pic>
+            <p:nvPicPr>
+              <p:cNvPr id="11" name="Picture 10"/>
+              <p:cNvPicPr>
+                <a:picLocks noChangeAspect="1"/>
+              </p:cNvPicPr>
+              <p:nvPr/>
+            </p:nvPicPr>
+            <p:blipFill rotWithShape="1">
+              <a:blip r:embed="rId2"/>
+              <a:srcRect r="18616" b="8006"/>
+              <a:stretch/>
+            </p:blipFill>
+            <p:spPr>
+              <a:xfrm>
+                <a:off x="2028306" y="457731"/>
+                <a:ext cx="6794344" cy="5494565"/>
+              </a:xfrm>
+              <a:prstGeom prst="rect">
+                <a:avLst/>
+              </a:prstGeom>
+            </p:spPr>
+          </p:pic>
+          <p:sp>
+            <p:nvSpPr>
+              <p:cNvPr id="12" name="Rectangle 11"/>
+              <p:cNvSpPr/>
+              <p:nvPr/>
+            </p:nvSpPr>
+            <p:spPr>
+              <a:xfrm>
+                <a:off x="1479666" y="553376"/>
+                <a:ext cx="1097280" cy="5877098"/>
+              </a:xfrm>
+              <a:prstGeom prst="rect">
+                <a:avLst/>
+              </a:prstGeom>
+              <a:solidFill>
+                <a:schemeClr val="bg1"/>
+              </a:solidFill>
+              <a:ln>
+                <a:noFill/>
+              </a:ln>
+            </p:spPr>
+            <p:style>
+              <a:lnRef idx="2">
+                <a:schemeClr val="accent1">
+                  <a:shade val="50000"/>
+                </a:schemeClr>
+              </a:lnRef>
+              <a:fillRef idx="1">
+                <a:schemeClr val="accent1"/>
+              </a:fillRef>
+              <a:effectRef idx="0">
+                <a:schemeClr val="accent1"/>
+              </a:effectRef>
+              <a:fontRef idx="minor">
+                <a:schemeClr val="lt1"/>
+              </a:fontRef>
+            </p:style>
+            <p:txBody>
+              <a:bodyPr rtlCol="0" anchor="ctr"/>
+              <a:lstStyle/>
+              <a:p>
+                <a:pPr algn="ctr"/>
+                <a:endParaRPr lang="en-GB"/>
+              </a:p>
+            </p:txBody>
+          </p:sp>
+        </p:grpSp>
+        <p:pic>
+          <p:nvPicPr>
+            <p:cNvPr id="6" name="Picture 5"/>
+            <p:cNvPicPr>
+              <a:picLocks noChangeAspect="1"/>
+            </p:cNvPicPr>
+            <p:nvPr/>
+          </p:nvPicPr>
+          <p:blipFill rotWithShape="1">
+            <a:blip r:embed="rId2"/>
+            <a:srcRect l="81844" t="13191" b="17573"/>
+            <a:stretch/>
+          </p:blipFill>
+          <p:spPr>
+            <a:xfrm>
+              <a:off x="8159454" y="1126683"/>
+              <a:ext cx="1988140" cy="4943513"/>
+            </a:xfrm>
+            <a:prstGeom prst="rect">
+              <a:avLst/>
+            </a:prstGeom>
+          </p:spPr>
+        </p:pic>
+        <p:sp>
+          <p:nvSpPr>
+            <p:cNvPr id="7" name="TextBox 6"/>
+            <p:cNvSpPr txBox="1"/>
+            <p:nvPr/>
+          </p:nvSpPr>
+          <p:spPr>
+            <a:xfrm>
+              <a:off x="1586317" y="581247"/>
+              <a:ext cx="6018415" cy="584775"/>
+            </a:xfrm>
+            <a:prstGeom prst="rect">
+              <a:avLst/>
+            </a:prstGeom>
+            <a:solidFill>
+              <a:schemeClr val="bg1"/>
+            </a:solidFill>
+          </p:spPr>
+          <p:txBody>
+            <a:bodyPr wrap="square" rtlCol="0">
+              <a:spAutoFit/>
+            </a:bodyPr>
+            <a:lstStyle/>
+            <a:p>
+              <a:pPr algn="ctr"/>
+              <a:r>
+                <a:rPr lang="en-GB" sz="3200" dirty="0" smtClean="0"/>
+                <a:t>Radiative Recombination Events</a:t>
+              </a:r>
+              <a:endParaRPr lang="en-GB" sz="3200" dirty="0"/>
+            </a:p>
+          </p:txBody>
+        </p:sp>
+        <p:sp>
+          <p:nvSpPr>
+            <p:cNvPr id="8" name="Rectangle 7"/>
+            <p:cNvSpPr/>
+            <p:nvPr/>
+          </p:nvSpPr>
+          <p:spPr>
+            <a:xfrm>
+              <a:off x="7838901" y="311075"/>
+              <a:ext cx="2629246" cy="584775"/>
+            </a:xfrm>
+            <a:prstGeom prst="rect">
+              <a:avLst/>
+            </a:prstGeom>
+          </p:spPr>
+          <p:txBody>
+            <a:bodyPr wrap="none">
+              <a:spAutoFit/>
+            </a:bodyPr>
+            <a:lstStyle/>
+            <a:p>
+              <a:pPr algn="ctr"/>
+              <a:r>
+                <a:rPr lang="en-GB" sz="3200" dirty="0" smtClean="0"/>
+                <a:t>(×10</a:t>
+              </a:r>
+              <a:r>
+                <a:rPr lang="en-GB" sz="3200" baseline="30000" dirty="0" smtClean="0"/>
+                <a:t>28</a:t>
+              </a:r>
+              <a:r>
+                <a:rPr lang="en-GB" sz="3200" dirty="0" smtClean="0"/>
+                <a:t> cm</a:t>
+              </a:r>
+              <a:r>
+                <a:rPr lang="en-GB" sz="3200" baseline="30000" dirty="0" smtClean="0"/>
+                <a:t>-3</a:t>
+              </a:r>
+              <a:r>
+                <a:rPr lang="en-GB" sz="3200" dirty="0" smtClean="0"/>
+                <a:t> s</a:t>
+              </a:r>
+              <a:r>
+                <a:rPr lang="en-GB" sz="3200" baseline="30000" dirty="0" smtClean="0"/>
+                <a:t>-1</a:t>
+              </a:r>
+              <a:r>
+                <a:rPr lang="en-GB" sz="3200" dirty="0" smtClean="0"/>
+                <a:t>)</a:t>
+              </a:r>
+              <a:endParaRPr lang="en-GB" sz="3200" dirty="0"/>
+            </a:p>
+          </p:txBody>
+        </p:sp>
+        <p:sp>
+          <p:nvSpPr>
+            <p:cNvPr id="9" name="TextBox 8"/>
+            <p:cNvSpPr txBox="1"/>
+            <p:nvPr/>
+          </p:nvSpPr>
+          <p:spPr>
+            <a:xfrm>
+              <a:off x="385363" y="1245769"/>
+              <a:ext cx="749508" cy="4893647"/>
+            </a:xfrm>
+            <a:prstGeom prst="rect">
+              <a:avLst/>
+            </a:prstGeom>
+            <a:noFill/>
+          </p:spPr>
+          <p:txBody>
+            <a:bodyPr wrap="square" rtlCol="0">
+              <a:spAutoFit/>
+            </a:bodyPr>
+            <a:lstStyle/>
+            <a:p>
+              <a:r>
+                <a:rPr lang="en-GB" sz="2400" dirty="0" smtClean="0"/>
+                <a:t>2.76</a:t>
+              </a:r>
+            </a:p>
+            <a:p>
+              <a:endParaRPr lang="en-GB" sz="2400" dirty="0"/>
+            </a:p>
+            <a:p>
+              <a:r>
+                <a:rPr lang="en-GB" sz="2400" dirty="0" smtClean="0"/>
+                <a:t>2.75</a:t>
+              </a:r>
+            </a:p>
+            <a:p>
+              <a:endParaRPr lang="en-GB" sz="2400" dirty="0"/>
+            </a:p>
+            <a:p>
+              <a:r>
+                <a:rPr lang="en-GB" sz="2400" dirty="0" smtClean="0"/>
+                <a:t>2.74</a:t>
+              </a:r>
+            </a:p>
+            <a:p>
+              <a:endParaRPr lang="en-GB" sz="2400" dirty="0"/>
+            </a:p>
+            <a:p>
+              <a:r>
+                <a:rPr lang="en-GB" sz="2400" dirty="0" smtClean="0"/>
+                <a:t>2.73</a:t>
+              </a:r>
+            </a:p>
+            <a:p>
+              <a:endParaRPr lang="en-GB" sz="2400" dirty="0"/>
+            </a:p>
+            <a:p>
+              <a:r>
+                <a:rPr lang="en-GB" sz="2400" dirty="0" smtClean="0"/>
+                <a:t>2.72</a:t>
+              </a:r>
+            </a:p>
+            <a:p>
+              <a:endParaRPr lang="en-GB" sz="2400" dirty="0"/>
+            </a:p>
+            <a:p>
+              <a:r>
+                <a:rPr lang="en-GB" sz="2400" dirty="0" smtClean="0"/>
+                <a:t>2.71</a:t>
+              </a:r>
+            </a:p>
+            <a:p>
+              <a:endParaRPr lang="en-GB" sz="2400" dirty="0"/>
+            </a:p>
+            <a:p>
+              <a:r>
+                <a:rPr lang="en-GB" sz="2400" dirty="0" smtClean="0"/>
+                <a:t>2.70</a:t>
+              </a:r>
+              <a:endParaRPr lang="en-GB" sz="2400" dirty="0"/>
+            </a:p>
+          </p:txBody>
+        </p:sp>
+        <p:sp>
+          <p:nvSpPr>
+            <p:cNvPr id="10" name="TextBox 9"/>
+            <p:cNvSpPr txBox="1"/>
+            <p:nvPr/>
+          </p:nvSpPr>
+          <p:spPr>
+            <a:xfrm>
+              <a:off x="1257769" y="6096333"/>
+              <a:ext cx="6901685" cy="461665"/>
+            </a:xfrm>
+            <a:prstGeom prst="rect">
+              <a:avLst/>
+            </a:prstGeom>
+            <a:noFill/>
+          </p:spPr>
+          <p:txBody>
+            <a:bodyPr wrap="square" rtlCol="0">
+              <a:spAutoFit/>
+            </a:bodyPr>
+            <a:lstStyle/>
+            <a:p>
+              <a:r>
+                <a:rPr lang="en-GB" sz="2400" dirty="0" smtClean="0"/>
+                <a:t>   99.6            99.8           100            100.2             100.4</a:t>
+              </a:r>
+              <a:endParaRPr lang="en-GB" sz="2400" dirty="0"/>
+            </a:p>
+          </p:txBody>
+        </p:sp>
+      </p:grpSp>
+      <p:pic>
+        <p:nvPicPr>
+          <p:cNvPr id="13" name="Picture 12"/>
+          <p:cNvPicPr>
+            <a:picLocks noChangeAspect="1"/>
+          </p:cNvPicPr>
+          <p:nvPr/>
+        </p:nvPicPr>
+        <p:blipFill rotWithShape="1">
+          <a:blip r:embed="rId3">
+            <a:extLst>
+              <a:ext uri="{28A0092B-C50C-407E-A947-70E740481C1C}">
+                <a14:useLocalDpi xmlns:a14="http://schemas.microsoft.com/office/drawing/2010/main" val="0"/>
+              </a:ext>
+            </a:extLst>
+          </a:blip>
+          <a:srcRect l="10294" t="7520" r="20435" b="12895"/>
+          <a:stretch/>
+        </p:blipFill>
+        <p:spPr>
+          <a:xfrm>
+            <a:off x="2290205" y="991274"/>
+            <a:ext cx="6784600" cy="4923635"/>
+          </a:xfrm>
+          <a:prstGeom prst="rect">
+            <a:avLst/>
+          </a:prstGeom>
+        </p:spPr>
+      </p:pic>
+      <p:pic>
+        <p:nvPicPr>
+          <p:cNvPr id="15" name="Picture 14"/>
+          <p:cNvPicPr>
+            <a:picLocks noChangeAspect="1"/>
+          </p:cNvPicPr>
+          <p:nvPr/>
+        </p:nvPicPr>
+        <p:blipFill rotWithShape="1">
+          <a:blip r:embed="rId3">
+            <a:extLst>
+              <a:ext uri="{28A0092B-C50C-407E-A947-70E740481C1C}">
+                <a14:useLocalDpi xmlns:a14="http://schemas.microsoft.com/office/drawing/2010/main" val="0"/>
+              </a:ext>
+            </a:extLst>
+          </a:blip>
+          <a:srcRect l="79613" t="8249" r="1062" b="16976"/>
+          <a:stretch/>
+        </p:blipFill>
+        <p:spPr>
+          <a:xfrm>
+            <a:off x="9186076" y="911846"/>
+            <a:ext cx="1988140" cy="5037239"/>
+          </a:xfrm>
+          <a:prstGeom prst="rect">
+            <a:avLst/>
+          </a:prstGeom>
+        </p:spPr>
+      </p:pic>
+      <p:sp>
+        <p:nvSpPr>
+          <p:cNvPr id="16" name="TextBox 15"/>
+          <p:cNvSpPr txBox="1"/>
+          <p:nvPr/>
+        </p:nvSpPr>
+        <p:spPr>
+          <a:xfrm>
+            <a:off x="2468706" y="1532966"/>
+            <a:ext cx="2174231" cy="461665"/>
+          </a:xfrm>
+          <a:prstGeom prst="rect">
+            <a:avLst/>
+          </a:prstGeom>
+          <a:noFill/>
+        </p:spPr>
+        <p:txBody>
+          <a:bodyPr wrap="square" rtlCol="0">
+            <a:spAutoFit/>
+          </a:bodyPr>
+          <a:lstStyle/>
+          <a:p>
+            <a:r>
+              <a:rPr lang="en-GB" sz="2400" dirty="0" smtClean="0">
+                <a:solidFill>
+                  <a:schemeClr val="bg1"/>
+                </a:solidFill>
+              </a:rPr>
+              <a:t>Hexagonal pit</a:t>
+            </a:r>
+            <a:endParaRPr lang="en-GB" sz="2400" dirty="0">
+              <a:solidFill>
+                <a:schemeClr val="bg1"/>
+              </a:solidFill>
+            </a:endParaRPr>
+          </a:p>
+        </p:txBody>
+      </p:sp>
+      <p:cxnSp>
+        <p:nvCxnSpPr>
+          <p:cNvPr id="17" name="Straight Arrow Connector 16"/>
+          <p:cNvCxnSpPr/>
+          <p:nvPr/>
+        </p:nvCxnSpPr>
+        <p:spPr>
+          <a:xfrm>
+            <a:off x="4405745" y="1788068"/>
+            <a:ext cx="782397" cy="0"/>
+          </a:xfrm>
+          <a:prstGeom prst="straightConnector1">
+            <a:avLst/>
+          </a:prstGeom>
+          <a:ln w="38100">
+            <a:solidFill>
+              <a:schemeClr val="bg1"/>
+            </a:solidFill>
+            <a:tailEnd type="triangle"/>
+          </a:ln>
+        </p:spPr>
+        <p:style>
+          <a:lnRef idx="1">
+            <a:schemeClr val="accent1"/>
+          </a:lnRef>
+          <a:fillRef idx="0">
+            <a:schemeClr val="accent1"/>
+          </a:fillRef>
+          <a:effectRef idx="0">
+            <a:schemeClr val="accent1"/>
+          </a:effectRef>
+          <a:fontRef idx="minor">
+            <a:schemeClr val="tx1"/>
+          </a:fontRef>
+        </p:style>
+      </p:cxnSp>
+      <p:sp>
+        <p:nvSpPr>
+          <p:cNvPr id="18" name="TextBox 17"/>
+          <p:cNvSpPr txBox="1"/>
+          <p:nvPr/>
+        </p:nvSpPr>
+        <p:spPr>
+          <a:xfrm>
+            <a:off x="5773835" y="1154172"/>
+            <a:ext cx="2044285" cy="1200329"/>
+          </a:xfrm>
+          <a:prstGeom prst="rect">
+            <a:avLst/>
+          </a:prstGeom>
+          <a:noFill/>
+        </p:spPr>
+        <p:txBody>
+          <a:bodyPr wrap="square" rtlCol="0">
+            <a:spAutoFit/>
+          </a:bodyPr>
+          <a:lstStyle/>
+          <a:p>
+            <a:r>
+              <a:rPr lang="en-GB" sz="2400" dirty="0" smtClean="0">
+                <a:solidFill>
+                  <a:schemeClr val="bg1"/>
+                </a:solidFill>
+              </a:rPr>
+              <a:t>Profile taken ‘close’ to inclusion</a:t>
+            </a:r>
+            <a:endParaRPr lang="en-GB" sz="2400" dirty="0">
+              <a:solidFill>
+                <a:schemeClr val="bg1"/>
+              </a:solidFill>
+            </a:endParaRPr>
+          </a:p>
+        </p:txBody>
+      </p:sp>
+      <p:sp>
+        <p:nvSpPr>
+          <p:cNvPr id="19" name="TextBox 18"/>
+          <p:cNvSpPr txBox="1"/>
+          <p:nvPr/>
+        </p:nvSpPr>
+        <p:spPr>
+          <a:xfrm>
+            <a:off x="7627733" y="952902"/>
+            <a:ext cx="1379809" cy="1569660"/>
+          </a:xfrm>
+          <a:prstGeom prst="rect">
+            <a:avLst/>
+          </a:prstGeom>
+          <a:noFill/>
+        </p:spPr>
+        <p:txBody>
+          <a:bodyPr wrap="square" rtlCol="0">
+            <a:spAutoFit/>
+          </a:bodyPr>
+          <a:lstStyle/>
+          <a:p>
+            <a:r>
+              <a:rPr lang="en-GB" sz="2400" dirty="0" smtClean="0">
+                <a:solidFill>
+                  <a:schemeClr val="bg1"/>
+                </a:solidFill>
+              </a:rPr>
+              <a:t>Profile taken </a:t>
+            </a:r>
+            <a:r>
+              <a:rPr lang="en-GB" sz="2400" dirty="0" smtClean="0">
+                <a:solidFill>
+                  <a:schemeClr val="bg1"/>
+                </a:solidFill>
+              </a:rPr>
+              <a:t>‘far’ from </a:t>
+            </a:r>
+            <a:r>
+              <a:rPr lang="en-GB" sz="2400" dirty="0" smtClean="0">
+                <a:solidFill>
+                  <a:schemeClr val="bg1"/>
+                </a:solidFill>
+              </a:rPr>
+              <a:t>inclusion</a:t>
+            </a:r>
+            <a:endParaRPr lang="en-GB" sz="2400" dirty="0">
+              <a:solidFill>
+                <a:schemeClr val="bg1"/>
+              </a:solidFill>
+            </a:endParaRPr>
+          </a:p>
+        </p:txBody>
+      </p:sp>
+      <p:sp>
+        <p:nvSpPr>
+          <p:cNvPr id="22" name="TextBox 21"/>
+          <p:cNvSpPr txBox="1"/>
+          <p:nvPr/>
+        </p:nvSpPr>
+        <p:spPr>
+          <a:xfrm>
+            <a:off x="2105857" y="6239719"/>
+            <a:ext cx="6901685" cy="461665"/>
+          </a:xfrm>
+          <a:prstGeom prst="rect">
+            <a:avLst/>
+          </a:prstGeom>
+          <a:noFill/>
+        </p:spPr>
+        <p:txBody>
+          <a:bodyPr wrap="square" rtlCol="0">
+            <a:spAutoFit/>
+          </a:bodyPr>
+          <a:lstStyle/>
+          <a:p>
+            <a:pPr algn="ctr"/>
+            <a:r>
+              <a:rPr lang="en-GB" sz="2400" dirty="0" smtClean="0"/>
+              <a:t>X (µm)</a:t>
+            </a:r>
+            <a:endParaRPr lang="en-GB" sz="2400" dirty="0"/>
+          </a:p>
+        </p:txBody>
+      </p:sp>
+      <p:sp>
+        <p:nvSpPr>
+          <p:cNvPr id="23" name="TextBox 22"/>
+          <p:cNvSpPr txBox="1"/>
+          <p:nvPr/>
+        </p:nvSpPr>
+        <p:spPr>
+          <a:xfrm>
+            <a:off x="377625" y="3171632"/>
+            <a:ext cx="1100447" cy="830997"/>
+          </a:xfrm>
+          <a:prstGeom prst="rect">
+            <a:avLst/>
+          </a:prstGeom>
+          <a:noFill/>
+        </p:spPr>
+        <p:txBody>
+          <a:bodyPr wrap="square" rtlCol="0">
+            <a:spAutoFit/>
+          </a:bodyPr>
+          <a:lstStyle/>
+          <a:p>
+            <a:r>
+              <a:rPr lang="en-GB" sz="2400" dirty="0" smtClean="0"/>
+              <a:t>Y  (µm)</a:t>
+            </a:r>
+          </a:p>
+          <a:p>
+            <a:r>
+              <a:rPr lang="en-GB" sz="2400" dirty="0" smtClean="0"/>
+              <a:t> </a:t>
+            </a:r>
+            <a:endParaRPr lang="en-GB" sz="2400" dirty="0"/>
+          </a:p>
+        </p:txBody>
+      </p:sp>
+      <p:sp>
+        <p:nvSpPr>
+          <p:cNvPr id="24" name="TextBox 23"/>
+          <p:cNvSpPr txBox="1"/>
+          <p:nvPr/>
+        </p:nvSpPr>
+        <p:spPr>
+          <a:xfrm>
+            <a:off x="4259882" y="2360756"/>
+            <a:ext cx="398665" cy="584775"/>
+          </a:xfrm>
+          <a:prstGeom prst="rect">
+            <a:avLst/>
+          </a:prstGeom>
+          <a:noFill/>
+        </p:spPr>
+        <p:txBody>
+          <a:bodyPr wrap="square" rtlCol="0">
+            <a:spAutoFit/>
+          </a:bodyPr>
+          <a:lstStyle/>
+          <a:p>
+            <a:r>
+              <a:rPr lang="en-GB" sz="3200" dirty="0" smtClean="0">
+                <a:solidFill>
+                  <a:schemeClr val="bg1"/>
+                </a:solidFill>
+              </a:rPr>
+              <a:t>1</a:t>
+            </a:r>
+            <a:endParaRPr lang="en-GB" sz="3200" dirty="0">
+              <a:solidFill>
+                <a:schemeClr val="bg1"/>
+              </a:solidFill>
+            </a:endParaRPr>
+          </a:p>
+        </p:txBody>
+      </p:sp>
+      <p:sp>
+        <p:nvSpPr>
+          <p:cNvPr id="25" name="TextBox 24"/>
+          <p:cNvSpPr txBox="1"/>
+          <p:nvPr/>
+        </p:nvSpPr>
+        <p:spPr>
+          <a:xfrm>
+            <a:off x="3608121" y="3117353"/>
+            <a:ext cx="1083243" cy="584775"/>
+          </a:xfrm>
+          <a:prstGeom prst="rect">
+            <a:avLst/>
+          </a:prstGeom>
+          <a:noFill/>
+        </p:spPr>
+        <p:txBody>
+          <a:bodyPr wrap="square" rtlCol="0">
+            <a:spAutoFit/>
+          </a:bodyPr>
+          <a:lstStyle/>
+          <a:p>
+            <a:r>
+              <a:rPr lang="en-GB" sz="3200" dirty="0" smtClean="0">
+                <a:solidFill>
+                  <a:schemeClr val="bg1"/>
+                </a:solidFill>
+              </a:rPr>
+              <a:t>QW2</a:t>
+            </a:r>
+            <a:endParaRPr lang="en-GB" sz="3200" dirty="0">
+              <a:solidFill>
+                <a:schemeClr val="bg1"/>
+              </a:solidFill>
+            </a:endParaRPr>
+          </a:p>
+        </p:txBody>
+      </p:sp>
+      <p:sp>
+        <p:nvSpPr>
+          <p:cNvPr id="26" name="TextBox 25"/>
+          <p:cNvSpPr txBox="1"/>
+          <p:nvPr/>
+        </p:nvSpPr>
+        <p:spPr>
+          <a:xfrm>
+            <a:off x="3608121" y="3832202"/>
+            <a:ext cx="1083243" cy="584775"/>
+          </a:xfrm>
+          <a:prstGeom prst="rect">
+            <a:avLst/>
+          </a:prstGeom>
+          <a:noFill/>
+        </p:spPr>
+        <p:txBody>
+          <a:bodyPr wrap="square" rtlCol="0">
+            <a:spAutoFit/>
+          </a:bodyPr>
+          <a:lstStyle/>
+          <a:p>
+            <a:r>
+              <a:rPr lang="en-GB" sz="3200" dirty="0" smtClean="0">
+                <a:solidFill>
+                  <a:schemeClr val="bg1"/>
+                </a:solidFill>
+              </a:rPr>
+              <a:t>QW3</a:t>
+            </a:r>
+            <a:endParaRPr lang="en-GB" sz="3200" dirty="0">
+              <a:solidFill>
+                <a:schemeClr val="bg1"/>
+              </a:solidFill>
+            </a:endParaRPr>
+          </a:p>
+        </p:txBody>
+      </p:sp>
+      <p:sp>
+        <p:nvSpPr>
+          <p:cNvPr id="27" name="TextBox 26"/>
+          <p:cNvSpPr txBox="1"/>
+          <p:nvPr/>
+        </p:nvSpPr>
+        <p:spPr>
+          <a:xfrm>
+            <a:off x="3608120" y="4512494"/>
+            <a:ext cx="1083243" cy="584775"/>
+          </a:xfrm>
+          <a:prstGeom prst="rect">
+            <a:avLst/>
+          </a:prstGeom>
+          <a:noFill/>
+        </p:spPr>
+        <p:txBody>
+          <a:bodyPr wrap="square" rtlCol="0">
+            <a:spAutoFit/>
+          </a:bodyPr>
+          <a:lstStyle/>
+          <a:p>
+            <a:r>
+              <a:rPr lang="en-GB" sz="3200" dirty="0" smtClean="0">
+                <a:solidFill>
+                  <a:schemeClr val="bg1"/>
+                </a:solidFill>
+              </a:rPr>
+              <a:t>QW4</a:t>
+            </a:r>
+            <a:endParaRPr lang="en-GB" sz="3200" dirty="0">
+              <a:solidFill>
+                <a:schemeClr val="bg1"/>
+              </a:solidFill>
+            </a:endParaRPr>
+          </a:p>
+        </p:txBody>
+      </p:sp>
+      <p:sp>
+        <p:nvSpPr>
+          <p:cNvPr id="28" name="TextBox 27"/>
+          <p:cNvSpPr txBox="1"/>
+          <p:nvPr/>
+        </p:nvSpPr>
+        <p:spPr>
+          <a:xfrm>
+            <a:off x="3608119" y="5233304"/>
+            <a:ext cx="1083243" cy="584775"/>
+          </a:xfrm>
+          <a:prstGeom prst="rect">
+            <a:avLst/>
+          </a:prstGeom>
+          <a:noFill/>
+        </p:spPr>
+        <p:txBody>
+          <a:bodyPr wrap="square" rtlCol="0">
+            <a:spAutoFit/>
+          </a:bodyPr>
+          <a:lstStyle/>
+          <a:p>
+            <a:r>
+              <a:rPr lang="en-GB" sz="3200" dirty="0" smtClean="0">
+                <a:solidFill>
+                  <a:schemeClr val="bg1"/>
+                </a:solidFill>
+              </a:rPr>
+              <a:t>QW5</a:t>
+            </a:r>
+            <a:endParaRPr lang="en-GB" sz="3200" dirty="0">
+              <a:solidFill>
+                <a:schemeClr val="bg1"/>
+              </a:solidFill>
+            </a:endParaRPr>
+          </a:p>
+        </p:txBody>
+      </p:sp>
+    </p:spTree>
+    <p:extLst>
+      <p:ext uri="{BB962C8B-B14F-4D97-AF65-F5344CB8AC3E}">
+        <p14:creationId xmlns:p14="http://schemas.microsoft.com/office/powerpoint/2010/main" val="1753351256"/>
+      </p:ext>
+    </p:extLst>
+  </p:cSld>
+  <p:clrMapOvr>
+    <a:masterClrMapping/>
+  </p:clrMapOvr>
+  <p:timing>
+    <p:tnLst>
+      <p:par>
+        <p:cTn id="1" dur="indefinite" restart="never" nodeType="tmRoot"/>
+      </p:par>
+    </p:tnLst>
+  </p:timing>
+</p:sld>
+</file>
+
+<file path=ppt/slides/slide6.xml><?xml version="1.0" encoding="utf-8"?>
+<p:sld xmlns:a="http://schemas.openxmlformats.org/drawingml/2006/main" xmlns:r="http://schemas.openxmlformats.org/officeDocument/2006/relationships" xmlns:p="http://schemas.openxmlformats.org/presentationml/2006/main">
+  <p:cSld>
+    <p:spTree>
+      <p:nvGrpSpPr>
+        <p:cNvPr id="1" name=""/>
+        <p:cNvGrpSpPr/>
+        <p:nvPr/>
+      </p:nvGrpSpPr>
+      <p:grpSpPr>
+        <a:xfrm>
+          <a:off x="0" y="0"/>
+          <a:ext cx="0" cy="0"/>
+          <a:chOff x="0" y="0"/>
+          <a:chExt cx="0" cy="0"/>
+        </a:xfrm>
+      </p:grpSpPr>
+      <p:pic>
+        <p:nvPicPr>
+          <p:cNvPr id="4" name="Picture 3"/>
+          <p:cNvPicPr>
+            <a:picLocks noChangeAspect="1"/>
+          </p:cNvPicPr>
+          <p:nvPr/>
+        </p:nvPicPr>
+        <p:blipFill>
+          <a:blip r:embed="rId2" cstate="print">
+            <a:extLst>
+              <a:ext uri="{28A0092B-C50C-407E-A947-70E740481C1C}">
+                <a14:useLocalDpi xmlns:a14="http://schemas.microsoft.com/office/drawing/2010/main" val="0"/>
+              </a:ext>
+            </a:extLst>
+          </a:blip>
+          <a:stretch>
+            <a:fillRect/>
+          </a:stretch>
+        </p:blipFill>
+        <p:spPr>
+          <a:xfrm>
+            <a:off x="1523990" y="228593"/>
+            <a:ext cx="9144019" cy="6400813"/>
+          </a:xfrm>
+          <a:prstGeom prst="rect">
+            <a:avLst/>
+          </a:prstGeom>
+        </p:spPr>
+      </p:pic>
+      <p:sp>
+        <p:nvSpPr>
+          <p:cNvPr id="5" name="TextBox 4"/>
+          <p:cNvSpPr txBox="1"/>
+          <p:nvPr/>
+        </p:nvSpPr>
+        <p:spPr>
+          <a:xfrm>
+            <a:off x="3260649" y="4316834"/>
+            <a:ext cx="1083243" cy="584775"/>
+          </a:xfrm>
+          <a:prstGeom prst="rect">
+            <a:avLst/>
+          </a:prstGeom>
+          <a:noFill/>
+        </p:spPr>
+        <p:txBody>
+          <a:bodyPr wrap="square" rtlCol="0">
+            <a:spAutoFit/>
+          </a:bodyPr>
+          <a:lstStyle/>
+          <a:p>
+            <a:r>
+              <a:rPr lang="en-GB" sz="3200" dirty="0" smtClean="0"/>
+              <a:t>QW1</a:t>
+            </a:r>
+            <a:endParaRPr lang="en-GB" sz="3200" dirty="0"/>
+          </a:p>
+        </p:txBody>
+      </p:sp>
+      <p:sp>
+        <p:nvSpPr>
+          <p:cNvPr id="6" name="TextBox 5"/>
+          <p:cNvSpPr txBox="1"/>
+          <p:nvPr/>
+        </p:nvSpPr>
+        <p:spPr>
+          <a:xfrm>
+            <a:off x="4437177" y="4316833"/>
+            <a:ext cx="1083243" cy="584775"/>
+          </a:xfrm>
+          <a:prstGeom prst="rect">
+            <a:avLst/>
+          </a:prstGeom>
+          <a:noFill/>
+        </p:spPr>
+        <p:txBody>
+          <a:bodyPr wrap="square" rtlCol="0">
+            <a:spAutoFit/>
+          </a:bodyPr>
+          <a:lstStyle/>
+          <a:p>
+            <a:r>
+              <a:rPr lang="en-GB" sz="3200" dirty="0" smtClean="0"/>
+              <a:t>QW2</a:t>
+            </a:r>
+            <a:endParaRPr lang="en-GB" sz="3200" dirty="0"/>
+          </a:p>
+        </p:txBody>
+      </p:sp>
+      <p:sp>
+        <p:nvSpPr>
+          <p:cNvPr id="7" name="TextBox 6"/>
+          <p:cNvSpPr txBox="1"/>
+          <p:nvPr/>
+        </p:nvSpPr>
+        <p:spPr>
+          <a:xfrm>
+            <a:off x="5554377" y="3618841"/>
+            <a:ext cx="1083243" cy="584775"/>
+          </a:xfrm>
+          <a:prstGeom prst="rect">
+            <a:avLst/>
+          </a:prstGeom>
+          <a:noFill/>
+        </p:spPr>
+        <p:txBody>
+          <a:bodyPr wrap="square" rtlCol="0">
+            <a:spAutoFit/>
+          </a:bodyPr>
+          <a:lstStyle/>
+          <a:p>
+            <a:r>
+              <a:rPr lang="en-GB" sz="3200" dirty="0" smtClean="0"/>
+              <a:t>QW3</a:t>
+            </a:r>
+            <a:endParaRPr lang="en-GB" sz="3200" dirty="0"/>
+          </a:p>
+        </p:txBody>
+      </p:sp>
+      <p:sp>
+        <p:nvSpPr>
+          <p:cNvPr id="8" name="TextBox 7"/>
+          <p:cNvSpPr txBox="1"/>
+          <p:nvPr/>
+        </p:nvSpPr>
+        <p:spPr>
+          <a:xfrm>
+            <a:off x="6765849" y="2347825"/>
+            <a:ext cx="1083243" cy="584775"/>
+          </a:xfrm>
+          <a:prstGeom prst="rect">
+            <a:avLst/>
+          </a:prstGeom>
+          <a:noFill/>
+        </p:spPr>
+        <p:txBody>
+          <a:bodyPr wrap="square" rtlCol="0">
+            <a:spAutoFit/>
+          </a:bodyPr>
+          <a:lstStyle/>
+          <a:p>
+            <a:r>
+              <a:rPr lang="en-GB" sz="3200" dirty="0" smtClean="0"/>
+              <a:t>QW4</a:t>
+            </a:r>
+            <a:endParaRPr lang="en-GB" sz="3200" dirty="0"/>
+          </a:p>
+        </p:txBody>
+      </p:sp>
+      <p:sp>
+        <p:nvSpPr>
+          <p:cNvPr id="9" name="TextBox 8"/>
+          <p:cNvSpPr txBox="1"/>
+          <p:nvPr/>
+        </p:nvSpPr>
+        <p:spPr>
+          <a:xfrm>
+            <a:off x="8491017" y="772009"/>
+            <a:ext cx="1083243" cy="584775"/>
+          </a:xfrm>
+          <a:prstGeom prst="rect">
+            <a:avLst/>
+          </a:prstGeom>
+          <a:noFill/>
+        </p:spPr>
+        <p:txBody>
+          <a:bodyPr wrap="square" rtlCol="0">
+            <a:spAutoFit/>
+          </a:bodyPr>
+          <a:lstStyle/>
+          <a:p>
+            <a:r>
+              <a:rPr lang="en-GB" sz="3200" dirty="0" smtClean="0"/>
+              <a:t>QW5</a:t>
+            </a:r>
+            <a:endParaRPr lang="en-GB" sz="3200" dirty="0"/>
+          </a:p>
+        </p:txBody>
+      </p:sp>
+    </p:spTree>
+    <p:extLst>
+      <p:ext uri="{BB962C8B-B14F-4D97-AF65-F5344CB8AC3E}">
+        <p14:creationId xmlns:p14="http://schemas.microsoft.com/office/powerpoint/2010/main" val="2884374482"/>
       </p:ext>
     </p:extLst>
   </p:cSld>

</xml_diff>

<commit_message>
Ch3- EDX and APSYS correcitons
Ch3- EDX and APSYS correcitons
</commit_message>
<xml_diff>
--- a/Figs/Correction-Figs/Presentation1.pptx
+++ b/Figs/Correction-Figs/Presentation1.pptx
@@ -9,8 +9,14 @@
     <p:sldId id="257" r:id="rId3"/>
     <p:sldId id="258" r:id="rId4"/>
     <p:sldId id="261" r:id="rId5"/>
-    <p:sldId id="259" r:id="rId6"/>
-    <p:sldId id="260" r:id="rId7"/>
+    <p:sldId id="265" r:id="rId6"/>
+    <p:sldId id="264" r:id="rId7"/>
+    <p:sldId id="259" r:id="rId8"/>
+    <p:sldId id="260" r:id="rId9"/>
+    <p:sldId id="263" r:id="rId10"/>
+    <p:sldId id="266" r:id="rId11"/>
+    <p:sldId id="262" r:id="rId12"/>
+    <p:sldId id="267" r:id="rId13"/>
   </p:sldIdLst>
   <p:sldSz cx="12192000" cy="6858000"/>
   <p:notesSz cx="6858000" cy="9144000"/>
@@ -159,7 +165,7 @@
           </a:lstStyle>
           <a:p>
             <a:r>
-              <a:rPr lang="en-US" smtClean="0"/>
+              <a:rPr lang="en-US"/>
               <a:t>Click to edit Master title style</a:t>
             </a:r>
             <a:endParaRPr lang="en-GB"/>
@@ -224,7 +230,7 @@
           </a:lstStyle>
           <a:p>
             <a:r>
-              <a:rPr lang="en-US" smtClean="0"/>
+              <a:rPr lang="en-US"/>
               <a:t>Click to edit Master subtitle style</a:t>
             </a:r>
             <a:endParaRPr lang="en-GB"/>
@@ -248,7 +254,7 @@
           <a:p>
             <a:fld id="{102B808B-2D38-421D-9FDF-2C2569731BC7}" type="datetimeFigureOut">
               <a:rPr lang="en-GB" smtClean="0"/>
-              <a:t>17/03/2017</a:t>
+              <a:t>20/03/2017</a:t>
             </a:fld>
             <a:endParaRPr lang="en-GB"/>
           </a:p>
@@ -342,7 +348,7 @@
           <a:lstStyle/>
           <a:p>
             <a:r>
-              <a:rPr lang="en-US" smtClean="0"/>
+              <a:rPr lang="en-US"/>
               <a:t>Click to edit Master title style</a:t>
             </a:r>
             <a:endParaRPr lang="en-GB"/>
@@ -366,35 +372,35 @@
           <a:p>
             <a:pPr lvl="0"/>
             <a:r>
-              <a:rPr lang="en-US" smtClean="0"/>
+              <a:rPr lang="en-US"/>
               <a:t>Click to edit Master text styles</a:t>
             </a:r>
           </a:p>
           <a:p>
             <a:pPr lvl="1"/>
             <a:r>
-              <a:rPr lang="en-US" smtClean="0"/>
+              <a:rPr lang="en-US"/>
               <a:t>Second level</a:t>
             </a:r>
           </a:p>
           <a:p>
             <a:pPr lvl="2"/>
             <a:r>
-              <a:rPr lang="en-US" smtClean="0"/>
+              <a:rPr lang="en-US"/>
               <a:t>Third level</a:t>
             </a:r>
           </a:p>
           <a:p>
             <a:pPr lvl="3"/>
             <a:r>
-              <a:rPr lang="en-US" smtClean="0"/>
+              <a:rPr lang="en-US"/>
               <a:t>Fourth level</a:t>
             </a:r>
           </a:p>
           <a:p>
             <a:pPr lvl="4"/>
             <a:r>
-              <a:rPr lang="en-US" smtClean="0"/>
+              <a:rPr lang="en-US"/>
               <a:t>Fifth level</a:t>
             </a:r>
             <a:endParaRPr lang="en-GB"/>
@@ -418,7 +424,7 @@
           <a:p>
             <a:fld id="{102B808B-2D38-421D-9FDF-2C2569731BC7}" type="datetimeFigureOut">
               <a:rPr lang="en-GB" smtClean="0"/>
-              <a:t>17/03/2017</a:t>
+              <a:t>20/03/2017</a:t>
             </a:fld>
             <a:endParaRPr lang="en-GB"/>
           </a:p>
@@ -517,7 +523,7 @@
           <a:lstStyle/>
           <a:p>
             <a:r>
-              <a:rPr lang="en-US" smtClean="0"/>
+              <a:rPr lang="en-US"/>
               <a:t>Click to edit Master title style</a:t>
             </a:r>
             <a:endParaRPr lang="en-GB"/>
@@ -546,35 +552,35 @@
           <a:p>
             <a:pPr lvl="0"/>
             <a:r>
-              <a:rPr lang="en-US" smtClean="0"/>
+              <a:rPr lang="en-US"/>
               <a:t>Click to edit Master text styles</a:t>
             </a:r>
           </a:p>
           <a:p>
             <a:pPr lvl="1"/>
             <a:r>
-              <a:rPr lang="en-US" smtClean="0"/>
+              <a:rPr lang="en-US"/>
               <a:t>Second level</a:t>
             </a:r>
           </a:p>
           <a:p>
             <a:pPr lvl="2"/>
             <a:r>
-              <a:rPr lang="en-US" smtClean="0"/>
+              <a:rPr lang="en-US"/>
               <a:t>Third level</a:t>
             </a:r>
           </a:p>
           <a:p>
             <a:pPr lvl="3"/>
             <a:r>
-              <a:rPr lang="en-US" smtClean="0"/>
+              <a:rPr lang="en-US"/>
               <a:t>Fourth level</a:t>
             </a:r>
           </a:p>
           <a:p>
             <a:pPr lvl="4"/>
             <a:r>
-              <a:rPr lang="en-US" smtClean="0"/>
+              <a:rPr lang="en-US"/>
               <a:t>Fifth level</a:t>
             </a:r>
             <a:endParaRPr lang="en-GB"/>
@@ -598,7 +604,7 @@
           <a:p>
             <a:fld id="{102B808B-2D38-421D-9FDF-2C2569731BC7}" type="datetimeFigureOut">
               <a:rPr lang="en-GB" smtClean="0"/>
-              <a:t>17/03/2017</a:t>
+              <a:t>20/03/2017</a:t>
             </a:fld>
             <a:endParaRPr lang="en-GB"/>
           </a:p>
@@ -692,7 +698,7 @@
           <a:lstStyle/>
           <a:p>
             <a:r>
-              <a:rPr lang="en-US" smtClean="0"/>
+              <a:rPr lang="en-US"/>
               <a:t>Click to edit Master title style</a:t>
             </a:r>
             <a:endParaRPr lang="en-GB"/>
@@ -716,35 +722,35 @@
           <a:p>
             <a:pPr lvl="0"/>
             <a:r>
-              <a:rPr lang="en-US" smtClean="0"/>
+              <a:rPr lang="en-US"/>
               <a:t>Click to edit Master text styles</a:t>
             </a:r>
           </a:p>
           <a:p>
             <a:pPr lvl="1"/>
             <a:r>
-              <a:rPr lang="en-US" smtClean="0"/>
+              <a:rPr lang="en-US"/>
               <a:t>Second level</a:t>
             </a:r>
           </a:p>
           <a:p>
             <a:pPr lvl="2"/>
             <a:r>
-              <a:rPr lang="en-US" smtClean="0"/>
+              <a:rPr lang="en-US"/>
               <a:t>Third level</a:t>
             </a:r>
           </a:p>
           <a:p>
             <a:pPr lvl="3"/>
             <a:r>
-              <a:rPr lang="en-US" smtClean="0"/>
+              <a:rPr lang="en-US"/>
               <a:t>Fourth level</a:t>
             </a:r>
           </a:p>
           <a:p>
             <a:pPr lvl="4"/>
             <a:r>
-              <a:rPr lang="en-US" smtClean="0"/>
+              <a:rPr lang="en-US"/>
               <a:t>Fifth level</a:t>
             </a:r>
             <a:endParaRPr lang="en-GB"/>
@@ -768,7 +774,7 @@
           <a:p>
             <a:fld id="{102B808B-2D38-421D-9FDF-2C2569731BC7}" type="datetimeFigureOut">
               <a:rPr lang="en-GB" smtClean="0"/>
-              <a:t>17/03/2017</a:t>
+              <a:t>20/03/2017</a:t>
             </a:fld>
             <a:endParaRPr lang="en-GB"/>
           </a:p>
@@ -871,7 +877,7 @@
           </a:lstStyle>
           <a:p>
             <a:r>
-              <a:rPr lang="en-US" smtClean="0"/>
+              <a:rPr lang="en-US"/>
               <a:t>Click to edit Master title style</a:t>
             </a:r>
             <a:endParaRPr lang="en-GB"/>
@@ -991,7 +997,7 @@
           <a:p>
             <a:pPr lvl="0"/>
             <a:r>
-              <a:rPr lang="en-US" smtClean="0"/>
+              <a:rPr lang="en-US"/>
               <a:t>Click to edit Master text styles</a:t>
             </a:r>
           </a:p>
@@ -1014,7 +1020,7 @@
           <a:p>
             <a:fld id="{102B808B-2D38-421D-9FDF-2C2569731BC7}" type="datetimeFigureOut">
               <a:rPr lang="en-GB" smtClean="0"/>
-              <a:t>17/03/2017</a:t>
+              <a:t>20/03/2017</a:t>
             </a:fld>
             <a:endParaRPr lang="en-GB"/>
           </a:p>
@@ -1108,7 +1114,7 @@
           <a:lstStyle/>
           <a:p>
             <a:r>
-              <a:rPr lang="en-US" smtClean="0"/>
+              <a:rPr lang="en-US"/>
               <a:t>Click to edit Master title style</a:t>
             </a:r>
             <a:endParaRPr lang="en-GB"/>
@@ -1137,35 +1143,35 @@
           <a:p>
             <a:pPr lvl="0"/>
             <a:r>
-              <a:rPr lang="en-US" smtClean="0"/>
+              <a:rPr lang="en-US"/>
               <a:t>Click to edit Master text styles</a:t>
             </a:r>
           </a:p>
           <a:p>
             <a:pPr lvl="1"/>
             <a:r>
-              <a:rPr lang="en-US" smtClean="0"/>
+              <a:rPr lang="en-US"/>
               <a:t>Second level</a:t>
             </a:r>
           </a:p>
           <a:p>
             <a:pPr lvl="2"/>
             <a:r>
-              <a:rPr lang="en-US" smtClean="0"/>
+              <a:rPr lang="en-US"/>
               <a:t>Third level</a:t>
             </a:r>
           </a:p>
           <a:p>
             <a:pPr lvl="3"/>
             <a:r>
-              <a:rPr lang="en-US" smtClean="0"/>
+              <a:rPr lang="en-US"/>
               <a:t>Fourth level</a:t>
             </a:r>
           </a:p>
           <a:p>
             <a:pPr lvl="4"/>
             <a:r>
-              <a:rPr lang="en-US" smtClean="0"/>
+              <a:rPr lang="en-US"/>
               <a:t>Fifth level</a:t>
             </a:r>
             <a:endParaRPr lang="en-GB"/>
@@ -1194,35 +1200,35 @@
           <a:p>
             <a:pPr lvl="0"/>
             <a:r>
-              <a:rPr lang="en-US" smtClean="0"/>
+              <a:rPr lang="en-US"/>
               <a:t>Click to edit Master text styles</a:t>
             </a:r>
           </a:p>
           <a:p>
             <a:pPr lvl="1"/>
             <a:r>
-              <a:rPr lang="en-US" smtClean="0"/>
+              <a:rPr lang="en-US"/>
               <a:t>Second level</a:t>
             </a:r>
           </a:p>
           <a:p>
             <a:pPr lvl="2"/>
             <a:r>
-              <a:rPr lang="en-US" smtClean="0"/>
+              <a:rPr lang="en-US"/>
               <a:t>Third level</a:t>
             </a:r>
           </a:p>
           <a:p>
             <a:pPr lvl="3"/>
             <a:r>
-              <a:rPr lang="en-US" smtClean="0"/>
+              <a:rPr lang="en-US"/>
               <a:t>Fourth level</a:t>
             </a:r>
           </a:p>
           <a:p>
             <a:pPr lvl="4"/>
             <a:r>
-              <a:rPr lang="en-US" smtClean="0"/>
+              <a:rPr lang="en-US"/>
               <a:t>Fifth level</a:t>
             </a:r>
             <a:endParaRPr lang="en-GB"/>
@@ -1246,7 +1252,7 @@
           <a:p>
             <a:fld id="{102B808B-2D38-421D-9FDF-2C2569731BC7}" type="datetimeFigureOut">
               <a:rPr lang="en-GB" smtClean="0"/>
-              <a:t>17/03/2017</a:t>
+              <a:t>20/03/2017</a:t>
             </a:fld>
             <a:endParaRPr lang="en-GB"/>
           </a:p>
@@ -1345,7 +1351,7 @@
           <a:lstStyle/>
           <a:p>
             <a:r>
-              <a:rPr lang="en-US" smtClean="0"/>
+              <a:rPr lang="en-US"/>
               <a:t>Click to edit Master title style</a:t>
             </a:r>
             <a:endParaRPr lang="en-GB"/>
@@ -1411,7 +1417,7 @@
           <a:p>
             <a:pPr lvl="0"/>
             <a:r>
-              <a:rPr lang="en-US" smtClean="0"/>
+              <a:rPr lang="en-US"/>
               <a:t>Click to edit Master text styles</a:t>
             </a:r>
           </a:p>
@@ -1439,35 +1445,35 @@
           <a:p>
             <a:pPr lvl="0"/>
             <a:r>
-              <a:rPr lang="en-US" smtClean="0"/>
+              <a:rPr lang="en-US"/>
               <a:t>Click to edit Master text styles</a:t>
             </a:r>
           </a:p>
           <a:p>
             <a:pPr lvl="1"/>
             <a:r>
-              <a:rPr lang="en-US" smtClean="0"/>
+              <a:rPr lang="en-US"/>
               <a:t>Second level</a:t>
             </a:r>
           </a:p>
           <a:p>
             <a:pPr lvl="2"/>
             <a:r>
-              <a:rPr lang="en-US" smtClean="0"/>
+              <a:rPr lang="en-US"/>
               <a:t>Third level</a:t>
             </a:r>
           </a:p>
           <a:p>
             <a:pPr lvl="3"/>
             <a:r>
-              <a:rPr lang="en-US" smtClean="0"/>
+              <a:rPr lang="en-US"/>
               <a:t>Fourth level</a:t>
             </a:r>
           </a:p>
           <a:p>
             <a:pPr lvl="4"/>
             <a:r>
-              <a:rPr lang="en-US" smtClean="0"/>
+              <a:rPr lang="en-US"/>
               <a:t>Fifth level</a:t>
             </a:r>
             <a:endParaRPr lang="en-GB"/>
@@ -1533,7 +1539,7 @@
           <a:p>
             <a:pPr lvl="0"/>
             <a:r>
-              <a:rPr lang="en-US" smtClean="0"/>
+              <a:rPr lang="en-US"/>
               <a:t>Click to edit Master text styles</a:t>
             </a:r>
           </a:p>
@@ -1561,35 +1567,35 @@
           <a:p>
             <a:pPr lvl="0"/>
             <a:r>
-              <a:rPr lang="en-US" smtClean="0"/>
+              <a:rPr lang="en-US"/>
               <a:t>Click to edit Master text styles</a:t>
             </a:r>
           </a:p>
           <a:p>
             <a:pPr lvl="1"/>
             <a:r>
-              <a:rPr lang="en-US" smtClean="0"/>
+              <a:rPr lang="en-US"/>
               <a:t>Second level</a:t>
             </a:r>
           </a:p>
           <a:p>
             <a:pPr lvl="2"/>
             <a:r>
-              <a:rPr lang="en-US" smtClean="0"/>
+              <a:rPr lang="en-US"/>
               <a:t>Third level</a:t>
             </a:r>
           </a:p>
           <a:p>
             <a:pPr lvl="3"/>
             <a:r>
-              <a:rPr lang="en-US" smtClean="0"/>
+              <a:rPr lang="en-US"/>
               <a:t>Fourth level</a:t>
             </a:r>
           </a:p>
           <a:p>
             <a:pPr lvl="4"/>
             <a:r>
-              <a:rPr lang="en-US" smtClean="0"/>
+              <a:rPr lang="en-US"/>
               <a:t>Fifth level</a:t>
             </a:r>
             <a:endParaRPr lang="en-GB"/>
@@ -1613,7 +1619,7 @@
           <a:p>
             <a:fld id="{102B808B-2D38-421D-9FDF-2C2569731BC7}" type="datetimeFigureOut">
               <a:rPr lang="en-GB" smtClean="0"/>
-              <a:t>17/03/2017</a:t>
+              <a:t>20/03/2017</a:t>
             </a:fld>
             <a:endParaRPr lang="en-GB"/>
           </a:p>
@@ -1707,7 +1713,7 @@
           <a:lstStyle/>
           <a:p>
             <a:r>
-              <a:rPr lang="en-US" smtClean="0"/>
+              <a:rPr lang="en-US"/>
               <a:t>Click to edit Master title style</a:t>
             </a:r>
             <a:endParaRPr lang="en-GB"/>
@@ -1731,7 +1737,7 @@
           <a:p>
             <a:fld id="{102B808B-2D38-421D-9FDF-2C2569731BC7}" type="datetimeFigureOut">
               <a:rPr lang="en-GB" smtClean="0"/>
-              <a:t>17/03/2017</a:t>
+              <a:t>20/03/2017</a:t>
             </a:fld>
             <a:endParaRPr lang="en-GB"/>
           </a:p>
@@ -1826,7 +1832,7 @@
           <a:p>
             <a:fld id="{102B808B-2D38-421D-9FDF-2C2569731BC7}" type="datetimeFigureOut">
               <a:rPr lang="en-GB" smtClean="0"/>
-              <a:t>17/03/2017</a:t>
+              <a:t>20/03/2017</a:t>
             </a:fld>
             <a:endParaRPr lang="en-GB"/>
           </a:p>
@@ -1929,7 +1935,7 @@
           </a:lstStyle>
           <a:p>
             <a:r>
-              <a:rPr lang="en-US" smtClean="0"/>
+              <a:rPr lang="en-US"/>
               <a:t>Click to edit Master title style</a:t>
             </a:r>
             <a:endParaRPr lang="en-GB"/>
@@ -1986,35 +1992,35 @@
           <a:p>
             <a:pPr lvl="0"/>
             <a:r>
-              <a:rPr lang="en-US" smtClean="0"/>
+              <a:rPr lang="en-US"/>
               <a:t>Click to edit Master text styles</a:t>
             </a:r>
           </a:p>
           <a:p>
             <a:pPr lvl="1"/>
             <a:r>
-              <a:rPr lang="en-US" smtClean="0"/>
+              <a:rPr lang="en-US"/>
               <a:t>Second level</a:t>
             </a:r>
           </a:p>
           <a:p>
             <a:pPr lvl="2"/>
             <a:r>
-              <a:rPr lang="en-US" smtClean="0"/>
+              <a:rPr lang="en-US"/>
               <a:t>Third level</a:t>
             </a:r>
           </a:p>
           <a:p>
             <a:pPr lvl="3"/>
             <a:r>
-              <a:rPr lang="en-US" smtClean="0"/>
+              <a:rPr lang="en-US"/>
               <a:t>Fourth level</a:t>
             </a:r>
           </a:p>
           <a:p>
             <a:pPr lvl="4"/>
             <a:r>
-              <a:rPr lang="en-US" smtClean="0"/>
+              <a:rPr lang="en-US"/>
               <a:t>Fifth level</a:t>
             </a:r>
             <a:endParaRPr lang="en-GB"/>
@@ -2080,7 +2086,7 @@
           <a:p>
             <a:pPr lvl="0"/>
             <a:r>
-              <a:rPr lang="en-US" smtClean="0"/>
+              <a:rPr lang="en-US"/>
               <a:t>Click to edit Master text styles</a:t>
             </a:r>
           </a:p>
@@ -2103,7 +2109,7 @@
           <a:p>
             <a:fld id="{102B808B-2D38-421D-9FDF-2C2569731BC7}" type="datetimeFigureOut">
               <a:rPr lang="en-GB" smtClean="0"/>
-              <a:t>17/03/2017</a:t>
+              <a:t>20/03/2017</a:t>
             </a:fld>
             <a:endParaRPr lang="en-GB"/>
           </a:p>
@@ -2206,7 +2212,7 @@
           </a:lstStyle>
           <a:p>
             <a:r>
-              <a:rPr lang="en-US" smtClean="0"/>
+              <a:rPr lang="en-US"/>
               <a:t>Click to edit Master title style</a:t>
             </a:r>
             <a:endParaRPr lang="en-GB"/>
@@ -2333,7 +2339,7 @@
           <a:p>
             <a:pPr lvl="0"/>
             <a:r>
-              <a:rPr lang="en-US" smtClean="0"/>
+              <a:rPr lang="en-US"/>
               <a:t>Click to edit Master text styles</a:t>
             </a:r>
           </a:p>
@@ -2356,7 +2362,7 @@
           <a:p>
             <a:fld id="{102B808B-2D38-421D-9FDF-2C2569731BC7}" type="datetimeFigureOut">
               <a:rPr lang="en-GB" smtClean="0"/>
-              <a:t>17/03/2017</a:t>
+              <a:t>20/03/2017</a:t>
             </a:fld>
             <a:endParaRPr lang="en-GB"/>
           </a:p>
@@ -2465,7 +2471,7 @@
           <a:lstStyle/>
           <a:p>
             <a:r>
-              <a:rPr lang="en-US" smtClean="0"/>
+              <a:rPr lang="en-US"/>
               <a:t>Click to edit Master title style</a:t>
             </a:r>
             <a:endParaRPr lang="en-GB"/>
@@ -2499,35 +2505,35 @@
           <a:p>
             <a:pPr lvl="0"/>
             <a:r>
-              <a:rPr lang="en-US" smtClean="0"/>
+              <a:rPr lang="en-US"/>
               <a:t>Click to edit Master text styles</a:t>
             </a:r>
           </a:p>
           <a:p>
             <a:pPr lvl="1"/>
             <a:r>
-              <a:rPr lang="en-US" smtClean="0"/>
+              <a:rPr lang="en-US"/>
               <a:t>Second level</a:t>
             </a:r>
           </a:p>
           <a:p>
             <a:pPr lvl="2"/>
             <a:r>
-              <a:rPr lang="en-US" smtClean="0"/>
+              <a:rPr lang="en-US"/>
               <a:t>Third level</a:t>
             </a:r>
           </a:p>
           <a:p>
             <a:pPr lvl="3"/>
             <a:r>
-              <a:rPr lang="en-US" smtClean="0"/>
+              <a:rPr lang="en-US"/>
               <a:t>Fourth level</a:t>
             </a:r>
           </a:p>
           <a:p>
             <a:pPr lvl="4"/>
             <a:r>
-              <a:rPr lang="en-US" smtClean="0"/>
+              <a:rPr lang="en-US"/>
               <a:t>Fifth level</a:t>
             </a:r>
             <a:endParaRPr lang="en-GB"/>
@@ -2569,7 +2575,7 @@
           <a:p>
             <a:fld id="{102B808B-2D38-421D-9FDF-2C2569731BC7}" type="datetimeFigureOut">
               <a:rPr lang="en-GB" smtClean="0"/>
-              <a:t>17/03/2017</a:t>
+              <a:t>20/03/2017</a:t>
             </a:fld>
             <a:endParaRPr lang="en-GB"/>
           </a:p>
@@ -3051,13 +3057,500 @@
   <p:clrMapOvr>
     <a:masterClrMapping/>
   </p:clrMapOvr>
-  <p:timing>
-    <p:tnLst>
-      <p:par>
-        <p:cTn id="1" dur="indefinite" restart="never" nodeType="tmRoot"/>
-      </p:par>
-    </p:tnLst>
-  </p:timing>
+</p:sld>
+</file>
+
+<file path=ppt/slides/slide10.xml><?xml version="1.0" encoding="utf-8"?>
+<p:sld xmlns:a="http://schemas.openxmlformats.org/drawingml/2006/main" xmlns:r="http://schemas.openxmlformats.org/officeDocument/2006/relationships" xmlns:p="http://schemas.openxmlformats.org/presentationml/2006/main">
+  <p:cSld>
+    <p:spTree>
+      <p:nvGrpSpPr>
+        <p:cNvPr id="1" name=""/>
+        <p:cNvGrpSpPr/>
+        <p:nvPr/>
+      </p:nvGrpSpPr>
+      <p:grpSpPr>
+        <a:xfrm>
+          <a:off x="0" y="0"/>
+          <a:ext cx="0" cy="0"/>
+          <a:chOff x="0" y="0"/>
+          <a:chExt cx="0" cy="0"/>
+        </a:xfrm>
+      </p:grpSpPr>
+      <p:pic>
+        <p:nvPicPr>
+          <p:cNvPr id="4" name="Picture 3"/>
+          <p:cNvPicPr>
+            <a:picLocks noChangeAspect="1"/>
+          </p:cNvPicPr>
+          <p:nvPr/>
+        </p:nvPicPr>
+        <p:blipFill>
+          <a:blip r:embed="rId2" cstate="print">
+            <a:extLst>
+              <a:ext uri="{28A0092B-C50C-407E-A947-70E740481C1C}">
+                <a14:useLocalDpi xmlns:a14="http://schemas.microsoft.com/office/drawing/2010/main" val="0"/>
+              </a:ext>
+            </a:extLst>
+          </a:blip>
+          <a:stretch>
+            <a:fillRect/>
+          </a:stretch>
+        </p:blipFill>
+        <p:spPr>
+          <a:xfrm>
+            <a:off x="1735540" y="213226"/>
+            <a:ext cx="9144019" cy="6400813"/>
+          </a:xfrm>
+          <a:prstGeom prst="rect">
+            <a:avLst/>
+          </a:prstGeom>
+        </p:spPr>
+      </p:pic>
+      <p:sp>
+        <p:nvSpPr>
+          <p:cNvPr id="5" name="TextBox 4"/>
+          <p:cNvSpPr txBox="1"/>
+          <p:nvPr/>
+        </p:nvSpPr>
+        <p:spPr>
+          <a:xfrm>
+            <a:off x="3553412" y="2563692"/>
+            <a:ext cx="1083243" cy="584775"/>
+          </a:xfrm>
+          <a:prstGeom prst="rect">
+            <a:avLst/>
+          </a:prstGeom>
+          <a:noFill/>
+        </p:spPr>
+        <p:txBody>
+          <a:bodyPr wrap="square" rtlCol="0">
+            <a:spAutoFit/>
+          </a:bodyPr>
+          <a:lstStyle/>
+          <a:p>
+            <a:r>
+              <a:rPr lang="en-GB" sz="3200" dirty="0"/>
+              <a:t>QW1</a:t>
+            </a:r>
+          </a:p>
+        </p:txBody>
+      </p:sp>
+      <p:sp>
+        <p:nvSpPr>
+          <p:cNvPr id="6" name="TextBox 5"/>
+          <p:cNvSpPr txBox="1"/>
+          <p:nvPr/>
+        </p:nvSpPr>
+        <p:spPr>
+          <a:xfrm>
+            <a:off x="4934518" y="2573751"/>
+            <a:ext cx="1083243" cy="584775"/>
+          </a:xfrm>
+          <a:prstGeom prst="rect">
+            <a:avLst/>
+          </a:prstGeom>
+          <a:noFill/>
+        </p:spPr>
+        <p:txBody>
+          <a:bodyPr wrap="square" rtlCol="0">
+            <a:spAutoFit/>
+          </a:bodyPr>
+          <a:lstStyle/>
+          <a:p>
+            <a:r>
+              <a:rPr lang="en-GB" sz="3200" dirty="0"/>
+              <a:t>QW2</a:t>
+            </a:r>
+          </a:p>
+        </p:txBody>
+      </p:sp>
+      <p:sp>
+        <p:nvSpPr>
+          <p:cNvPr id="7" name="TextBox 6"/>
+          <p:cNvSpPr txBox="1"/>
+          <p:nvPr/>
+        </p:nvSpPr>
+        <p:spPr>
+          <a:xfrm>
+            <a:off x="6225662" y="2641182"/>
+            <a:ext cx="1083243" cy="584775"/>
+          </a:xfrm>
+          <a:prstGeom prst="rect">
+            <a:avLst/>
+          </a:prstGeom>
+          <a:noFill/>
+        </p:spPr>
+        <p:txBody>
+          <a:bodyPr wrap="square" rtlCol="0">
+            <a:spAutoFit/>
+          </a:bodyPr>
+          <a:lstStyle/>
+          <a:p>
+            <a:r>
+              <a:rPr lang="en-GB" sz="3200" dirty="0"/>
+              <a:t>QW3</a:t>
+            </a:r>
+          </a:p>
+        </p:txBody>
+      </p:sp>
+      <p:sp>
+        <p:nvSpPr>
+          <p:cNvPr id="8" name="TextBox 7"/>
+          <p:cNvSpPr txBox="1"/>
+          <p:nvPr/>
+        </p:nvSpPr>
+        <p:spPr>
+          <a:xfrm>
+            <a:off x="7689588" y="3532334"/>
+            <a:ext cx="1083243" cy="584775"/>
+          </a:xfrm>
+          <a:prstGeom prst="rect">
+            <a:avLst/>
+          </a:prstGeom>
+          <a:noFill/>
+        </p:spPr>
+        <p:txBody>
+          <a:bodyPr wrap="square" rtlCol="0">
+            <a:spAutoFit/>
+          </a:bodyPr>
+          <a:lstStyle/>
+          <a:p>
+            <a:r>
+              <a:rPr lang="en-GB" sz="3200" dirty="0"/>
+              <a:t>QW4</a:t>
+            </a:r>
+          </a:p>
+        </p:txBody>
+      </p:sp>
+      <p:sp>
+        <p:nvSpPr>
+          <p:cNvPr id="9" name="TextBox 8"/>
+          <p:cNvSpPr txBox="1"/>
+          <p:nvPr/>
+        </p:nvSpPr>
+        <p:spPr>
+          <a:xfrm>
+            <a:off x="8858071" y="5177711"/>
+            <a:ext cx="1083243" cy="584775"/>
+          </a:xfrm>
+          <a:prstGeom prst="rect">
+            <a:avLst/>
+          </a:prstGeom>
+          <a:noFill/>
+        </p:spPr>
+        <p:txBody>
+          <a:bodyPr wrap="square" rtlCol="0">
+            <a:spAutoFit/>
+          </a:bodyPr>
+          <a:lstStyle/>
+          <a:p>
+            <a:r>
+              <a:rPr lang="en-GB" sz="3200" dirty="0"/>
+              <a:t>QW5</a:t>
+            </a:r>
+          </a:p>
+        </p:txBody>
+      </p:sp>
+    </p:spTree>
+    <p:extLst>
+      <p:ext uri="{BB962C8B-B14F-4D97-AF65-F5344CB8AC3E}">
+        <p14:creationId xmlns:p14="http://schemas.microsoft.com/office/powerpoint/2010/main" val="3461288848"/>
+      </p:ext>
+    </p:extLst>
+  </p:cSld>
+  <p:clrMapOvr>
+    <a:masterClrMapping/>
+  </p:clrMapOvr>
+</p:sld>
+</file>
+
+<file path=ppt/slides/slide11.xml><?xml version="1.0" encoding="utf-8"?>
+<p:sld xmlns:a="http://schemas.openxmlformats.org/drawingml/2006/main" xmlns:r="http://schemas.openxmlformats.org/officeDocument/2006/relationships" xmlns:p="http://schemas.openxmlformats.org/presentationml/2006/main">
+  <p:cSld>
+    <p:spTree>
+      <p:nvGrpSpPr>
+        <p:cNvPr id="1" name=""/>
+        <p:cNvGrpSpPr/>
+        <p:nvPr/>
+      </p:nvGrpSpPr>
+      <p:grpSpPr>
+        <a:xfrm>
+          <a:off x="0" y="0"/>
+          <a:ext cx="0" cy="0"/>
+          <a:chOff x="0" y="0"/>
+          <a:chExt cx="0" cy="0"/>
+        </a:xfrm>
+      </p:grpSpPr>
+      <p:grpSp>
+        <p:nvGrpSpPr>
+          <p:cNvPr id="10" name="Group 9"/>
+          <p:cNvGrpSpPr/>
+          <p:nvPr/>
+        </p:nvGrpSpPr>
+        <p:grpSpPr>
+          <a:xfrm>
+            <a:off x="1620287" y="158192"/>
+            <a:ext cx="7791882" cy="6440989"/>
+            <a:chOff x="1620287" y="158192"/>
+            <a:chExt cx="7791882" cy="6440989"/>
+          </a:xfrm>
+        </p:grpSpPr>
+        <p:pic>
+          <p:nvPicPr>
+            <p:cNvPr id="5" name="Picture 4"/>
+            <p:cNvPicPr>
+              <a:picLocks noChangeAspect="1"/>
+            </p:cNvPicPr>
+            <p:nvPr/>
+          </p:nvPicPr>
+          <p:blipFill>
+            <a:blip r:embed="rId2"/>
+            <a:stretch>
+              <a:fillRect/>
+            </a:stretch>
+          </p:blipFill>
+          <p:spPr>
+            <a:xfrm>
+              <a:off x="7201778" y="212436"/>
+              <a:ext cx="1462885" cy="6294582"/>
+            </a:xfrm>
+            <a:prstGeom prst="rect">
+              <a:avLst/>
+            </a:prstGeom>
+          </p:spPr>
+        </p:pic>
+        <p:pic>
+          <p:nvPicPr>
+            <p:cNvPr id="7" name="Picture 6"/>
+            <p:cNvPicPr>
+              <a:picLocks noChangeAspect="1"/>
+            </p:cNvPicPr>
+            <p:nvPr/>
+          </p:nvPicPr>
+          <p:blipFill>
+            <a:blip r:embed="rId3">
+              <a:extLst>
+                <a:ext uri="{28A0092B-C50C-407E-A947-70E740481C1C}">
+                  <a14:useLocalDpi xmlns:a14="http://schemas.microsoft.com/office/drawing/2010/main" val="0"/>
+                </a:ext>
+              </a:extLst>
+            </a:blip>
+            <a:stretch>
+              <a:fillRect/>
+            </a:stretch>
+          </p:blipFill>
+          <p:spPr>
+            <a:xfrm>
+              <a:off x="1620287" y="517280"/>
+              <a:ext cx="5500949" cy="5490610"/>
+            </a:xfrm>
+            <a:prstGeom prst="rect">
+              <a:avLst/>
+            </a:prstGeom>
+          </p:spPr>
+        </p:pic>
+        <p:sp>
+          <p:nvSpPr>
+            <p:cNvPr id="8" name="TextBox 7"/>
+            <p:cNvSpPr txBox="1"/>
+            <p:nvPr/>
+          </p:nvSpPr>
+          <p:spPr>
+            <a:xfrm>
+              <a:off x="8664663" y="158192"/>
+              <a:ext cx="677764" cy="523220"/>
+            </a:xfrm>
+            <a:prstGeom prst="rect">
+              <a:avLst/>
+            </a:prstGeom>
+            <a:noFill/>
+          </p:spPr>
+          <p:txBody>
+            <a:bodyPr wrap="square" rtlCol="0">
+              <a:spAutoFit/>
+            </a:bodyPr>
+            <a:lstStyle/>
+            <a:p>
+              <a:r>
+                <a:rPr lang="en-GB" sz="2800" dirty="0"/>
+                <a:t>nm</a:t>
+              </a:r>
+            </a:p>
+          </p:txBody>
+        </p:sp>
+        <p:sp>
+          <p:nvSpPr>
+            <p:cNvPr id="9" name="TextBox 8"/>
+            <p:cNvSpPr txBox="1"/>
+            <p:nvPr/>
+          </p:nvSpPr>
+          <p:spPr>
+            <a:xfrm>
+              <a:off x="8734405" y="6075961"/>
+              <a:ext cx="677764" cy="523220"/>
+            </a:xfrm>
+            <a:prstGeom prst="rect">
+              <a:avLst/>
+            </a:prstGeom>
+            <a:noFill/>
+          </p:spPr>
+          <p:txBody>
+            <a:bodyPr wrap="square" rtlCol="0">
+              <a:spAutoFit/>
+            </a:bodyPr>
+            <a:lstStyle/>
+            <a:p>
+              <a:r>
+                <a:rPr lang="en-GB" sz="2800" dirty="0"/>
+                <a:t>nm</a:t>
+              </a:r>
+            </a:p>
+          </p:txBody>
+        </p:sp>
+      </p:grpSp>
+    </p:spTree>
+    <p:extLst>
+      <p:ext uri="{BB962C8B-B14F-4D97-AF65-F5344CB8AC3E}">
+        <p14:creationId xmlns:p14="http://schemas.microsoft.com/office/powerpoint/2010/main" val="1720482961"/>
+      </p:ext>
+    </p:extLst>
+  </p:cSld>
+  <p:clrMapOvr>
+    <a:masterClrMapping/>
+  </p:clrMapOvr>
+</p:sld>
+</file>
+
+<file path=ppt/slides/slide12.xml><?xml version="1.0" encoding="utf-8"?>
+<p:sld xmlns:a="http://schemas.openxmlformats.org/drawingml/2006/main" xmlns:r="http://schemas.openxmlformats.org/officeDocument/2006/relationships" xmlns:p="http://schemas.openxmlformats.org/presentationml/2006/main">
+  <p:cSld>
+    <p:spTree>
+      <p:nvGrpSpPr>
+        <p:cNvPr id="1" name=""/>
+        <p:cNvGrpSpPr/>
+        <p:nvPr/>
+      </p:nvGrpSpPr>
+      <p:grpSpPr>
+        <a:xfrm>
+          <a:off x="0" y="0"/>
+          <a:ext cx="0" cy="0"/>
+          <a:chOff x="0" y="0"/>
+          <a:chExt cx="0" cy="0"/>
+        </a:xfrm>
+      </p:grpSpPr>
+      <p:pic>
+        <p:nvPicPr>
+          <p:cNvPr id="5" name="Picture 4"/>
+          <p:cNvPicPr>
+            <a:picLocks noChangeAspect="1"/>
+          </p:cNvPicPr>
+          <p:nvPr/>
+        </p:nvPicPr>
+        <p:blipFill>
+          <a:blip r:embed="rId2">
+            <a:extLst>
+              <a:ext uri="{28A0092B-C50C-407E-A947-70E740481C1C}">
+                <a14:useLocalDpi xmlns:a14="http://schemas.microsoft.com/office/drawing/2010/main" val="0"/>
+              </a:ext>
+            </a:extLst>
+          </a:blip>
+          <a:stretch>
+            <a:fillRect/>
+          </a:stretch>
+        </p:blipFill>
+        <p:spPr>
+          <a:xfrm>
+            <a:off x="2267380" y="389880"/>
+            <a:ext cx="7657240" cy="6078239"/>
+          </a:xfrm>
+          <a:prstGeom prst="rect">
+            <a:avLst/>
+          </a:prstGeom>
+        </p:spPr>
+      </p:pic>
+      <p:sp>
+        <p:nvSpPr>
+          <p:cNvPr id="6" name="TextBox 5"/>
+          <p:cNvSpPr txBox="1"/>
+          <p:nvPr/>
+        </p:nvSpPr>
+        <p:spPr>
+          <a:xfrm>
+            <a:off x="2530764" y="2142836"/>
+            <a:ext cx="1948872" cy="461665"/>
+          </a:xfrm>
+          <a:prstGeom prst="rect">
+            <a:avLst/>
+          </a:prstGeom>
+          <a:noFill/>
+        </p:spPr>
+        <p:txBody>
+          <a:bodyPr wrap="square" rtlCol="0">
+            <a:spAutoFit/>
+          </a:bodyPr>
+          <a:lstStyle/>
+          <a:p>
+            <a:pPr algn="ctr"/>
+            <a:r>
+              <a:rPr lang="en-GB" sz="2400" dirty="0">
+                <a:solidFill>
+                  <a:schemeClr val="bg1"/>
+                </a:solidFill>
+              </a:rPr>
+              <a:t>Au-Ni contact</a:t>
+            </a:r>
+          </a:p>
+        </p:txBody>
+      </p:sp>
+      <p:cxnSp>
+        <p:nvCxnSpPr>
+          <p:cNvPr id="8" name="Straight Arrow Connector 7"/>
+          <p:cNvCxnSpPr>
+            <a:cxnSpLocks/>
+          </p:cNvCxnSpPr>
+          <p:nvPr/>
+        </p:nvCxnSpPr>
+        <p:spPr>
+          <a:xfrm flipH="1" flipV="1">
+            <a:off x="3417377" y="1627323"/>
+            <a:ext cx="7748" cy="650928"/>
+          </a:xfrm>
+          <a:prstGeom prst="straightConnector1">
+            <a:avLst/>
+          </a:prstGeom>
+          <a:ln w="38100">
+            <a:solidFill>
+              <a:schemeClr val="bg1"/>
+            </a:solidFill>
+            <a:tailEnd type="triangle"/>
+          </a:ln>
+        </p:spPr>
+        <p:style>
+          <a:lnRef idx="1">
+            <a:schemeClr val="accent1"/>
+          </a:lnRef>
+          <a:fillRef idx="0">
+            <a:schemeClr val="accent1"/>
+          </a:fillRef>
+          <a:effectRef idx="0">
+            <a:schemeClr val="accent1"/>
+          </a:effectRef>
+          <a:fontRef idx="minor">
+            <a:schemeClr val="tx1"/>
+          </a:fontRef>
+        </p:style>
+      </p:cxnSp>
+    </p:spTree>
+    <p:extLst>
+      <p:ext uri="{BB962C8B-B14F-4D97-AF65-F5344CB8AC3E}">
+        <p14:creationId xmlns:p14="http://schemas.microsoft.com/office/powerpoint/2010/main" val="1279174220"/>
+      </p:ext>
+    </p:extLst>
+  </p:cSld>
+  <p:clrMapOvr>
+    <a:masterClrMapping/>
+  </p:clrMapOvr>
 </p:sld>
 </file>
 
@@ -3118,13 +3611,6 @@
   <p:clrMapOvr>
     <a:masterClrMapping/>
   </p:clrMapOvr>
-  <p:timing>
-    <p:tnLst>
-      <p:par>
-        <p:cTn id="1" dur="indefinite" restart="never" nodeType="tmRoot"/>
-      </p:par>
-    </p:tnLst>
-  </p:timing>
 </p:sld>
 </file>
 
@@ -3292,10 +3778,9 @@
             <a:p>
               <a:pPr algn="ctr"/>
               <a:r>
-                <a:rPr lang="en-GB" sz="3200" dirty="0" smtClean="0"/>
+                <a:rPr lang="en-GB" sz="3200" dirty="0"/>
                 <a:t>Radiative Recombination Events</a:t>
               </a:r>
-              <a:endParaRPr lang="en-GB" sz="3200" dirty="0"/>
             </a:p>
           </p:txBody>
         </p:sp>
@@ -3322,34 +3807,33 @@
             <a:p>
               <a:pPr algn="ctr"/>
               <a:r>
-                <a:rPr lang="en-GB" sz="3200" dirty="0" smtClean="0"/>
+                <a:rPr lang="en-GB" sz="3200" dirty="0"/>
                 <a:t>(×10</a:t>
               </a:r>
               <a:r>
-                <a:rPr lang="en-GB" sz="3200" baseline="30000" dirty="0" smtClean="0"/>
+                <a:rPr lang="en-GB" sz="3200" baseline="30000" dirty="0"/>
                 <a:t>28</a:t>
               </a:r>
               <a:r>
-                <a:rPr lang="en-GB" sz="3200" dirty="0" smtClean="0"/>
+                <a:rPr lang="en-GB" sz="3200" dirty="0"/>
                 <a:t> cm</a:t>
               </a:r>
               <a:r>
-                <a:rPr lang="en-GB" sz="3200" baseline="30000" dirty="0" smtClean="0"/>
+                <a:rPr lang="en-GB" sz="3200" baseline="30000" dirty="0"/>
                 <a:t>-3</a:t>
               </a:r>
               <a:r>
-                <a:rPr lang="en-GB" sz="3200" dirty="0" smtClean="0"/>
+                <a:rPr lang="en-GB" sz="3200" dirty="0"/>
                 <a:t> s</a:t>
               </a:r>
               <a:r>
-                <a:rPr lang="en-GB" sz="3200" baseline="30000" dirty="0" smtClean="0"/>
+                <a:rPr lang="en-GB" sz="3200" baseline="30000" dirty="0"/>
                 <a:t>-1</a:t>
               </a:r>
               <a:r>
-                <a:rPr lang="en-GB" sz="3200" dirty="0" smtClean="0"/>
+                <a:rPr lang="en-GB" sz="3200" dirty="0"/>
                 <a:t>)</a:t>
               </a:r>
-              <a:endParaRPr lang="en-GB" sz="3200" dirty="0"/>
             </a:p>
           </p:txBody>
         </p:sp>
@@ -3376,7 +3860,7 @@
             <a:lstStyle/>
             <a:p>
               <a:r>
-                <a:rPr lang="en-GB" sz="2400" dirty="0" smtClean="0"/>
+                <a:rPr lang="en-GB" sz="2400" dirty="0"/>
                 <a:t>2.76</a:t>
               </a:r>
             </a:p>
@@ -3385,7 +3869,7 @@
             </a:p>
             <a:p>
               <a:r>
-                <a:rPr lang="en-GB" sz="2400" dirty="0" smtClean="0"/>
+                <a:rPr lang="en-GB" sz="2400" dirty="0"/>
                 <a:t>2.75</a:t>
               </a:r>
             </a:p>
@@ -3394,7 +3878,7 @@
             </a:p>
             <a:p>
               <a:r>
-                <a:rPr lang="en-GB" sz="2400" dirty="0" smtClean="0"/>
+                <a:rPr lang="en-GB" sz="2400" dirty="0"/>
                 <a:t>2.74</a:t>
               </a:r>
             </a:p>
@@ -3403,7 +3887,7 @@
             </a:p>
             <a:p>
               <a:r>
-                <a:rPr lang="en-GB" sz="2400" dirty="0" smtClean="0"/>
+                <a:rPr lang="en-GB" sz="2400" dirty="0"/>
                 <a:t>2.73</a:t>
               </a:r>
             </a:p>
@@ -3412,7 +3896,7 @@
             </a:p>
             <a:p>
               <a:r>
-                <a:rPr lang="en-GB" sz="2400" dirty="0" smtClean="0"/>
+                <a:rPr lang="en-GB" sz="2400" dirty="0"/>
                 <a:t>2.72</a:t>
               </a:r>
             </a:p>
@@ -3421,7 +3905,7 @@
             </a:p>
             <a:p>
               <a:r>
-                <a:rPr lang="en-GB" sz="2400" dirty="0" smtClean="0"/>
+                <a:rPr lang="en-GB" sz="2400" dirty="0"/>
                 <a:t>2.71</a:t>
               </a:r>
             </a:p>
@@ -3430,10 +3914,9 @@
             </a:p>
             <a:p>
               <a:r>
-                <a:rPr lang="en-GB" sz="2400" dirty="0" smtClean="0"/>
+                <a:rPr lang="en-GB" sz="2400" dirty="0"/>
                 <a:t>2.70</a:t>
               </a:r>
-              <a:endParaRPr lang="en-GB" sz="2400" dirty="0"/>
             </a:p>
           </p:txBody>
         </p:sp>
@@ -3460,10 +3943,9 @@
             <a:lstStyle/>
             <a:p>
               <a:r>
-                <a:rPr lang="en-GB" sz="2400" dirty="0" smtClean="0"/>
+                <a:rPr lang="en-GB" sz="2400" dirty="0"/>
                 <a:t>80        85      90       95      100    105    110     115     120</a:t>
               </a:r>
-              <a:endParaRPr lang="en-GB" sz="2400" dirty="0"/>
             </a:p>
           </p:txBody>
         </p:sp>
@@ -3492,10 +3974,9 @@
           <a:p>
             <a:pPr algn="ctr"/>
             <a:r>
-              <a:rPr lang="en-GB" sz="2400" dirty="0" smtClean="0"/>
+              <a:rPr lang="en-GB" sz="2400" dirty="0"/>
               <a:t>X (µm)</a:t>
             </a:r>
-            <a:endParaRPr lang="en-GB" sz="2400" dirty="0"/>
           </a:p>
         </p:txBody>
       </p:sp>
@@ -3522,16 +4003,15 @@
           <a:lstStyle/>
           <a:p>
             <a:r>
-              <a:rPr lang="en-GB" sz="2400" dirty="0" smtClean="0"/>
+              <a:rPr lang="en-GB" sz="2400" dirty="0"/>
               <a:t>Y  (µm)</a:t>
             </a:r>
           </a:p>
           <a:p>
             <a:r>
-              <a:rPr lang="en-GB" sz="2400" dirty="0" smtClean="0"/>
+              <a:rPr lang="en-GB" sz="2400" dirty="0"/>
               <a:t> </a:t>
             </a:r>
-            <a:endParaRPr lang="en-GB" sz="2400" dirty="0"/>
           </a:p>
         </p:txBody>
       </p:sp>
@@ -3630,7 +4110,7 @@
           <a:lstStyle/>
           <a:p>
             <a:r>
-              <a:rPr lang="en-GB" sz="2400" dirty="0" smtClean="0">
+              <a:rPr lang="en-GB" sz="2400" dirty="0">
                 <a:solidFill>
                   <a:schemeClr val="bg1"/>
                 </a:solidFill>
@@ -3638,7 +4118,7 @@
               <a:t>Shallow </a:t>
             </a:r>
             <a:r>
-              <a:rPr lang="en-GB" sz="2400" dirty="0" err="1" smtClean="0">
+              <a:rPr lang="en-GB" sz="2400" dirty="0" err="1">
                 <a:solidFill>
                   <a:schemeClr val="bg1"/>
                 </a:solidFill>
@@ -3646,26 +4126,13 @@
               <a:t>AlGaN</a:t>
             </a:r>
             <a:r>
-              <a:rPr lang="en-GB" sz="2400" dirty="0" smtClean="0">
+              <a:rPr lang="en-GB" sz="2400" dirty="0">
                 <a:solidFill>
                   <a:schemeClr val="bg1"/>
                 </a:solidFill>
               </a:rPr>
-              <a:t> </a:t>
-            </a:r>
-            <a:r>
-              <a:rPr lang="en-GB" sz="2400" dirty="0" smtClean="0">
-                <a:solidFill>
-                  <a:schemeClr val="bg1"/>
-                </a:solidFill>
-              </a:rPr>
-              <a:t>inclusion</a:t>
-            </a:r>
-            <a:endParaRPr lang="en-GB" sz="2400" dirty="0">
-              <a:solidFill>
-                <a:schemeClr val="bg1"/>
-              </a:solidFill>
-            </a:endParaRPr>
+              <a:t> inclusion</a:t>
+            </a:r>
           </a:p>
         </p:txBody>
       </p:sp>
@@ -3728,18 +4195,13 @@
           <a:lstStyle/>
           <a:p>
             <a:r>
-              <a:rPr lang="en-GB" sz="2400" dirty="0" smtClean="0">
+              <a:rPr lang="en-GB" sz="2400" dirty="0">
                 <a:solidFill>
                   <a:schemeClr val="bg1"/>
                 </a:solidFill>
               </a:rPr>
               <a:t>Profile taken ‘close’ to inclusion</a:t>
             </a:r>
-            <a:endParaRPr lang="en-GB" sz="2400" dirty="0">
-              <a:solidFill>
-                <a:schemeClr val="bg1"/>
-              </a:solidFill>
-            </a:endParaRPr>
           </a:p>
         </p:txBody>
       </p:sp>
@@ -3766,18 +4228,13 @@
           <a:lstStyle/>
           <a:p>
             <a:r>
-              <a:rPr lang="en-GB" sz="2400" dirty="0" smtClean="0">
+              <a:rPr lang="en-GB" sz="2400" dirty="0">
                 <a:solidFill>
                   <a:schemeClr val="bg1"/>
                 </a:solidFill>
               </a:rPr>
               <a:t>Profile taken ‘far’ from inclusion</a:t>
             </a:r>
-            <a:endParaRPr lang="en-GB" sz="2400" dirty="0">
-              <a:solidFill>
-                <a:schemeClr val="bg1"/>
-              </a:solidFill>
-            </a:endParaRPr>
           </a:p>
         </p:txBody>
       </p:sp>
@@ -3840,18 +4297,13 @@
           <a:lstStyle/>
           <a:p>
             <a:r>
-              <a:rPr lang="en-GB" sz="3200" dirty="0" smtClean="0">
+              <a:rPr lang="en-GB" sz="3200" dirty="0">
                 <a:solidFill>
                   <a:schemeClr val="bg1"/>
                 </a:solidFill>
               </a:rPr>
               <a:t>QW2</a:t>
             </a:r>
-            <a:endParaRPr lang="en-GB" sz="3200" dirty="0">
-              <a:solidFill>
-                <a:schemeClr val="bg1"/>
-              </a:solidFill>
-            </a:endParaRPr>
           </a:p>
         </p:txBody>
       </p:sp>
@@ -3878,18 +4330,13 @@
           <a:lstStyle/>
           <a:p>
             <a:r>
-              <a:rPr lang="en-GB" sz="3200" dirty="0" smtClean="0">
+              <a:rPr lang="en-GB" sz="3200" dirty="0">
                 <a:solidFill>
                   <a:schemeClr val="bg1"/>
                 </a:solidFill>
               </a:rPr>
               <a:t>QW3</a:t>
             </a:r>
-            <a:endParaRPr lang="en-GB" sz="3200" dirty="0">
-              <a:solidFill>
-                <a:schemeClr val="bg1"/>
-              </a:solidFill>
-            </a:endParaRPr>
           </a:p>
         </p:txBody>
       </p:sp>
@@ -3916,18 +4363,13 @@
           <a:lstStyle/>
           <a:p>
             <a:r>
-              <a:rPr lang="en-GB" sz="3200" dirty="0" smtClean="0">
+              <a:rPr lang="en-GB" sz="3200" dirty="0">
                 <a:solidFill>
                   <a:schemeClr val="bg1"/>
                 </a:solidFill>
               </a:rPr>
               <a:t>QW4</a:t>
             </a:r>
-            <a:endParaRPr lang="en-GB" sz="3200" dirty="0">
-              <a:solidFill>
-                <a:schemeClr val="bg1"/>
-              </a:solidFill>
-            </a:endParaRPr>
           </a:p>
         </p:txBody>
       </p:sp>
@@ -3954,18 +4396,13 @@
           <a:lstStyle/>
           <a:p>
             <a:r>
-              <a:rPr lang="en-GB" sz="3200" dirty="0" smtClean="0">
+              <a:rPr lang="en-GB" sz="3200" dirty="0">
                 <a:solidFill>
                   <a:schemeClr val="bg1"/>
                 </a:solidFill>
               </a:rPr>
               <a:t>QW5</a:t>
             </a:r>
-            <a:endParaRPr lang="en-GB" sz="3200" dirty="0">
-              <a:solidFill>
-                <a:schemeClr val="bg1"/>
-              </a:solidFill>
-            </a:endParaRPr>
           </a:p>
         </p:txBody>
       </p:sp>
@@ -3992,18 +4429,13 @@
           <a:lstStyle/>
           <a:p>
             <a:r>
-              <a:rPr lang="en-GB" sz="3200" dirty="0" smtClean="0">
+              <a:rPr lang="en-GB" sz="3200" dirty="0">
                 <a:solidFill>
                   <a:schemeClr val="bg1"/>
                 </a:solidFill>
               </a:rPr>
               <a:t>QW1</a:t>
             </a:r>
-            <a:endParaRPr lang="en-GB" sz="3200" dirty="0">
-              <a:solidFill>
-                <a:schemeClr val="bg1"/>
-              </a:solidFill>
-            </a:endParaRPr>
           </a:p>
         </p:txBody>
       </p:sp>
@@ -4017,13 +4449,6 @@
   <p:clrMapOvr>
     <a:masterClrMapping/>
   </p:clrMapOvr>
-  <p:timing>
-    <p:tnLst>
-      <p:par>
-        <p:cTn id="1" dur="indefinite" restart="never" nodeType="tmRoot"/>
-      </p:par>
-    </p:tnLst>
-  </p:timing>
 </p:sld>
 </file>
 
@@ -4096,10 +4521,9 @@
           <a:lstStyle/>
           <a:p>
             <a:r>
-              <a:rPr lang="en-GB" sz="3200" dirty="0" smtClean="0"/>
+              <a:rPr lang="en-GB" sz="3200" dirty="0"/>
               <a:t>QW1</a:t>
             </a:r>
-            <a:endParaRPr lang="en-GB" sz="3200" dirty="0"/>
           </a:p>
         </p:txBody>
       </p:sp>
@@ -4126,10 +4550,9 @@
           <a:lstStyle/>
           <a:p>
             <a:r>
-              <a:rPr lang="en-GB" sz="3200" dirty="0" smtClean="0"/>
+              <a:rPr lang="en-GB" sz="3200" dirty="0"/>
               <a:t>QW2</a:t>
             </a:r>
-            <a:endParaRPr lang="en-GB" sz="3200" dirty="0"/>
           </a:p>
         </p:txBody>
       </p:sp>
@@ -4156,10 +4579,9 @@
           <a:lstStyle/>
           <a:p>
             <a:r>
-              <a:rPr lang="en-GB" sz="3200" dirty="0" smtClean="0"/>
+              <a:rPr lang="en-GB" sz="3200" dirty="0"/>
               <a:t>QW3</a:t>
             </a:r>
-            <a:endParaRPr lang="en-GB" sz="3200" dirty="0"/>
           </a:p>
         </p:txBody>
       </p:sp>
@@ -4186,10 +4608,9 @@
           <a:lstStyle/>
           <a:p>
             <a:r>
-              <a:rPr lang="en-GB" sz="3200" dirty="0" smtClean="0"/>
+              <a:rPr lang="en-GB" sz="3200" dirty="0"/>
               <a:t>QW4</a:t>
             </a:r>
-            <a:endParaRPr lang="en-GB" sz="3200" dirty="0"/>
           </a:p>
         </p:txBody>
       </p:sp>
@@ -4216,10 +4637,9 @@
           <a:lstStyle/>
           <a:p>
             <a:r>
-              <a:rPr lang="en-GB" sz="3200" dirty="0" smtClean="0"/>
+              <a:rPr lang="en-GB" sz="3200" dirty="0"/>
               <a:t>QW5</a:t>
             </a:r>
-            <a:endParaRPr lang="en-GB" sz="3200" dirty="0"/>
           </a:p>
         </p:txBody>
       </p:sp>
@@ -4233,17 +4653,464 @@
   <p:clrMapOvr>
     <a:masterClrMapping/>
   </p:clrMapOvr>
-  <p:timing>
-    <p:tnLst>
-      <p:par>
-        <p:cTn id="1" dur="indefinite" restart="never" nodeType="tmRoot"/>
-      </p:par>
-    </p:tnLst>
-  </p:timing>
 </p:sld>
 </file>
 
 <file path=ppt/slides/slide5.xml><?xml version="1.0" encoding="utf-8"?>
+<p:sld xmlns:a="http://schemas.openxmlformats.org/drawingml/2006/main" xmlns:r="http://schemas.openxmlformats.org/officeDocument/2006/relationships" xmlns:p="http://schemas.openxmlformats.org/presentationml/2006/main">
+  <p:cSld>
+    <p:spTree>
+      <p:nvGrpSpPr>
+        <p:cNvPr id="1" name=""/>
+        <p:cNvGrpSpPr/>
+        <p:nvPr/>
+      </p:nvGrpSpPr>
+      <p:grpSpPr>
+        <a:xfrm>
+          <a:off x="0" y="0"/>
+          <a:ext cx="0" cy="0"/>
+          <a:chOff x="0" y="0"/>
+          <a:chExt cx="0" cy="0"/>
+        </a:xfrm>
+      </p:grpSpPr>
+      <p:pic>
+        <p:nvPicPr>
+          <p:cNvPr id="5" name="Picture 4"/>
+          <p:cNvPicPr>
+            <a:picLocks noChangeAspect="1"/>
+          </p:cNvPicPr>
+          <p:nvPr/>
+        </p:nvPicPr>
+        <p:blipFill>
+          <a:blip r:embed="rId2" cstate="print">
+            <a:extLst>
+              <a:ext uri="{28A0092B-C50C-407E-A947-70E740481C1C}">
+                <a14:useLocalDpi xmlns:a14="http://schemas.microsoft.com/office/drawing/2010/main" val="0"/>
+              </a:ext>
+            </a:extLst>
+          </a:blip>
+          <a:stretch>
+            <a:fillRect/>
+          </a:stretch>
+        </p:blipFill>
+        <p:spPr>
+          <a:xfrm>
+            <a:off x="1523990" y="228593"/>
+            <a:ext cx="9144019" cy="6400813"/>
+          </a:xfrm>
+          <a:prstGeom prst="rect">
+            <a:avLst/>
+          </a:prstGeom>
+        </p:spPr>
+      </p:pic>
+      <p:sp>
+        <p:nvSpPr>
+          <p:cNvPr id="6" name="TextBox 5"/>
+          <p:cNvSpPr txBox="1"/>
+          <p:nvPr/>
+        </p:nvSpPr>
+        <p:spPr>
+          <a:xfrm>
+            <a:off x="2840490" y="4864205"/>
+            <a:ext cx="1083243" cy="584775"/>
+          </a:xfrm>
+          <a:prstGeom prst="rect">
+            <a:avLst/>
+          </a:prstGeom>
+          <a:noFill/>
+        </p:spPr>
+        <p:txBody>
+          <a:bodyPr wrap="square" rtlCol="0">
+            <a:spAutoFit/>
+          </a:bodyPr>
+          <a:lstStyle/>
+          <a:p>
+            <a:r>
+              <a:rPr lang="en-GB" sz="3200" dirty="0"/>
+              <a:t>QW1</a:t>
+            </a:r>
+          </a:p>
+        </p:txBody>
+      </p:sp>
+      <p:sp>
+        <p:nvSpPr>
+          <p:cNvPr id="7" name="TextBox 6"/>
+          <p:cNvSpPr txBox="1"/>
+          <p:nvPr/>
+        </p:nvSpPr>
+        <p:spPr>
+          <a:xfrm>
+            <a:off x="4066613" y="4864204"/>
+            <a:ext cx="1083243" cy="584775"/>
+          </a:xfrm>
+          <a:prstGeom prst="rect">
+            <a:avLst/>
+          </a:prstGeom>
+          <a:noFill/>
+        </p:spPr>
+        <p:txBody>
+          <a:bodyPr wrap="square" rtlCol="0">
+            <a:spAutoFit/>
+          </a:bodyPr>
+          <a:lstStyle/>
+          <a:p>
+            <a:r>
+              <a:rPr lang="en-GB" sz="3200" dirty="0"/>
+              <a:t>QW2</a:t>
+            </a:r>
+          </a:p>
+        </p:txBody>
+      </p:sp>
+      <p:sp>
+        <p:nvSpPr>
+          <p:cNvPr id="8" name="TextBox 7"/>
+          <p:cNvSpPr txBox="1"/>
+          <p:nvPr/>
+        </p:nvSpPr>
+        <p:spPr>
+          <a:xfrm>
+            <a:off x="5179527" y="4864203"/>
+            <a:ext cx="1083243" cy="584775"/>
+          </a:xfrm>
+          <a:prstGeom prst="rect">
+            <a:avLst/>
+          </a:prstGeom>
+          <a:noFill/>
+        </p:spPr>
+        <p:txBody>
+          <a:bodyPr wrap="square" rtlCol="0">
+            <a:spAutoFit/>
+          </a:bodyPr>
+          <a:lstStyle/>
+          <a:p>
+            <a:r>
+              <a:rPr lang="en-GB" sz="3200" dirty="0"/>
+              <a:t>QW3</a:t>
+            </a:r>
+          </a:p>
+        </p:txBody>
+      </p:sp>
+      <p:sp>
+        <p:nvSpPr>
+          <p:cNvPr id="9" name="TextBox 8"/>
+          <p:cNvSpPr txBox="1"/>
+          <p:nvPr/>
+        </p:nvSpPr>
+        <p:spPr>
+          <a:xfrm>
+            <a:off x="6395479" y="4864203"/>
+            <a:ext cx="1083243" cy="584775"/>
+          </a:xfrm>
+          <a:prstGeom prst="rect">
+            <a:avLst/>
+          </a:prstGeom>
+          <a:noFill/>
+        </p:spPr>
+        <p:txBody>
+          <a:bodyPr wrap="square" rtlCol="0">
+            <a:spAutoFit/>
+          </a:bodyPr>
+          <a:lstStyle/>
+          <a:p>
+            <a:r>
+              <a:rPr lang="en-GB" sz="3200" dirty="0"/>
+              <a:t>QW4</a:t>
+            </a:r>
+          </a:p>
+        </p:txBody>
+      </p:sp>
+      <p:sp>
+        <p:nvSpPr>
+          <p:cNvPr id="10" name="TextBox 9"/>
+          <p:cNvSpPr txBox="1"/>
+          <p:nvPr/>
+        </p:nvSpPr>
+        <p:spPr>
+          <a:xfrm>
+            <a:off x="7579270" y="4864203"/>
+            <a:ext cx="1083243" cy="584775"/>
+          </a:xfrm>
+          <a:prstGeom prst="rect">
+            <a:avLst/>
+          </a:prstGeom>
+          <a:noFill/>
+        </p:spPr>
+        <p:txBody>
+          <a:bodyPr wrap="square" rtlCol="0">
+            <a:spAutoFit/>
+          </a:bodyPr>
+          <a:lstStyle/>
+          <a:p>
+            <a:r>
+              <a:rPr lang="en-GB" sz="3200" dirty="0"/>
+              <a:t>QW5</a:t>
+            </a:r>
+          </a:p>
+        </p:txBody>
+      </p:sp>
+    </p:spTree>
+    <p:extLst>
+      <p:ext uri="{BB962C8B-B14F-4D97-AF65-F5344CB8AC3E}">
+        <p14:creationId xmlns:p14="http://schemas.microsoft.com/office/powerpoint/2010/main" val="3748360715"/>
+      </p:ext>
+    </p:extLst>
+  </p:cSld>
+  <p:clrMapOvr>
+    <a:masterClrMapping/>
+  </p:clrMapOvr>
+</p:sld>
+</file>
+
+<file path=ppt/slides/slide6.xml><?xml version="1.0" encoding="utf-8"?>
+<p:sld xmlns:a="http://schemas.openxmlformats.org/drawingml/2006/main" xmlns:r="http://schemas.openxmlformats.org/officeDocument/2006/relationships" xmlns:p="http://schemas.openxmlformats.org/presentationml/2006/main">
+  <p:cSld>
+    <p:spTree>
+      <p:nvGrpSpPr>
+        <p:cNvPr id="1" name=""/>
+        <p:cNvGrpSpPr/>
+        <p:nvPr/>
+      </p:nvGrpSpPr>
+      <p:grpSpPr>
+        <a:xfrm>
+          <a:off x="0" y="0"/>
+          <a:ext cx="0" cy="0"/>
+          <a:chOff x="0" y="0"/>
+          <a:chExt cx="0" cy="0"/>
+        </a:xfrm>
+      </p:grpSpPr>
+      <p:pic>
+        <p:nvPicPr>
+          <p:cNvPr id="5" name="Picture 4"/>
+          <p:cNvPicPr>
+            <a:picLocks noChangeAspect="1"/>
+          </p:cNvPicPr>
+          <p:nvPr/>
+        </p:nvPicPr>
+        <p:blipFill>
+          <a:blip r:embed="rId2" cstate="print">
+            <a:extLst>
+              <a:ext uri="{28A0092B-C50C-407E-A947-70E740481C1C}">
+                <a14:useLocalDpi xmlns:a14="http://schemas.microsoft.com/office/drawing/2010/main" val="0"/>
+              </a:ext>
+            </a:extLst>
+          </a:blip>
+          <a:stretch>
+            <a:fillRect/>
+          </a:stretch>
+        </p:blipFill>
+        <p:spPr>
+          <a:xfrm>
+            <a:off x="2007569" y="219356"/>
+            <a:ext cx="9144019" cy="6400813"/>
+          </a:xfrm>
+          <a:prstGeom prst="rect">
+            <a:avLst/>
+          </a:prstGeom>
+        </p:spPr>
+      </p:pic>
+      <p:sp>
+        <p:nvSpPr>
+          <p:cNvPr id="6" name="Oval 5"/>
+          <p:cNvSpPr/>
+          <p:nvPr/>
+        </p:nvSpPr>
+        <p:spPr>
+          <a:xfrm>
+            <a:off x="8455186" y="960897"/>
+            <a:ext cx="1068522" cy="1145309"/>
+          </a:xfrm>
+          <a:prstGeom prst="ellipse">
+            <a:avLst/>
+          </a:prstGeom>
+          <a:noFill/>
+          <a:ln w="57150">
+            <a:prstDash val="sysDash"/>
+          </a:ln>
+        </p:spPr>
+        <p:style>
+          <a:lnRef idx="2">
+            <a:schemeClr val="accent1">
+              <a:shade val="50000"/>
+            </a:schemeClr>
+          </a:lnRef>
+          <a:fillRef idx="1">
+            <a:schemeClr val="accent1"/>
+          </a:fillRef>
+          <a:effectRef idx="0">
+            <a:schemeClr val="accent1"/>
+          </a:effectRef>
+          <a:fontRef idx="minor">
+            <a:schemeClr val="lt1"/>
+          </a:fontRef>
+        </p:style>
+        <p:txBody>
+          <a:bodyPr rtlCol="0" anchor="ctr"/>
+          <a:lstStyle/>
+          <a:p>
+            <a:pPr algn="ctr"/>
+            <a:endParaRPr lang="en-GB"/>
+          </a:p>
+        </p:txBody>
+      </p:sp>
+      <p:sp>
+        <p:nvSpPr>
+          <p:cNvPr id="7" name="TextBox 6"/>
+          <p:cNvSpPr txBox="1"/>
+          <p:nvPr/>
+        </p:nvSpPr>
+        <p:spPr>
+          <a:xfrm>
+            <a:off x="4010612" y="3354106"/>
+            <a:ext cx="1083243" cy="584775"/>
+          </a:xfrm>
+          <a:prstGeom prst="rect">
+            <a:avLst/>
+          </a:prstGeom>
+          <a:noFill/>
+        </p:spPr>
+        <p:txBody>
+          <a:bodyPr wrap="square" rtlCol="0">
+            <a:spAutoFit/>
+          </a:bodyPr>
+          <a:lstStyle/>
+          <a:p>
+            <a:r>
+              <a:rPr lang="en-GB" sz="3200" dirty="0"/>
+              <a:t>QW1</a:t>
+            </a:r>
+          </a:p>
+        </p:txBody>
+      </p:sp>
+      <p:sp>
+        <p:nvSpPr>
+          <p:cNvPr id="8" name="TextBox 7"/>
+          <p:cNvSpPr txBox="1"/>
+          <p:nvPr/>
+        </p:nvSpPr>
+        <p:spPr>
+          <a:xfrm>
+            <a:off x="5236735" y="3354105"/>
+            <a:ext cx="1083243" cy="584775"/>
+          </a:xfrm>
+          <a:prstGeom prst="rect">
+            <a:avLst/>
+          </a:prstGeom>
+          <a:noFill/>
+        </p:spPr>
+        <p:txBody>
+          <a:bodyPr wrap="square" rtlCol="0">
+            <a:spAutoFit/>
+          </a:bodyPr>
+          <a:lstStyle/>
+          <a:p>
+            <a:r>
+              <a:rPr lang="en-GB" sz="3200" dirty="0"/>
+              <a:t>QW2</a:t>
+            </a:r>
+          </a:p>
+        </p:txBody>
+      </p:sp>
+      <p:sp>
+        <p:nvSpPr>
+          <p:cNvPr id="9" name="TextBox 8"/>
+          <p:cNvSpPr txBox="1"/>
+          <p:nvPr/>
+        </p:nvSpPr>
+        <p:spPr>
+          <a:xfrm>
+            <a:off x="6349649" y="3354104"/>
+            <a:ext cx="1083243" cy="584775"/>
+          </a:xfrm>
+          <a:prstGeom prst="rect">
+            <a:avLst/>
+          </a:prstGeom>
+          <a:noFill/>
+        </p:spPr>
+        <p:txBody>
+          <a:bodyPr wrap="square" rtlCol="0">
+            <a:spAutoFit/>
+          </a:bodyPr>
+          <a:lstStyle/>
+          <a:p>
+            <a:r>
+              <a:rPr lang="en-GB" sz="3200" dirty="0"/>
+              <a:t>QW3</a:t>
+            </a:r>
+          </a:p>
+        </p:txBody>
+      </p:sp>
+      <p:sp>
+        <p:nvSpPr>
+          <p:cNvPr id="10" name="TextBox 9"/>
+          <p:cNvSpPr txBox="1"/>
+          <p:nvPr/>
+        </p:nvSpPr>
+        <p:spPr>
+          <a:xfrm>
+            <a:off x="7565601" y="3354104"/>
+            <a:ext cx="1083243" cy="584775"/>
+          </a:xfrm>
+          <a:prstGeom prst="rect">
+            <a:avLst/>
+          </a:prstGeom>
+          <a:noFill/>
+        </p:spPr>
+        <p:txBody>
+          <a:bodyPr wrap="square" rtlCol="0">
+            <a:spAutoFit/>
+          </a:bodyPr>
+          <a:lstStyle/>
+          <a:p>
+            <a:r>
+              <a:rPr lang="en-GB" sz="3200" dirty="0"/>
+              <a:t>QW4</a:t>
+            </a:r>
+          </a:p>
+        </p:txBody>
+      </p:sp>
+      <p:sp>
+        <p:nvSpPr>
+          <p:cNvPr id="11" name="TextBox 10"/>
+          <p:cNvSpPr txBox="1"/>
+          <p:nvPr/>
+        </p:nvSpPr>
+        <p:spPr>
+          <a:xfrm>
+            <a:off x="8648844" y="4534532"/>
+            <a:ext cx="1083243" cy="584775"/>
+          </a:xfrm>
+          <a:prstGeom prst="rect">
+            <a:avLst/>
+          </a:prstGeom>
+          <a:noFill/>
+        </p:spPr>
+        <p:txBody>
+          <a:bodyPr wrap="square" rtlCol="0">
+            <a:spAutoFit/>
+          </a:bodyPr>
+          <a:lstStyle/>
+          <a:p>
+            <a:r>
+              <a:rPr lang="en-GB" sz="3200" dirty="0"/>
+              <a:t>QW5</a:t>
+            </a:r>
+          </a:p>
+        </p:txBody>
+      </p:sp>
+    </p:spTree>
+    <p:extLst>
+      <p:ext uri="{BB962C8B-B14F-4D97-AF65-F5344CB8AC3E}">
+        <p14:creationId xmlns:p14="http://schemas.microsoft.com/office/powerpoint/2010/main" val="4200880822"/>
+      </p:ext>
+    </p:extLst>
+  </p:cSld>
+  <p:clrMapOvr>
+    <a:masterClrMapping/>
+  </p:clrMapOvr>
+</p:sld>
+</file>
+
+<file path=ppt/slides/slide7.xml><?xml version="1.0" encoding="utf-8"?>
 <p:sld xmlns:a="http://schemas.openxmlformats.org/drawingml/2006/main" xmlns:r="http://schemas.openxmlformats.org/officeDocument/2006/relationships" xmlns:p="http://schemas.openxmlformats.org/presentationml/2006/main">
   <p:cSld>
     <p:spTree>
@@ -4407,10 +5274,9 @@
             <a:p>
               <a:pPr algn="ctr"/>
               <a:r>
-                <a:rPr lang="en-GB" sz="3200" dirty="0" smtClean="0"/>
+                <a:rPr lang="en-GB" sz="3200" dirty="0"/>
                 <a:t>Radiative Recombination Events</a:t>
               </a:r>
-              <a:endParaRPr lang="en-GB" sz="3200" dirty="0"/>
             </a:p>
           </p:txBody>
         </p:sp>
@@ -4437,34 +5303,33 @@
             <a:p>
               <a:pPr algn="ctr"/>
               <a:r>
-                <a:rPr lang="en-GB" sz="3200" dirty="0" smtClean="0"/>
+                <a:rPr lang="en-GB" sz="3200" dirty="0"/>
                 <a:t>(×10</a:t>
               </a:r>
               <a:r>
-                <a:rPr lang="en-GB" sz="3200" baseline="30000" dirty="0" smtClean="0"/>
+                <a:rPr lang="en-GB" sz="3200" baseline="30000" dirty="0"/>
                 <a:t>28</a:t>
               </a:r>
               <a:r>
-                <a:rPr lang="en-GB" sz="3200" dirty="0" smtClean="0"/>
+                <a:rPr lang="en-GB" sz="3200" dirty="0"/>
                 <a:t> cm</a:t>
               </a:r>
               <a:r>
-                <a:rPr lang="en-GB" sz="3200" baseline="30000" dirty="0" smtClean="0"/>
+                <a:rPr lang="en-GB" sz="3200" baseline="30000" dirty="0"/>
                 <a:t>-3</a:t>
               </a:r>
               <a:r>
-                <a:rPr lang="en-GB" sz="3200" dirty="0" smtClean="0"/>
+                <a:rPr lang="en-GB" sz="3200" dirty="0"/>
                 <a:t> s</a:t>
               </a:r>
               <a:r>
-                <a:rPr lang="en-GB" sz="3200" baseline="30000" dirty="0" smtClean="0"/>
+                <a:rPr lang="en-GB" sz="3200" baseline="30000" dirty="0"/>
                 <a:t>-1</a:t>
               </a:r>
               <a:r>
-                <a:rPr lang="en-GB" sz="3200" dirty="0" smtClean="0"/>
+                <a:rPr lang="en-GB" sz="3200" dirty="0"/>
                 <a:t>)</a:t>
               </a:r>
-              <a:endParaRPr lang="en-GB" sz="3200" dirty="0"/>
             </a:p>
           </p:txBody>
         </p:sp>
@@ -4491,7 +5356,7 @@
             <a:lstStyle/>
             <a:p>
               <a:r>
-                <a:rPr lang="en-GB" sz="2400" dirty="0" smtClean="0"/>
+                <a:rPr lang="en-GB" sz="2400" dirty="0"/>
                 <a:t>2.76</a:t>
               </a:r>
             </a:p>
@@ -4500,7 +5365,7 @@
             </a:p>
             <a:p>
               <a:r>
-                <a:rPr lang="en-GB" sz="2400" dirty="0" smtClean="0"/>
+                <a:rPr lang="en-GB" sz="2400" dirty="0"/>
                 <a:t>2.75</a:t>
               </a:r>
             </a:p>
@@ -4509,7 +5374,7 @@
             </a:p>
             <a:p>
               <a:r>
-                <a:rPr lang="en-GB" sz="2400" dirty="0" smtClean="0"/>
+                <a:rPr lang="en-GB" sz="2400" dirty="0"/>
                 <a:t>2.74</a:t>
               </a:r>
             </a:p>
@@ -4518,7 +5383,7 @@
             </a:p>
             <a:p>
               <a:r>
-                <a:rPr lang="en-GB" sz="2400" dirty="0" smtClean="0"/>
+                <a:rPr lang="en-GB" sz="2400" dirty="0"/>
                 <a:t>2.73</a:t>
               </a:r>
             </a:p>
@@ -4527,7 +5392,7 @@
             </a:p>
             <a:p>
               <a:r>
-                <a:rPr lang="en-GB" sz="2400" dirty="0" smtClean="0"/>
+                <a:rPr lang="en-GB" sz="2400" dirty="0"/>
                 <a:t>2.72</a:t>
               </a:r>
             </a:p>
@@ -4536,7 +5401,7 @@
             </a:p>
             <a:p>
               <a:r>
-                <a:rPr lang="en-GB" sz="2400" dirty="0" smtClean="0"/>
+                <a:rPr lang="en-GB" sz="2400" dirty="0"/>
                 <a:t>2.71</a:t>
               </a:r>
             </a:p>
@@ -4545,10 +5410,9 @@
             </a:p>
             <a:p>
               <a:r>
-                <a:rPr lang="en-GB" sz="2400" dirty="0" smtClean="0"/>
+                <a:rPr lang="en-GB" sz="2400" dirty="0"/>
                 <a:t>2.70</a:t>
               </a:r>
-              <a:endParaRPr lang="en-GB" sz="2400" dirty="0"/>
             </a:p>
           </p:txBody>
         </p:sp>
@@ -4575,10 +5439,9 @@
             <a:lstStyle/>
             <a:p>
               <a:r>
-                <a:rPr lang="en-GB" sz="2400" dirty="0" smtClean="0"/>
+                <a:rPr lang="en-GB" sz="2400" dirty="0"/>
                 <a:t>   99.6            99.8           100            100.2             100.4</a:t>
               </a:r>
-              <a:endParaRPr lang="en-GB" sz="2400" dirty="0"/>
             </a:p>
           </p:txBody>
         </p:sp>
@@ -4664,18 +5527,13 @@
           <a:lstStyle/>
           <a:p>
             <a:r>
-              <a:rPr lang="en-GB" sz="2400" dirty="0" smtClean="0">
+              <a:rPr lang="en-GB" sz="2400" dirty="0">
                 <a:solidFill>
                   <a:schemeClr val="bg1"/>
                 </a:solidFill>
               </a:rPr>
               <a:t>Hexagonal pit</a:t>
             </a:r>
-            <a:endParaRPr lang="en-GB" sz="2400" dirty="0">
-              <a:solidFill>
-                <a:schemeClr val="bg1"/>
-              </a:solidFill>
-            </a:endParaRPr>
           </a:p>
         </p:txBody>
       </p:sp>
@@ -4738,18 +5596,13 @@
           <a:lstStyle/>
           <a:p>
             <a:r>
-              <a:rPr lang="en-GB" sz="2400" dirty="0" smtClean="0">
+              <a:rPr lang="en-GB" sz="2400" dirty="0">
                 <a:solidFill>
                   <a:schemeClr val="bg1"/>
                 </a:solidFill>
               </a:rPr>
               <a:t>Profile taken ‘close’ to inclusion</a:t>
             </a:r>
-            <a:endParaRPr lang="en-GB" sz="2400" dirty="0">
-              <a:solidFill>
-                <a:schemeClr val="bg1"/>
-              </a:solidFill>
-            </a:endParaRPr>
           </a:p>
         </p:txBody>
       </p:sp>
@@ -4776,34 +5629,13 @@
           <a:lstStyle/>
           <a:p>
             <a:r>
-              <a:rPr lang="en-GB" sz="2400" dirty="0" smtClean="0">
+              <a:rPr lang="en-GB" sz="2400" dirty="0">
                 <a:solidFill>
                   <a:schemeClr val="bg1"/>
                 </a:solidFill>
               </a:rPr>
-              <a:t>Profile taken </a:t>
-            </a:r>
-            <a:r>
-              <a:rPr lang="en-GB" sz="2400" dirty="0" smtClean="0">
-                <a:solidFill>
-                  <a:schemeClr val="bg1"/>
-                </a:solidFill>
-              </a:rPr>
-              <a:t>‘far’ from </a:t>
-            </a:r>
-            <a:r>
-              <a:rPr lang="en-GB" sz="2400" dirty="0" smtClean="0">
-                <a:solidFill>
-                  <a:schemeClr val="bg1"/>
-                </a:solidFill>
-              </a:rPr>
-              <a:t>inclusion</a:t>
-            </a:r>
-            <a:endParaRPr lang="en-GB" sz="2400" dirty="0">
-              <a:solidFill>
-                <a:schemeClr val="bg1"/>
-              </a:solidFill>
-            </a:endParaRPr>
+              <a:t>Profile taken ‘far’ from inclusion</a:t>
+            </a:r>
           </a:p>
         </p:txBody>
       </p:sp>
@@ -4831,10 +5663,9 @@
           <a:p>
             <a:pPr algn="ctr"/>
             <a:r>
-              <a:rPr lang="en-GB" sz="2400" dirty="0" smtClean="0"/>
+              <a:rPr lang="en-GB" sz="2400" dirty="0"/>
               <a:t>X (µm)</a:t>
             </a:r>
-            <a:endParaRPr lang="en-GB" sz="2400" dirty="0"/>
           </a:p>
         </p:txBody>
       </p:sp>
@@ -4861,16 +5692,15 @@
           <a:lstStyle/>
           <a:p>
             <a:r>
-              <a:rPr lang="en-GB" sz="2400" dirty="0" smtClean="0"/>
+              <a:rPr lang="en-GB" sz="2400" dirty="0"/>
               <a:t>Y  (µm)</a:t>
             </a:r>
           </a:p>
           <a:p>
             <a:r>
-              <a:rPr lang="en-GB" sz="2400" dirty="0" smtClean="0"/>
+              <a:rPr lang="en-GB" sz="2400" dirty="0"/>
               <a:t> </a:t>
             </a:r>
-            <a:endParaRPr lang="en-GB" sz="2400" dirty="0"/>
           </a:p>
         </p:txBody>
       </p:sp>
@@ -4897,18 +5727,13 @@
           <a:lstStyle/>
           <a:p>
             <a:r>
-              <a:rPr lang="en-GB" sz="3200" dirty="0" smtClean="0">
+              <a:rPr lang="en-GB" sz="3200" dirty="0">
                 <a:solidFill>
                   <a:schemeClr val="bg1"/>
                 </a:solidFill>
               </a:rPr>
               <a:t>1</a:t>
             </a:r>
-            <a:endParaRPr lang="en-GB" sz="3200" dirty="0">
-              <a:solidFill>
-                <a:schemeClr val="bg1"/>
-              </a:solidFill>
-            </a:endParaRPr>
           </a:p>
         </p:txBody>
       </p:sp>
@@ -4935,18 +5760,13 @@
           <a:lstStyle/>
           <a:p>
             <a:r>
-              <a:rPr lang="en-GB" sz="3200" dirty="0" smtClean="0">
+              <a:rPr lang="en-GB" sz="3200" dirty="0">
                 <a:solidFill>
                   <a:schemeClr val="bg1"/>
                 </a:solidFill>
               </a:rPr>
               <a:t>QW2</a:t>
             </a:r>
-            <a:endParaRPr lang="en-GB" sz="3200" dirty="0">
-              <a:solidFill>
-                <a:schemeClr val="bg1"/>
-              </a:solidFill>
-            </a:endParaRPr>
           </a:p>
         </p:txBody>
       </p:sp>
@@ -4973,18 +5793,13 @@
           <a:lstStyle/>
           <a:p>
             <a:r>
-              <a:rPr lang="en-GB" sz="3200" dirty="0" smtClean="0">
+              <a:rPr lang="en-GB" sz="3200" dirty="0">
                 <a:solidFill>
                   <a:schemeClr val="bg1"/>
                 </a:solidFill>
               </a:rPr>
               <a:t>QW3</a:t>
             </a:r>
-            <a:endParaRPr lang="en-GB" sz="3200" dirty="0">
-              <a:solidFill>
-                <a:schemeClr val="bg1"/>
-              </a:solidFill>
-            </a:endParaRPr>
           </a:p>
         </p:txBody>
       </p:sp>
@@ -5011,18 +5826,13 @@
           <a:lstStyle/>
           <a:p>
             <a:r>
-              <a:rPr lang="en-GB" sz="3200" dirty="0" smtClean="0">
+              <a:rPr lang="en-GB" sz="3200" dirty="0">
                 <a:solidFill>
                   <a:schemeClr val="bg1"/>
                 </a:solidFill>
               </a:rPr>
               <a:t>QW4</a:t>
             </a:r>
-            <a:endParaRPr lang="en-GB" sz="3200" dirty="0">
-              <a:solidFill>
-                <a:schemeClr val="bg1"/>
-              </a:solidFill>
-            </a:endParaRPr>
           </a:p>
         </p:txBody>
       </p:sp>
@@ -5049,18 +5859,13 @@
           <a:lstStyle/>
           <a:p>
             <a:r>
-              <a:rPr lang="en-GB" sz="3200" dirty="0" smtClean="0">
+              <a:rPr lang="en-GB" sz="3200" dirty="0">
                 <a:solidFill>
                   <a:schemeClr val="bg1"/>
                 </a:solidFill>
               </a:rPr>
               <a:t>QW5</a:t>
             </a:r>
-            <a:endParaRPr lang="en-GB" sz="3200" dirty="0">
-              <a:solidFill>
-                <a:schemeClr val="bg1"/>
-              </a:solidFill>
-            </a:endParaRPr>
           </a:p>
         </p:txBody>
       </p:sp>
@@ -5074,17 +5879,10 @@
   <p:clrMapOvr>
     <a:masterClrMapping/>
   </p:clrMapOvr>
-  <p:timing>
-    <p:tnLst>
-      <p:par>
-        <p:cTn id="1" dur="indefinite" restart="never" nodeType="tmRoot"/>
-      </p:par>
-    </p:tnLst>
-  </p:timing>
 </p:sld>
 </file>
 
-<file path=ppt/slides/slide6.xml><?xml version="1.0" encoding="utf-8"?>
+<file path=ppt/slides/slide8.xml><?xml version="1.0" encoding="utf-8"?>
 <p:sld xmlns:a="http://schemas.openxmlformats.org/drawingml/2006/main" xmlns:r="http://schemas.openxmlformats.org/officeDocument/2006/relationships" xmlns:p="http://schemas.openxmlformats.org/presentationml/2006/main">
   <p:cSld>
     <p:spTree>
@@ -5154,10 +5952,9 @@
           <a:lstStyle/>
           <a:p>
             <a:r>
-              <a:rPr lang="en-GB" sz="3200" dirty="0" smtClean="0"/>
+              <a:rPr lang="en-GB" sz="3200" dirty="0"/>
               <a:t>QW1</a:t>
             </a:r>
-            <a:endParaRPr lang="en-GB" sz="3200" dirty="0"/>
           </a:p>
         </p:txBody>
       </p:sp>
@@ -5184,10 +5981,9 @@
           <a:lstStyle/>
           <a:p>
             <a:r>
-              <a:rPr lang="en-GB" sz="3200" dirty="0" smtClean="0"/>
+              <a:rPr lang="en-GB" sz="3200" dirty="0"/>
               <a:t>QW2</a:t>
             </a:r>
-            <a:endParaRPr lang="en-GB" sz="3200" dirty="0"/>
           </a:p>
         </p:txBody>
       </p:sp>
@@ -5214,10 +6010,9 @@
           <a:lstStyle/>
           <a:p>
             <a:r>
-              <a:rPr lang="en-GB" sz="3200" dirty="0" smtClean="0"/>
+              <a:rPr lang="en-GB" sz="3200" dirty="0"/>
               <a:t>QW3</a:t>
             </a:r>
-            <a:endParaRPr lang="en-GB" sz="3200" dirty="0"/>
           </a:p>
         </p:txBody>
       </p:sp>
@@ -5244,10 +6039,9 @@
           <a:lstStyle/>
           <a:p>
             <a:r>
-              <a:rPr lang="en-GB" sz="3200" dirty="0" smtClean="0"/>
+              <a:rPr lang="en-GB" sz="3200" dirty="0"/>
               <a:t>QW4</a:t>
             </a:r>
-            <a:endParaRPr lang="en-GB" sz="3200" dirty="0"/>
           </a:p>
         </p:txBody>
       </p:sp>
@@ -5274,10 +6068,9 @@
           <a:lstStyle/>
           <a:p>
             <a:r>
-              <a:rPr lang="en-GB" sz="3200" dirty="0" smtClean="0"/>
+              <a:rPr lang="en-GB" sz="3200" dirty="0"/>
               <a:t>QW5</a:t>
             </a:r>
-            <a:endParaRPr lang="en-GB" sz="3200" dirty="0"/>
           </a:p>
         </p:txBody>
       </p:sp>
@@ -5291,13 +6084,211 @@
   <p:clrMapOvr>
     <a:masterClrMapping/>
   </p:clrMapOvr>
-  <p:timing>
-    <p:tnLst>
-      <p:par>
-        <p:cTn id="1" dur="indefinite" restart="never" nodeType="tmRoot"/>
-      </p:par>
-    </p:tnLst>
-  </p:timing>
+</p:sld>
+</file>
+
+<file path=ppt/slides/slide9.xml><?xml version="1.0" encoding="utf-8"?>
+<p:sld xmlns:a="http://schemas.openxmlformats.org/drawingml/2006/main" xmlns:r="http://schemas.openxmlformats.org/officeDocument/2006/relationships" xmlns:p="http://schemas.openxmlformats.org/presentationml/2006/main">
+  <p:cSld>
+    <p:spTree>
+      <p:nvGrpSpPr>
+        <p:cNvPr id="1" name=""/>
+        <p:cNvGrpSpPr/>
+        <p:nvPr/>
+      </p:nvGrpSpPr>
+      <p:grpSpPr>
+        <a:xfrm>
+          <a:off x="0" y="0"/>
+          <a:ext cx="0" cy="0"/>
+          <a:chOff x="0" y="0"/>
+          <a:chExt cx="0" cy="0"/>
+        </a:xfrm>
+      </p:grpSpPr>
+      <p:pic>
+        <p:nvPicPr>
+          <p:cNvPr id="11" name="Picture 10"/>
+          <p:cNvPicPr>
+            <a:picLocks noChangeAspect="1"/>
+          </p:cNvPicPr>
+          <p:nvPr/>
+        </p:nvPicPr>
+        <p:blipFill>
+          <a:blip r:embed="rId2" cstate="print">
+            <a:extLst>
+              <a:ext uri="{28A0092B-C50C-407E-A947-70E740481C1C}">
+                <a14:useLocalDpi xmlns:a14="http://schemas.microsoft.com/office/drawing/2010/main" val="0"/>
+              </a:ext>
+            </a:extLst>
+          </a:blip>
+          <a:stretch>
+            <a:fillRect/>
+          </a:stretch>
+        </p:blipFill>
+        <p:spPr>
+          <a:xfrm>
+            <a:off x="1415684" y="216976"/>
+            <a:ext cx="9144019" cy="6400813"/>
+          </a:xfrm>
+          <a:prstGeom prst="rect">
+            <a:avLst/>
+          </a:prstGeom>
+        </p:spPr>
+      </p:pic>
+      <p:sp>
+        <p:nvSpPr>
+          <p:cNvPr id="14" name="TextBox 13"/>
+          <p:cNvSpPr txBox="1"/>
+          <p:nvPr/>
+        </p:nvSpPr>
+        <p:spPr>
+          <a:xfrm>
+            <a:off x="2553772" y="3617578"/>
+            <a:ext cx="1083243" cy="584775"/>
+          </a:xfrm>
+          <a:prstGeom prst="rect">
+            <a:avLst/>
+          </a:prstGeom>
+          <a:noFill/>
+        </p:spPr>
+        <p:txBody>
+          <a:bodyPr wrap="square" rtlCol="0">
+            <a:spAutoFit/>
+          </a:bodyPr>
+          <a:lstStyle/>
+          <a:p>
+            <a:r>
+              <a:rPr lang="en-GB" sz="3200" dirty="0"/>
+              <a:t>QW1</a:t>
+            </a:r>
+          </a:p>
+        </p:txBody>
+      </p:sp>
+      <p:sp>
+        <p:nvSpPr>
+          <p:cNvPr id="15" name="TextBox 14"/>
+          <p:cNvSpPr txBox="1"/>
+          <p:nvPr/>
+        </p:nvSpPr>
+        <p:spPr>
+          <a:xfrm>
+            <a:off x="3919380" y="3658632"/>
+            <a:ext cx="1083243" cy="584775"/>
+          </a:xfrm>
+          <a:prstGeom prst="rect">
+            <a:avLst/>
+          </a:prstGeom>
+          <a:noFill/>
+        </p:spPr>
+        <p:txBody>
+          <a:bodyPr wrap="square" rtlCol="0">
+            <a:spAutoFit/>
+          </a:bodyPr>
+          <a:lstStyle/>
+          <a:p>
+            <a:r>
+              <a:rPr lang="en-GB" sz="3200" dirty="0"/>
+              <a:t>QW2</a:t>
+            </a:r>
+          </a:p>
+        </p:txBody>
+      </p:sp>
+      <p:sp>
+        <p:nvSpPr>
+          <p:cNvPr id="16" name="TextBox 15"/>
+          <p:cNvSpPr txBox="1"/>
+          <p:nvPr/>
+        </p:nvSpPr>
+        <p:spPr>
+          <a:xfrm>
+            <a:off x="5446071" y="3684190"/>
+            <a:ext cx="1083243" cy="584775"/>
+          </a:xfrm>
+          <a:prstGeom prst="rect">
+            <a:avLst/>
+          </a:prstGeom>
+          <a:noFill/>
+        </p:spPr>
+        <p:txBody>
+          <a:bodyPr wrap="square" rtlCol="0">
+            <a:spAutoFit/>
+          </a:bodyPr>
+          <a:lstStyle/>
+          <a:p>
+            <a:r>
+              <a:rPr lang="en-GB" sz="3200" dirty="0"/>
+              <a:t>QW3</a:t>
+            </a:r>
+          </a:p>
+        </p:txBody>
+      </p:sp>
+      <p:sp>
+        <p:nvSpPr>
+          <p:cNvPr id="17" name="TextBox 16"/>
+          <p:cNvSpPr txBox="1"/>
+          <p:nvPr/>
+        </p:nvSpPr>
+        <p:spPr>
+          <a:xfrm>
+            <a:off x="6844930" y="3704309"/>
+            <a:ext cx="1083243" cy="584775"/>
+          </a:xfrm>
+          <a:prstGeom prst="rect">
+            <a:avLst/>
+          </a:prstGeom>
+          <a:noFill/>
+        </p:spPr>
+        <p:txBody>
+          <a:bodyPr wrap="square" rtlCol="0">
+            <a:spAutoFit/>
+          </a:bodyPr>
+          <a:lstStyle/>
+          <a:p>
+            <a:r>
+              <a:rPr lang="en-GB" sz="3200" dirty="0"/>
+              <a:t>QW4</a:t>
+            </a:r>
+          </a:p>
+        </p:txBody>
+      </p:sp>
+      <p:sp>
+        <p:nvSpPr>
+          <p:cNvPr id="18" name="TextBox 17"/>
+          <p:cNvSpPr txBox="1"/>
+          <p:nvPr/>
+        </p:nvSpPr>
+        <p:spPr>
+          <a:xfrm>
+            <a:off x="8243789" y="3704309"/>
+            <a:ext cx="1083243" cy="584775"/>
+          </a:xfrm>
+          <a:prstGeom prst="rect">
+            <a:avLst/>
+          </a:prstGeom>
+          <a:noFill/>
+        </p:spPr>
+        <p:txBody>
+          <a:bodyPr wrap="square" rtlCol="0">
+            <a:spAutoFit/>
+          </a:bodyPr>
+          <a:lstStyle/>
+          <a:p>
+            <a:r>
+              <a:rPr lang="en-GB" sz="3200" dirty="0"/>
+              <a:t>QW5</a:t>
+            </a:r>
+          </a:p>
+        </p:txBody>
+      </p:sp>
+    </p:spTree>
+    <p:extLst>
+      <p:ext uri="{BB962C8B-B14F-4D97-AF65-F5344CB8AC3E}">
+        <p14:creationId xmlns:p14="http://schemas.microsoft.com/office/powerpoint/2010/main" val="712758160"/>
+      </p:ext>
+    </p:extLst>
+  </p:cSld>
+  <p:clrMapOvr>
+    <a:masterClrMapping/>
+  </p:clrMapOvr>
 </p:sld>
 </file>
 

</xml_diff>

<commit_message>
Ch3 light escape cones
Ch3 light escape cones
</commit_message>
<xml_diff>
--- a/Figs/Correction-Figs/Presentation1.pptx
+++ b/Figs/Correction-Figs/Presentation1.pptx
@@ -17,6 +17,8 @@
     <p:sldId id="266" r:id="rId11"/>
     <p:sldId id="262" r:id="rId12"/>
     <p:sldId id="267" r:id="rId13"/>
+    <p:sldId id="268" r:id="rId14"/>
+    <p:sldId id="269" r:id="rId15"/>
   </p:sldIdLst>
   <p:sldSz cx="12192000" cy="6858000"/>
   <p:notesSz cx="6858000" cy="9144000"/>
@@ -254,7 +256,7 @@
           <a:p>
             <a:fld id="{102B808B-2D38-421D-9FDF-2C2569731BC7}" type="datetimeFigureOut">
               <a:rPr lang="en-GB" smtClean="0"/>
-              <a:t>20/03/2017</a:t>
+              <a:t>21/03/2017</a:t>
             </a:fld>
             <a:endParaRPr lang="en-GB"/>
           </a:p>
@@ -424,7 +426,7 @@
           <a:p>
             <a:fld id="{102B808B-2D38-421D-9FDF-2C2569731BC7}" type="datetimeFigureOut">
               <a:rPr lang="en-GB" smtClean="0"/>
-              <a:t>20/03/2017</a:t>
+              <a:t>21/03/2017</a:t>
             </a:fld>
             <a:endParaRPr lang="en-GB"/>
           </a:p>
@@ -604,7 +606,7 @@
           <a:p>
             <a:fld id="{102B808B-2D38-421D-9FDF-2C2569731BC7}" type="datetimeFigureOut">
               <a:rPr lang="en-GB" smtClean="0"/>
-              <a:t>20/03/2017</a:t>
+              <a:t>21/03/2017</a:t>
             </a:fld>
             <a:endParaRPr lang="en-GB"/>
           </a:p>
@@ -774,7 +776,7 @@
           <a:p>
             <a:fld id="{102B808B-2D38-421D-9FDF-2C2569731BC7}" type="datetimeFigureOut">
               <a:rPr lang="en-GB" smtClean="0"/>
-              <a:t>20/03/2017</a:t>
+              <a:t>21/03/2017</a:t>
             </a:fld>
             <a:endParaRPr lang="en-GB"/>
           </a:p>
@@ -1020,7 +1022,7 @@
           <a:p>
             <a:fld id="{102B808B-2D38-421D-9FDF-2C2569731BC7}" type="datetimeFigureOut">
               <a:rPr lang="en-GB" smtClean="0"/>
-              <a:t>20/03/2017</a:t>
+              <a:t>21/03/2017</a:t>
             </a:fld>
             <a:endParaRPr lang="en-GB"/>
           </a:p>
@@ -1252,7 +1254,7 @@
           <a:p>
             <a:fld id="{102B808B-2D38-421D-9FDF-2C2569731BC7}" type="datetimeFigureOut">
               <a:rPr lang="en-GB" smtClean="0"/>
-              <a:t>20/03/2017</a:t>
+              <a:t>21/03/2017</a:t>
             </a:fld>
             <a:endParaRPr lang="en-GB"/>
           </a:p>
@@ -1619,7 +1621,7 @@
           <a:p>
             <a:fld id="{102B808B-2D38-421D-9FDF-2C2569731BC7}" type="datetimeFigureOut">
               <a:rPr lang="en-GB" smtClean="0"/>
-              <a:t>20/03/2017</a:t>
+              <a:t>21/03/2017</a:t>
             </a:fld>
             <a:endParaRPr lang="en-GB"/>
           </a:p>
@@ -1737,7 +1739,7 @@
           <a:p>
             <a:fld id="{102B808B-2D38-421D-9FDF-2C2569731BC7}" type="datetimeFigureOut">
               <a:rPr lang="en-GB" smtClean="0"/>
-              <a:t>20/03/2017</a:t>
+              <a:t>21/03/2017</a:t>
             </a:fld>
             <a:endParaRPr lang="en-GB"/>
           </a:p>
@@ -1832,7 +1834,7 @@
           <a:p>
             <a:fld id="{102B808B-2D38-421D-9FDF-2C2569731BC7}" type="datetimeFigureOut">
               <a:rPr lang="en-GB" smtClean="0"/>
-              <a:t>20/03/2017</a:t>
+              <a:t>21/03/2017</a:t>
             </a:fld>
             <a:endParaRPr lang="en-GB"/>
           </a:p>
@@ -2109,7 +2111,7 @@
           <a:p>
             <a:fld id="{102B808B-2D38-421D-9FDF-2C2569731BC7}" type="datetimeFigureOut">
               <a:rPr lang="en-GB" smtClean="0"/>
-              <a:t>20/03/2017</a:t>
+              <a:t>21/03/2017</a:t>
             </a:fld>
             <a:endParaRPr lang="en-GB"/>
           </a:p>
@@ -2362,7 +2364,7 @@
           <a:p>
             <a:fld id="{102B808B-2D38-421D-9FDF-2C2569731BC7}" type="datetimeFigureOut">
               <a:rPr lang="en-GB" smtClean="0"/>
-              <a:t>20/03/2017</a:t>
+              <a:t>21/03/2017</a:t>
             </a:fld>
             <a:endParaRPr lang="en-GB"/>
           </a:p>
@@ -2575,7 +2577,7 @@
           <a:p>
             <a:fld id="{102B808B-2D38-421D-9FDF-2C2569731BC7}" type="datetimeFigureOut">
               <a:rPr lang="en-GB" smtClean="0"/>
-              <a:t>20/03/2017</a:t>
+              <a:t>21/03/2017</a:t>
             </a:fld>
             <a:endParaRPr lang="en-GB"/>
           </a:p>
@@ -3554,6 +3556,1090 @@
 </p:sld>
 </file>
 
+<file path=ppt/slides/slide13.xml><?xml version="1.0" encoding="utf-8"?>
+<p:sld xmlns:a="http://schemas.openxmlformats.org/drawingml/2006/main" xmlns:r="http://schemas.openxmlformats.org/officeDocument/2006/relationships" xmlns:p="http://schemas.openxmlformats.org/presentationml/2006/main">
+  <p:cSld>
+    <p:spTree>
+      <p:nvGrpSpPr>
+        <p:cNvPr id="1" name=""/>
+        <p:cNvGrpSpPr/>
+        <p:nvPr/>
+      </p:nvGrpSpPr>
+      <p:grpSpPr>
+        <a:xfrm>
+          <a:off x="0" y="0"/>
+          <a:ext cx="0" cy="0"/>
+          <a:chOff x="0" y="0"/>
+          <a:chExt cx="0" cy="0"/>
+        </a:xfrm>
+      </p:grpSpPr>
+      <p:pic>
+        <p:nvPicPr>
+          <p:cNvPr id="4" name="Picture 3"/>
+          <p:cNvPicPr>
+            <a:picLocks noChangeAspect="1"/>
+          </p:cNvPicPr>
+          <p:nvPr/>
+        </p:nvPicPr>
+        <p:blipFill>
+          <a:blip r:embed="rId2"/>
+          <a:stretch>
+            <a:fillRect/>
+          </a:stretch>
+        </p:blipFill>
+        <p:spPr>
+          <a:xfrm>
+            <a:off x="3654569" y="1655618"/>
+            <a:ext cx="3430976" cy="2842492"/>
+          </a:xfrm>
+          <a:prstGeom prst="rect">
+            <a:avLst/>
+          </a:prstGeom>
+        </p:spPr>
+      </p:pic>
+      <p:sp>
+        <p:nvSpPr>
+          <p:cNvPr id="5" name="TextBox 4"/>
+          <p:cNvSpPr txBox="1"/>
+          <p:nvPr/>
+        </p:nvSpPr>
+        <p:spPr>
+          <a:xfrm>
+            <a:off x="4341090" y="1856510"/>
+            <a:ext cx="1154546" cy="369332"/>
+          </a:xfrm>
+          <a:prstGeom prst="rect">
+            <a:avLst/>
+          </a:prstGeom>
+          <a:noFill/>
+        </p:spPr>
+        <p:txBody>
+          <a:bodyPr wrap="square" rtlCol="0">
+            <a:spAutoFit/>
+          </a:bodyPr>
+          <a:lstStyle/>
+          <a:p>
+            <a:r>
+              <a:rPr lang="el-GR" dirty="0"/>
+              <a:t>Θ</a:t>
+            </a:r>
+            <a:r>
+              <a:rPr lang="en-GB" dirty="0"/>
+              <a:t> = </a:t>
+            </a:r>
+          </a:p>
+        </p:txBody>
+      </p:sp>
+      <p:sp>
+        <p:nvSpPr>
+          <p:cNvPr id="6" name="TextBox 5"/>
+          <p:cNvSpPr txBox="1"/>
+          <p:nvPr/>
+        </p:nvSpPr>
+        <p:spPr>
+          <a:xfrm>
+            <a:off x="6440781" y="1881791"/>
+            <a:ext cx="2115127" cy="646331"/>
+          </a:xfrm>
+          <a:prstGeom prst="rect">
+            <a:avLst/>
+          </a:prstGeom>
+          <a:noFill/>
+        </p:spPr>
+        <p:txBody>
+          <a:bodyPr wrap="square" rtlCol="0">
+            <a:spAutoFit/>
+          </a:bodyPr>
+          <a:lstStyle/>
+          <a:p>
+            <a:r>
+              <a:rPr lang="en-GB" dirty="0"/>
+              <a:t>Light escape cone for a single point</a:t>
+            </a:r>
+          </a:p>
+        </p:txBody>
+      </p:sp>
+      <p:cxnSp>
+        <p:nvCxnSpPr>
+          <p:cNvPr id="7" name="Straight Arrow Connector 6"/>
+          <p:cNvCxnSpPr>
+            <a:cxnSpLocks/>
+          </p:cNvCxnSpPr>
+          <p:nvPr/>
+        </p:nvCxnSpPr>
+        <p:spPr>
+          <a:xfrm flipH="1">
+            <a:off x="5763491" y="2107964"/>
+            <a:ext cx="718040" cy="709127"/>
+          </a:xfrm>
+          <a:prstGeom prst="straightConnector1">
+            <a:avLst/>
+          </a:prstGeom>
+          <a:ln w="47625">
+            <a:solidFill>
+              <a:srgbClr val="0070C0"/>
+            </a:solidFill>
+            <a:tailEnd type="triangle"/>
+          </a:ln>
+        </p:spPr>
+        <p:style>
+          <a:lnRef idx="1">
+            <a:schemeClr val="accent1"/>
+          </a:lnRef>
+          <a:fillRef idx="0">
+            <a:schemeClr val="accent1"/>
+          </a:fillRef>
+          <a:effectRef idx="0">
+            <a:schemeClr val="accent1"/>
+          </a:effectRef>
+          <a:fontRef idx="minor">
+            <a:schemeClr val="tx1"/>
+          </a:fontRef>
+        </p:style>
+      </p:cxnSp>
+    </p:spTree>
+    <p:extLst>
+      <p:ext uri="{BB962C8B-B14F-4D97-AF65-F5344CB8AC3E}">
+        <p14:creationId xmlns:p14="http://schemas.microsoft.com/office/powerpoint/2010/main" val="1598958158"/>
+      </p:ext>
+    </p:extLst>
+  </p:cSld>
+  <p:clrMapOvr>
+    <a:masterClrMapping/>
+  </p:clrMapOvr>
+</p:sld>
+</file>
+
+<file path=ppt/slides/slide14.xml><?xml version="1.0" encoding="utf-8"?>
+<p:sld xmlns:a="http://schemas.openxmlformats.org/drawingml/2006/main" xmlns:r="http://schemas.openxmlformats.org/officeDocument/2006/relationships" xmlns:p="http://schemas.openxmlformats.org/presentationml/2006/main">
+  <p:cSld>
+    <p:spTree>
+      <p:nvGrpSpPr>
+        <p:cNvPr id="1" name=""/>
+        <p:cNvGrpSpPr/>
+        <p:nvPr/>
+      </p:nvGrpSpPr>
+      <p:grpSpPr>
+        <a:xfrm>
+          <a:off x="0" y="0"/>
+          <a:ext cx="0" cy="0"/>
+          <a:chOff x="0" y="0"/>
+          <a:chExt cx="0" cy="0"/>
+        </a:xfrm>
+      </p:grpSpPr>
+      <p:sp>
+        <p:nvSpPr>
+          <p:cNvPr id="4" name="Hexagon 3"/>
+          <p:cNvSpPr/>
+          <p:nvPr/>
+        </p:nvSpPr>
+        <p:spPr>
+          <a:xfrm>
+            <a:off x="3159930" y="1795494"/>
+            <a:ext cx="1232899" cy="1156267"/>
+          </a:xfrm>
+          <a:prstGeom prst="hexagon">
+            <a:avLst/>
+          </a:prstGeom>
+          <a:solidFill>
+            <a:schemeClr val="bg1"/>
+          </a:solidFill>
+          <a:ln w="76200"/>
+        </p:spPr>
+        <p:style>
+          <a:lnRef idx="2">
+            <a:schemeClr val="accent1">
+              <a:shade val="50000"/>
+            </a:schemeClr>
+          </a:lnRef>
+          <a:fillRef idx="1">
+            <a:schemeClr val="accent1"/>
+          </a:fillRef>
+          <a:effectRef idx="0">
+            <a:schemeClr val="accent1"/>
+          </a:effectRef>
+          <a:fontRef idx="minor">
+            <a:schemeClr val="lt1"/>
+          </a:fontRef>
+        </p:style>
+        <p:txBody>
+          <a:bodyPr rtlCol="0" anchor="ctr"/>
+          <a:lstStyle/>
+          <a:p>
+            <a:pPr algn="ctr"/>
+            <a:endParaRPr lang="en-GB" dirty="0">
+              <a:solidFill>
+                <a:schemeClr val="tx1"/>
+              </a:solidFill>
+            </a:endParaRPr>
+          </a:p>
+        </p:txBody>
+      </p:sp>
+      <p:sp>
+        <p:nvSpPr>
+          <p:cNvPr id="6" name="Hexagon 5"/>
+          <p:cNvSpPr/>
+          <p:nvPr/>
+        </p:nvSpPr>
+        <p:spPr>
+          <a:xfrm>
+            <a:off x="3035922" y="1671840"/>
+            <a:ext cx="1480914" cy="1401853"/>
+          </a:xfrm>
+          <a:prstGeom prst="hexagon">
+            <a:avLst/>
+          </a:prstGeom>
+          <a:noFill/>
+          <a:ln w="180975">
+            <a:solidFill>
+              <a:srgbClr val="FF0000"/>
+            </a:solidFill>
+          </a:ln>
+        </p:spPr>
+        <p:style>
+          <a:lnRef idx="2">
+            <a:schemeClr val="accent1">
+              <a:shade val="50000"/>
+            </a:schemeClr>
+          </a:lnRef>
+          <a:fillRef idx="1">
+            <a:schemeClr val="accent1"/>
+          </a:fillRef>
+          <a:effectRef idx="0">
+            <a:schemeClr val="accent1"/>
+          </a:effectRef>
+          <a:fontRef idx="minor">
+            <a:schemeClr val="lt1"/>
+          </a:fontRef>
+        </p:style>
+        <p:txBody>
+          <a:bodyPr rtlCol="0" anchor="ctr"/>
+          <a:lstStyle/>
+          <a:p>
+            <a:pPr algn="ctr"/>
+            <a:endParaRPr lang="en-GB" dirty="0">
+              <a:solidFill>
+                <a:schemeClr val="tx1"/>
+              </a:solidFill>
+            </a:endParaRPr>
+          </a:p>
+        </p:txBody>
+      </p:sp>
+      <p:cxnSp>
+        <p:nvCxnSpPr>
+          <p:cNvPr id="8" name="Straight Arrow Connector 7"/>
+          <p:cNvCxnSpPr>
+            <a:cxnSpLocks/>
+          </p:cNvCxnSpPr>
+          <p:nvPr/>
+        </p:nvCxnSpPr>
+        <p:spPr>
+          <a:xfrm flipH="1">
+            <a:off x="4392829" y="1632702"/>
+            <a:ext cx="544945" cy="118351"/>
+          </a:xfrm>
+          <a:prstGeom prst="straightConnector1">
+            <a:avLst/>
+          </a:prstGeom>
+          <a:ln w="47625">
+            <a:solidFill>
+              <a:srgbClr val="FF0000"/>
+            </a:solidFill>
+            <a:tailEnd type="triangle"/>
+          </a:ln>
+        </p:spPr>
+        <p:style>
+          <a:lnRef idx="1">
+            <a:schemeClr val="accent1"/>
+          </a:lnRef>
+          <a:fillRef idx="0">
+            <a:schemeClr val="accent1"/>
+          </a:fillRef>
+          <a:effectRef idx="0">
+            <a:schemeClr val="accent1"/>
+          </a:effectRef>
+          <a:fontRef idx="minor">
+            <a:schemeClr val="tx1"/>
+          </a:fontRef>
+        </p:style>
+      </p:cxnSp>
+      <p:sp>
+        <p:nvSpPr>
+          <p:cNvPr id="10" name="TextBox 9"/>
+          <p:cNvSpPr txBox="1"/>
+          <p:nvPr/>
+        </p:nvSpPr>
+        <p:spPr>
+          <a:xfrm>
+            <a:off x="4918717" y="1309536"/>
+            <a:ext cx="2115127" cy="646331"/>
+          </a:xfrm>
+          <a:prstGeom prst="rect">
+            <a:avLst/>
+          </a:prstGeom>
+          <a:noFill/>
+        </p:spPr>
+        <p:txBody>
+          <a:bodyPr wrap="square" rtlCol="0">
+            <a:spAutoFit/>
+          </a:bodyPr>
+          <a:lstStyle/>
+          <a:p>
+            <a:r>
+              <a:rPr lang="en-GB" dirty="0"/>
+              <a:t>Enhanced radiative recombination</a:t>
+            </a:r>
+          </a:p>
+        </p:txBody>
+      </p:sp>
+      <p:sp>
+        <p:nvSpPr>
+          <p:cNvPr id="11" name="TextBox 10"/>
+          <p:cNvSpPr txBox="1"/>
+          <p:nvPr/>
+        </p:nvSpPr>
+        <p:spPr>
+          <a:xfrm>
+            <a:off x="4538090" y="3154746"/>
+            <a:ext cx="2115127" cy="646331"/>
+          </a:xfrm>
+          <a:prstGeom prst="rect">
+            <a:avLst/>
+          </a:prstGeom>
+          <a:noFill/>
+        </p:spPr>
+        <p:txBody>
+          <a:bodyPr wrap="square" rtlCol="0">
+            <a:spAutoFit/>
+          </a:bodyPr>
+          <a:lstStyle/>
+          <a:p>
+            <a:r>
+              <a:rPr lang="en-GB" dirty="0"/>
+              <a:t>Hexagonal defect boundary</a:t>
+            </a:r>
+          </a:p>
+        </p:txBody>
+      </p:sp>
+      <p:cxnSp>
+        <p:nvCxnSpPr>
+          <p:cNvPr id="12" name="Straight Arrow Connector 11"/>
+          <p:cNvCxnSpPr>
+            <a:cxnSpLocks/>
+          </p:cNvCxnSpPr>
+          <p:nvPr/>
+        </p:nvCxnSpPr>
+        <p:spPr>
+          <a:xfrm flipH="1" flipV="1">
+            <a:off x="4176744" y="2928573"/>
+            <a:ext cx="402096" cy="452346"/>
+          </a:xfrm>
+          <a:prstGeom prst="straightConnector1">
+            <a:avLst/>
+          </a:prstGeom>
+          <a:ln w="47625">
+            <a:solidFill>
+              <a:srgbClr val="0070C0"/>
+            </a:solidFill>
+            <a:tailEnd type="triangle"/>
+          </a:ln>
+        </p:spPr>
+        <p:style>
+          <a:lnRef idx="1">
+            <a:schemeClr val="accent1"/>
+          </a:lnRef>
+          <a:fillRef idx="0">
+            <a:schemeClr val="accent1"/>
+          </a:fillRef>
+          <a:effectRef idx="0">
+            <a:schemeClr val="accent1"/>
+          </a:effectRef>
+          <a:fontRef idx="minor">
+            <a:schemeClr val="tx1"/>
+          </a:fontRef>
+        </p:style>
+      </p:cxnSp>
+      <p:sp>
+        <p:nvSpPr>
+          <p:cNvPr id="14" name="Hexagon 13"/>
+          <p:cNvSpPr/>
+          <p:nvPr/>
+        </p:nvSpPr>
+        <p:spPr>
+          <a:xfrm>
+            <a:off x="7755021" y="1795494"/>
+            <a:ext cx="1232899" cy="1156267"/>
+          </a:xfrm>
+          <a:prstGeom prst="hexagon">
+            <a:avLst/>
+          </a:prstGeom>
+          <a:solidFill>
+            <a:schemeClr val="bg1"/>
+          </a:solidFill>
+          <a:ln w="76200"/>
+        </p:spPr>
+        <p:style>
+          <a:lnRef idx="2">
+            <a:schemeClr val="accent1">
+              <a:shade val="50000"/>
+            </a:schemeClr>
+          </a:lnRef>
+          <a:fillRef idx="1">
+            <a:schemeClr val="accent1"/>
+          </a:fillRef>
+          <a:effectRef idx="0">
+            <a:schemeClr val="accent1"/>
+          </a:effectRef>
+          <a:fontRef idx="minor">
+            <a:schemeClr val="lt1"/>
+          </a:fontRef>
+        </p:style>
+        <p:txBody>
+          <a:bodyPr rtlCol="0" anchor="ctr"/>
+          <a:lstStyle/>
+          <a:p>
+            <a:pPr algn="ctr"/>
+            <a:endParaRPr lang="en-GB" dirty="0">
+              <a:solidFill>
+                <a:schemeClr val="tx1"/>
+              </a:solidFill>
+            </a:endParaRPr>
+          </a:p>
+        </p:txBody>
+      </p:sp>
+      <p:sp>
+        <p:nvSpPr>
+          <p:cNvPr id="15" name="Hexagon 14"/>
+          <p:cNvSpPr/>
+          <p:nvPr/>
+        </p:nvSpPr>
+        <p:spPr>
+          <a:xfrm>
+            <a:off x="7631013" y="1671840"/>
+            <a:ext cx="1480914" cy="1401853"/>
+          </a:xfrm>
+          <a:prstGeom prst="hexagon">
+            <a:avLst/>
+          </a:prstGeom>
+          <a:noFill/>
+          <a:ln w="180975">
+            <a:solidFill>
+              <a:srgbClr val="FF0000"/>
+            </a:solidFill>
+          </a:ln>
+        </p:spPr>
+        <p:style>
+          <a:lnRef idx="2">
+            <a:schemeClr val="accent1">
+              <a:shade val="50000"/>
+            </a:schemeClr>
+          </a:lnRef>
+          <a:fillRef idx="1">
+            <a:schemeClr val="accent1"/>
+          </a:fillRef>
+          <a:effectRef idx="0">
+            <a:schemeClr val="accent1"/>
+          </a:effectRef>
+          <a:fontRef idx="minor">
+            <a:schemeClr val="lt1"/>
+          </a:fontRef>
+        </p:style>
+        <p:txBody>
+          <a:bodyPr rtlCol="0" anchor="ctr"/>
+          <a:lstStyle/>
+          <a:p>
+            <a:pPr algn="ctr"/>
+            <a:endParaRPr lang="en-GB" dirty="0">
+              <a:solidFill>
+                <a:schemeClr val="tx1"/>
+              </a:solidFill>
+            </a:endParaRPr>
+          </a:p>
+        </p:txBody>
+      </p:sp>
+      <p:sp>
+        <p:nvSpPr>
+          <p:cNvPr id="16" name="Oval 15"/>
+          <p:cNvSpPr/>
+          <p:nvPr/>
+        </p:nvSpPr>
+        <p:spPr>
+          <a:xfrm>
+            <a:off x="7389988" y="1153501"/>
+            <a:ext cx="1162958" cy="1182255"/>
+          </a:xfrm>
+          <a:prstGeom prst="ellipse">
+            <a:avLst/>
+          </a:prstGeom>
+          <a:solidFill>
+            <a:schemeClr val="accent1">
+              <a:alpha val="60000"/>
+            </a:schemeClr>
+          </a:solidFill>
+        </p:spPr>
+        <p:style>
+          <a:lnRef idx="2">
+            <a:schemeClr val="accent1">
+              <a:shade val="50000"/>
+            </a:schemeClr>
+          </a:lnRef>
+          <a:fillRef idx="1">
+            <a:schemeClr val="accent1"/>
+          </a:fillRef>
+          <a:effectRef idx="0">
+            <a:schemeClr val="accent1"/>
+          </a:effectRef>
+          <a:fontRef idx="minor">
+            <a:schemeClr val="lt1"/>
+          </a:fontRef>
+        </p:style>
+        <p:txBody>
+          <a:bodyPr rtlCol="0" anchor="ctr"/>
+          <a:lstStyle/>
+          <a:p>
+            <a:pPr algn="ctr"/>
+            <a:endParaRPr lang="en-GB"/>
+          </a:p>
+        </p:txBody>
+      </p:sp>
+      <p:sp>
+        <p:nvSpPr>
+          <p:cNvPr id="17" name="Oval 16"/>
+          <p:cNvSpPr/>
+          <p:nvPr/>
+        </p:nvSpPr>
+        <p:spPr>
+          <a:xfrm>
+            <a:off x="7843302" y="1137577"/>
+            <a:ext cx="1162958" cy="1182255"/>
+          </a:xfrm>
+          <a:prstGeom prst="ellipse">
+            <a:avLst/>
+          </a:prstGeom>
+          <a:solidFill>
+            <a:schemeClr val="accent1">
+              <a:alpha val="60000"/>
+            </a:schemeClr>
+          </a:solidFill>
+        </p:spPr>
+        <p:style>
+          <a:lnRef idx="2">
+            <a:schemeClr val="accent1">
+              <a:shade val="50000"/>
+            </a:schemeClr>
+          </a:lnRef>
+          <a:fillRef idx="1">
+            <a:schemeClr val="accent1"/>
+          </a:fillRef>
+          <a:effectRef idx="0">
+            <a:schemeClr val="accent1"/>
+          </a:effectRef>
+          <a:fontRef idx="minor">
+            <a:schemeClr val="lt1"/>
+          </a:fontRef>
+        </p:style>
+        <p:txBody>
+          <a:bodyPr rtlCol="0" anchor="ctr"/>
+          <a:lstStyle/>
+          <a:p>
+            <a:pPr algn="ctr"/>
+            <a:endParaRPr lang="en-GB"/>
+          </a:p>
+        </p:txBody>
+      </p:sp>
+      <p:sp>
+        <p:nvSpPr>
+          <p:cNvPr id="18" name="Oval 17"/>
+          <p:cNvSpPr/>
+          <p:nvPr/>
+        </p:nvSpPr>
+        <p:spPr>
+          <a:xfrm>
+            <a:off x="8370631" y="1405539"/>
+            <a:ext cx="1162958" cy="1182255"/>
+          </a:xfrm>
+          <a:prstGeom prst="ellipse">
+            <a:avLst/>
+          </a:prstGeom>
+          <a:solidFill>
+            <a:schemeClr val="accent1">
+              <a:alpha val="60000"/>
+            </a:schemeClr>
+          </a:solidFill>
+        </p:spPr>
+        <p:style>
+          <a:lnRef idx="2">
+            <a:schemeClr val="accent1">
+              <a:shade val="50000"/>
+            </a:schemeClr>
+          </a:lnRef>
+          <a:fillRef idx="1">
+            <a:schemeClr val="accent1"/>
+          </a:fillRef>
+          <a:effectRef idx="0">
+            <a:schemeClr val="accent1"/>
+          </a:effectRef>
+          <a:fontRef idx="minor">
+            <a:schemeClr val="lt1"/>
+          </a:fontRef>
+        </p:style>
+        <p:txBody>
+          <a:bodyPr rtlCol="0" anchor="ctr"/>
+          <a:lstStyle/>
+          <a:p>
+            <a:pPr algn="ctr"/>
+            <a:endParaRPr lang="en-GB"/>
+          </a:p>
+        </p:txBody>
+      </p:sp>
+      <p:sp>
+        <p:nvSpPr>
+          <p:cNvPr id="19" name="Oval 18"/>
+          <p:cNvSpPr/>
+          <p:nvPr/>
+        </p:nvSpPr>
+        <p:spPr>
+          <a:xfrm>
+            <a:off x="8431022" y="1955867"/>
+            <a:ext cx="1162958" cy="1182255"/>
+          </a:xfrm>
+          <a:prstGeom prst="ellipse">
+            <a:avLst/>
+          </a:prstGeom>
+          <a:solidFill>
+            <a:schemeClr val="accent1">
+              <a:alpha val="60000"/>
+            </a:schemeClr>
+          </a:solidFill>
+        </p:spPr>
+        <p:style>
+          <a:lnRef idx="2">
+            <a:schemeClr val="accent1">
+              <a:shade val="50000"/>
+            </a:schemeClr>
+          </a:lnRef>
+          <a:fillRef idx="1">
+            <a:schemeClr val="accent1"/>
+          </a:fillRef>
+          <a:effectRef idx="0">
+            <a:schemeClr val="accent1"/>
+          </a:effectRef>
+          <a:fontRef idx="minor">
+            <a:schemeClr val="lt1"/>
+          </a:fontRef>
+        </p:style>
+        <p:txBody>
+          <a:bodyPr rtlCol="0" anchor="ctr"/>
+          <a:lstStyle/>
+          <a:p>
+            <a:pPr algn="ctr"/>
+            <a:endParaRPr lang="en-GB"/>
+          </a:p>
+        </p:txBody>
+      </p:sp>
+      <p:sp>
+        <p:nvSpPr>
+          <p:cNvPr id="20" name="Oval 19"/>
+          <p:cNvSpPr/>
+          <p:nvPr/>
+        </p:nvSpPr>
+        <p:spPr>
+          <a:xfrm>
+            <a:off x="8028460" y="2319834"/>
+            <a:ext cx="1162958" cy="1182255"/>
+          </a:xfrm>
+          <a:prstGeom prst="ellipse">
+            <a:avLst/>
+          </a:prstGeom>
+          <a:solidFill>
+            <a:schemeClr val="accent1">
+              <a:alpha val="60000"/>
+            </a:schemeClr>
+          </a:solidFill>
+        </p:spPr>
+        <p:style>
+          <a:lnRef idx="2">
+            <a:schemeClr val="accent1">
+              <a:shade val="50000"/>
+            </a:schemeClr>
+          </a:lnRef>
+          <a:fillRef idx="1">
+            <a:schemeClr val="accent1"/>
+          </a:fillRef>
+          <a:effectRef idx="0">
+            <a:schemeClr val="accent1"/>
+          </a:effectRef>
+          <a:fontRef idx="minor">
+            <a:schemeClr val="lt1"/>
+          </a:fontRef>
+        </p:style>
+        <p:txBody>
+          <a:bodyPr rtlCol="0" anchor="ctr"/>
+          <a:lstStyle/>
+          <a:p>
+            <a:pPr algn="ctr"/>
+            <a:endParaRPr lang="en-GB"/>
+          </a:p>
+        </p:txBody>
+      </p:sp>
+      <p:sp>
+        <p:nvSpPr>
+          <p:cNvPr id="21" name="Oval 20"/>
+          <p:cNvSpPr/>
+          <p:nvPr/>
+        </p:nvSpPr>
+        <p:spPr>
+          <a:xfrm>
+            <a:off x="7513995" y="2198664"/>
+            <a:ext cx="1162958" cy="1182255"/>
+          </a:xfrm>
+          <a:prstGeom prst="ellipse">
+            <a:avLst/>
+          </a:prstGeom>
+          <a:solidFill>
+            <a:schemeClr val="accent1">
+              <a:alpha val="60000"/>
+            </a:schemeClr>
+          </a:solidFill>
+        </p:spPr>
+        <p:style>
+          <a:lnRef idx="2">
+            <a:schemeClr val="accent1">
+              <a:shade val="50000"/>
+            </a:schemeClr>
+          </a:lnRef>
+          <a:fillRef idx="1">
+            <a:schemeClr val="accent1"/>
+          </a:fillRef>
+          <a:effectRef idx="0">
+            <a:schemeClr val="accent1"/>
+          </a:effectRef>
+          <a:fontRef idx="minor">
+            <a:schemeClr val="lt1"/>
+          </a:fontRef>
+        </p:style>
+        <p:txBody>
+          <a:bodyPr rtlCol="0" anchor="ctr"/>
+          <a:lstStyle/>
+          <a:p>
+            <a:pPr algn="ctr"/>
+            <a:endParaRPr lang="en-GB"/>
+          </a:p>
+        </p:txBody>
+      </p:sp>
+      <p:sp>
+        <p:nvSpPr>
+          <p:cNvPr id="22" name="Oval 21"/>
+          <p:cNvSpPr/>
+          <p:nvPr/>
+        </p:nvSpPr>
+        <p:spPr>
+          <a:xfrm>
+            <a:off x="7131345" y="1728705"/>
+            <a:ext cx="1162958" cy="1182255"/>
+          </a:xfrm>
+          <a:prstGeom prst="ellipse">
+            <a:avLst/>
+          </a:prstGeom>
+          <a:solidFill>
+            <a:schemeClr val="accent1">
+              <a:alpha val="60000"/>
+            </a:schemeClr>
+          </a:solidFill>
+        </p:spPr>
+        <p:style>
+          <a:lnRef idx="2">
+            <a:schemeClr val="accent1">
+              <a:shade val="50000"/>
+            </a:schemeClr>
+          </a:lnRef>
+          <a:fillRef idx="1">
+            <a:schemeClr val="accent1"/>
+          </a:fillRef>
+          <a:effectRef idx="0">
+            <a:schemeClr val="accent1"/>
+          </a:effectRef>
+          <a:fontRef idx="minor">
+            <a:schemeClr val="lt1"/>
+          </a:fontRef>
+        </p:style>
+        <p:txBody>
+          <a:bodyPr rtlCol="0" anchor="ctr"/>
+          <a:lstStyle/>
+          <a:p>
+            <a:pPr algn="ctr"/>
+            <a:endParaRPr lang="en-GB"/>
+          </a:p>
+        </p:txBody>
+      </p:sp>
+      <p:cxnSp>
+        <p:nvCxnSpPr>
+          <p:cNvPr id="23" name="Straight Arrow Connector 22"/>
+          <p:cNvCxnSpPr>
+            <a:cxnSpLocks/>
+          </p:cNvCxnSpPr>
+          <p:nvPr/>
+        </p:nvCxnSpPr>
+        <p:spPr>
+          <a:xfrm flipV="1">
+            <a:off x="6700994" y="2420459"/>
+            <a:ext cx="391339" cy="184666"/>
+          </a:xfrm>
+          <a:prstGeom prst="straightConnector1">
+            <a:avLst/>
+          </a:prstGeom>
+          <a:ln w="47625">
+            <a:solidFill>
+              <a:srgbClr val="FF0000"/>
+            </a:solidFill>
+            <a:tailEnd type="triangle"/>
+          </a:ln>
+        </p:spPr>
+        <p:style>
+          <a:lnRef idx="1">
+            <a:schemeClr val="accent1"/>
+          </a:lnRef>
+          <a:fillRef idx="0">
+            <a:schemeClr val="accent1"/>
+          </a:fillRef>
+          <a:effectRef idx="0">
+            <a:schemeClr val="accent1"/>
+          </a:effectRef>
+          <a:fontRef idx="minor">
+            <a:schemeClr val="tx1"/>
+          </a:fontRef>
+        </p:style>
+      </p:cxnSp>
+      <p:sp>
+        <p:nvSpPr>
+          <p:cNvPr id="27" name="TextBox 26"/>
+          <p:cNvSpPr txBox="1"/>
+          <p:nvPr/>
+        </p:nvSpPr>
+        <p:spPr>
+          <a:xfrm>
+            <a:off x="4636653" y="2420459"/>
+            <a:ext cx="2259083" cy="369332"/>
+          </a:xfrm>
+          <a:prstGeom prst="rect">
+            <a:avLst/>
+          </a:prstGeom>
+          <a:noFill/>
+        </p:spPr>
+        <p:txBody>
+          <a:bodyPr wrap="square" rtlCol="0">
+            <a:spAutoFit/>
+          </a:bodyPr>
+          <a:lstStyle/>
+          <a:p>
+            <a:r>
+              <a:rPr lang="en-GB" dirty="0"/>
+              <a:t>Top-view of emission</a:t>
+            </a:r>
+          </a:p>
+        </p:txBody>
+      </p:sp>
+      <p:sp>
+        <p:nvSpPr>
+          <p:cNvPr id="28" name="Oval 27"/>
+          <p:cNvSpPr/>
+          <p:nvPr/>
+        </p:nvSpPr>
+        <p:spPr>
+          <a:xfrm>
+            <a:off x="7047294" y="1043708"/>
+            <a:ext cx="2632415" cy="2508687"/>
+          </a:xfrm>
+          <a:prstGeom prst="ellipse">
+            <a:avLst/>
+          </a:prstGeom>
+          <a:solidFill>
+            <a:srgbClr val="FF0000">
+              <a:alpha val="10000"/>
+            </a:srgbClr>
+          </a:solidFill>
+        </p:spPr>
+        <p:style>
+          <a:lnRef idx="2">
+            <a:schemeClr val="accent1">
+              <a:shade val="50000"/>
+            </a:schemeClr>
+          </a:lnRef>
+          <a:fillRef idx="1">
+            <a:schemeClr val="accent1"/>
+          </a:fillRef>
+          <a:effectRef idx="0">
+            <a:schemeClr val="accent1"/>
+          </a:effectRef>
+          <a:fontRef idx="minor">
+            <a:schemeClr val="lt1"/>
+          </a:fontRef>
+        </p:style>
+        <p:txBody>
+          <a:bodyPr rtlCol="0" anchor="ctr"/>
+          <a:lstStyle/>
+          <a:p>
+            <a:pPr algn="ctr"/>
+            <a:endParaRPr lang="en-GB"/>
+          </a:p>
+        </p:txBody>
+      </p:sp>
+      <p:sp>
+        <p:nvSpPr>
+          <p:cNvPr id="29" name="TextBox 28"/>
+          <p:cNvSpPr txBox="1"/>
+          <p:nvPr/>
+        </p:nvSpPr>
+        <p:spPr>
+          <a:xfrm>
+            <a:off x="7578630" y="3887998"/>
+            <a:ext cx="2987770" cy="369332"/>
+          </a:xfrm>
+          <a:prstGeom prst="rect">
+            <a:avLst/>
+          </a:prstGeom>
+          <a:noFill/>
+        </p:spPr>
+        <p:txBody>
+          <a:bodyPr wrap="square" rtlCol="0">
+            <a:spAutoFit/>
+          </a:bodyPr>
+          <a:lstStyle/>
+          <a:p>
+            <a:r>
+              <a:rPr lang="en-GB" dirty="0"/>
+              <a:t>Individual light escape cones</a:t>
+            </a:r>
+          </a:p>
+        </p:txBody>
+      </p:sp>
+      <p:cxnSp>
+        <p:nvCxnSpPr>
+          <p:cNvPr id="30" name="Straight Arrow Connector 29"/>
+          <p:cNvCxnSpPr>
+            <a:cxnSpLocks/>
+          </p:cNvCxnSpPr>
+          <p:nvPr/>
+        </p:nvCxnSpPr>
+        <p:spPr>
+          <a:xfrm flipV="1">
+            <a:off x="8294303" y="3348731"/>
+            <a:ext cx="126179" cy="559351"/>
+          </a:xfrm>
+          <a:prstGeom prst="straightConnector1">
+            <a:avLst/>
+          </a:prstGeom>
+          <a:ln w="47625">
+            <a:solidFill>
+              <a:srgbClr val="0070C0"/>
+            </a:solidFill>
+            <a:tailEnd type="triangle"/>
+          </a:ln>
+        </p:spPr>
+        <p:style>
+          <a:lnRef idx="1">
+            <a:schemeClr val="accent1"/>
+          </a:lnRef>
+          <a:fillRef idx="0">
+            <a:schemeClr val="accent1"/>
+          </a:fillRef>
+          <a:effectRef idx="0">
+            <a:schemeClr val="accent1"/>
+          </a:effectRef>
+          <a:fontRef idx="minor">
+            <a:schemeClr val="tx1"/>
+          </a:fontRef>
+        </p:style>
+      </p:cxnSp>
+      <p:cxnSp>
+        <p:nvCxnSpPr>
+          <p:cNvPr id="32" name="Straight Arrow Connector 31"/>
+          <p:cNvCxnSpPr>
+            <a:cxnSpLocks/>
+          </p:cNvCxnSpPr>
+          <p:nvPr/>
+        </p:nvCxnSpPr>
+        <p:spPr>
+          <a:xfrm flipH="1" flipV="1">
+            <a:off x="8037832" y="3185998"/>
+            <a:ext cx="134692" cy="735730"/>
+          </a:xfrm>
+          <a:prstGeom prst="straightConnector1">
+            <a:avLst/>
+          </a:prstGeom>
+          <a:ln w="47625">
+            <a:solidFill>
+              <a:srgbClr val="0070C0"/>
+            </a:solidFill>
+            <a:tailEnd type="triangle"/>
+          </a:ln>
+        </p:spPr>
+        <p:style>
+          <a:lnRef idx="1">
+            <a:schemeClr val="accent1"/>
+          </a:lnRef>
+          <a:fillRef idx="0">
+            <a:schemeClr val="accent1"/>
+          </a:fillRef>
+          <a:effectRef idx="0">
+            <a:schemeClr val="accent1"/>
+          </a:effectRef>
+          <a:fontRef idx="minor">
+            <a:schemeClr val="tx1"/>
+          </a:fontRef>
+        </p:style>
+      </p:cxnSp>
+      <p:cxnSp>
+        <p:nvCxnSpPr>
+          <p:cNvPr id="34" name="Straight Arrow Connector 33"/>
+          <p:cNvCxnSpPr>
+            <a:cxnSpLocks/>
+          </p:cNvCxnSpPr>
+          <p:nvPr/>
+        </p:nvCxnSpPr>
+        <p:spPr>
+          <a:xfrm flipH="1" flipV="1">
+            <a:off x="7441963" y="2543009"/>
+            <a:ext cx="606718" cy="1342782"/>
+          </a:xfrm>
+          <a:prstGeom prst="straightConnector1">
+            <a:avLst/>
+          </a:prstGeom>
+          <a:ln w="47625">
+            <a:solidFill>
+              <a:srgbClr val="0070C0"/>
+            </a:solidFill>
+            <a:tailEnd type="triangle"/>
+          </a:ln>
+        </p:spPr>
+        <p:style>
+          <a:lnRef idx="1">
+            <a:schemeClr val="accent1"/>
+          </a:lnRef>
+          <a:fillRef idx="0">
+            <a:schemeClr val="accent1"/>
+          </a:fillRef>
+          <a:effectRef idx="0">
+            <a:schemeClr val="accent1"/>
+          </a:effectRef>
+          <a:fontRef idx="minor">
+            <a:schemeClr val="tx1"/>
+          </a:fontRef>
+        </p:style>
+      </p:cxnSp>
+    </p:spTree>
+    <p:extLst>
+      <p:ext uri="{BB962C8B-B14F-4D97-AF65-F5344CB8AC3E}">
+        <p14:creationId xmlns:p14="http://schemas.microsoft.com/office/powerpoint/2010/main" val="3079141590"/>
+      </p:ext>
+    </p:extLst>
+  </p:cSld>
+  <p:clrMapOvr>
+    <a:masterClrMapping/>
+  </p:clrMapOvr>
+</p:sld>
+</file>
+
 <file path=ppt/slides/slide2.xml><?xml version="1.0" encoding="utf-8"?>
 <p:sld xmlns:a="http://schemas.openxmlformats.org/drawingml/2006/main" xmlns:r="http://schemas.openxmlformats.org/officeDocument/2006/relationships" xmlns:p="http://schemas.openxmlformats.org/presentationml/2006/main">
   <p:cSld>

</xml_diff>